<commit_message>
update the repo url
</commit_message>
<xml_diff>
--- a/Planning Presentation.pptx
+++ b/Planning Presentation.pptx
@@ -1,27 +1,27 @@
 
 <file path=ppt/presentation.xml><?xml version="1.0" encoding="utf-8"?>
-<p:presentation xmlns:a="http://schemas.openxmlformats.org/drawingml/2006/main" xmlns:r="http://schemas.openxmlformats.org/officeDocument/2006/relationships" xmlns:mc="http://schemas.openxmlformats.org/markup-compatibility/2006" xmlns:mv="urn:schemas-microsoft-com:mac:vml" xmlns:p="http://schemas.openxmlformats.org/presentationml/2006/main" xmlns:c="http://schemas.openxmlformats.org/drawingml/2006/chart" xmlns:dgm="http://schemas.openxmlformats.org/drawingml/2006/diagram" xmlns:o="urn:schemas-microsoft-com:office:office" xmlns:v="urn:schemas-microsoft-com:vml" xmlns:pvml="urn:schemas-microsoft-com:office:powerpoint" xmlns:com="http://schemas.openxmlformats.org/drawingml/2006/compatibility" xmlns:p14="http://schemas.microsoft.com/office/powerpoint/2010/main" xmlns:p15="http://schemas.microsoft.com/office/powerpoint/2012/main" autoCompressPictures="0" strictFirstAndLastChars="0" saveSubsetFonts="1">
+<p:presentation xmlns:a="http://schemas.openxmlformats.org/drawingml/2006/main" xmlns:r="http://schemas.openxmlformats.org/officeDocument/2006/relationships" xmlns:p="http://schemas.openxmlformats.org/presentationml/2006/main" strictFirstAndLastChars="0" saveSubsetFonts="1" autoCompressPictures="0">
   <p:sldMasterIdLst>
-    <p:sldMasterId id="2147483659" r:id="rId4"/>
+    <p:sldMasterId id="2147483659" r:id="rId1"/>
   </p:sldMasterIdLst>
   <p:notesMasterIdLst>
-    <p:notesMasterId r:id="rId5"/>
+    <p:notesMasterId r:id="rId11"/>
   </p:notesMasterIdLst>
   <p:sldIdLst>
-    <p:sldId id="256" r:id="rId6"/>
-    <p:sldId id="257" r:id="rId7"/>
-    <p:sldId id="258" r:id="rId8"/>
-    <p:sldId id="259" r:id="rId9"/>
-    <p:sldId id="260" r:id="rId10"/>
-    <p:sldId id="261" r:id="rId11"/>
-    <p:sldId id="262" r:id="rId12"/>
-    <p:sldId id="263" r:id="rId13"/>
-    <p:sldId id="264" r:id="rId14"/>
+    <p:sldId id="256" r:id="rId2"/>
+    <p:sldId id="257" r:id="rId3"/>
+    <p:sldId id="258" r:id="rId4"/>
+    <p:sldId id="259" r:id="rId5"/>
+    <p:sldId id="260" r:id="rId6"/>
+    <p:sldId id="261" r:id="rId7"/>
+    <p:sldId id="262" r:id="rId8"/>
+    <p:sldId id="263" r:id="rId9"/>
+    <p:sldId id="264" r:id="rId10"/>
   </p:sldIdLst>
-  <p:sldSz cy="5143500" cx="9144000"/>
+  <p:sldSz cx="9144000" cy="5143500" type="screen16x9"/>
   <p:notesSz cx="6858000" cy="9144000"/>
   <p:defaultTextStyle>
-    <a:defPPr lvl="0" marR="0" rtl="0" algn="l">
+    <a:defPPr marR="0" lvl="0" algn="l" rtl="0">
       <a:lnSpc>
         <a:spcPct val="100000"/>
       </a:lnSpc>
@@ -32,7 +32,7 @@
         <a:spcPts val="0"/>
       </a:spcAft>
     </a:defPPr>
-    <a:lvl1pPr lvl="0" marR="0" rtl="0" algn="l">
+    <a:lvl1pPr marR="0" lvl="0" algn="l" rtl="0">
       <a:lnSpc>
         <a:spcPct val="100000"/>
       </a:lnSpc>
@@ -46,7 +46,7 @@
         <a:srgbClr val="000000"/>
       </a:buClr>
       <a:buFont typeface="Arial"/>
-      <a:defRPr b="0" i="0" sz="1400" u="none" cap="none" strike="noStrike">
+      <a:defRPr sz="1400" b="0" i="0" u="none" strike="noStrike" cap="none">
         <a:solidFill>
           <a:srgbClr val="000000"/>
         </a:solidFill>
@@ -56,7 +56,7 @@
         <a:sym typeface="Arial"/>
       </a:defRPr>
     </a:lvl1pPr>
-    <a:lvl2pPr lvl="1" marR="0" rtl="0" algn="l">
+    <a:lvl2pPr marR="0" lvl="1" algn="l" rtl="0">
       <a:lnSpc>
         <a:spcPct val="100000"/>
       </a:lnSpc>
@@ -70,7 +70,7 @@
         <a:srgbClr val="000000"/>
       </a:buClr>
       <a:buFont typeface="Arial"/>
-      <a:defRPr b="0" i="0" sz="1400" u="none" cap="none" strike="noStrike">
+      <a:defRPr sz="1400" b="0" i="0" u="none" strike="noStrike" cap="none">
         <a:solidFill>
           <a:srgbClr val="000000"/>
         </a:solidFill>
@@ -80,7 +80,7 @@
         <a:sym typeface="Arial"/>
       </a:defRPr>
     </a:lvl2pPr>
-    <a:lvl3pPr lvl="2" marR="0" rtl="0" algn="l">
+    <a:lvl3pPr marR="0" lvl="2" algn="l" rtl="0">
       <a:lnSpc>
         <a:spcPct val="100000"/>
       </a:lnSpc>
@@ -94,7 +94,7 @@
         <a:srgbClr val="000000"/>
       </a:buClr>
       <a:buFont typeface="Arial"/>
-      <a:defRPr b="0" i="0" sz="1400" u="none" cap="none" strike="noStrike">
+      <a:defRPr sz="1400" b="0" i="0" u="none" strike="noStrike" cap="none">
         <a:solidFill>
           <a:srgbClr val="000000"/>
         </a:solidFill>
@@ -104,7 +104,7 @@
         <a:sym typeface="Arial"/>
       </a:defRPr>
     </a:lvl3pPr>
-    <a:lvl4pPr lvl="3" marR="0" rtl="0" algn="l">
+    <a:lvl4pPr marR="0" lvl="3" algn="l" rtl="0">
       <a:lnSpc>
         <a:spcPct val="100000"/>
       </a:lnSpc>
@@ -118,7 +118,7 @@
         <a:srgbClr val="000000"/>
       </a:buClr>
       <a:buFont typeface="Arial"/>
-      <a:defRPr b="0" i="0" sz="1400" u="none" cap="none" strike="noStrike">
+      <a:defRPr sz="1400" b="0" i="0" u="none" strike="noStrike" cap="none">
         <a:solidFill>
           <a:srgbClr val="000000"/>
         </a:solidFill>
@@ -128,7 +128,7 @@
         <a:sym typeface="Arial"/>
       </a:defRPr>
     </a:lvl4pPr>
-    <a:lvl5pPr lvl="4" marR="0" rtl="0" algn="l">
+    <a:lvl5pPr marR="0" lvl="4" algn="l" rtl="0">
       <a:lnSpc>
         <a:spcPct val="100000"/>
       </a:lnSpc>
@@ -142,7 +142,7 @@
         <a:srgbClr val="000000"/>
       </a:buClr>
       <a:buFont typeface="Arial"/>
-      <a:defRPr b="0" i="0" sz="1400" u="none" cap="none" strike="noStrike">
+      <a:defRPr sz="1400" b="0" i="0" u="none" strike="noStrike" cap="none">
         <a:solidFill>
           <a:srgbClr val="000000"/>
         </a:solidFill>
@@ -152,7 +152,7 @@
         <a:sym typeface="Arial"/>
       </a:defRPr>
     </a:lvl5pPr>
-    <a:lvl6pPr lvl="5" marR="0" rtl="0" algn="l">
+    <a:lvl6pPr marR="0" lvl="5" algn="l" rtl="0">
       <a:lnSpc>
         <a:spcPct val="100000"/>
       </a:lnSpc>
@@ -166,7 +166,7 @@
         <a:srgbClr val="000000"/>
       </a:buClr>
       <a:buFont typeface="Arial"/>
-      <a:defRPr b="0" i="0" sz="1400" u="none" cap="none" strike="noStrike">
+      <a:defRPr sz="1400" b="0" i="0" u="none" strike="noStrike" cap="none">
         <a:solidFill>
           <a:srgbClr val="000000"/>
         </a:solidFill>
@@ -176,7 +176,7 @@
         <a:sym typeface="Arial"/>
       </a:defRPr>
     </a:lvl6pPr>
-    <a:lvl7pPr lvl="6" marR="0" rtl="0" algn="l">
+    <a:lvl7pPr marR="0" lvl="6" algn="l" rtl="0">
       <a:lnSpc>
         <a:spcPct val="100000"/>
       </a:lnSpc>
@@ -190,7 +190,7 @@
         <a:srgbClr val="000000"/>
       </a:buClr>
       <a:buFont typeface="Arial"/>
-      <a:defRPr b="0" i="0" sz="1400" u="none" cap="none" strike="noStrike">
+      <a:defRPr sz="1400" b="0" i="0" u="none" strike="noStrike" cap="none">
         <a:solidFill>
           <a:srgbClr val="000000"/>
         </a:solidFill>
@@ -200,7 +200,7 @@
         <a:sym typeface="Arial"/>
       </a:defRPr>
     </a:lvl7pPr>
-    <a:lvl8pPr lvl="7" marR="0" rtl="0" algn="l">
+    <a:lvl8pPr marR="0" lvl="7" algn="l" rtl="0">
       <a:lnSpc>
         <a:spcPct val="100000"/>
       </a:lnSpc>
@@ -214,7 +214,7 @@
         <a:srgbClr val="000000"/>
       </a:buClr>
       <a:buFont typeface="Arial"/>
-      <a:defRPr b="0" i="0" sz="1400" u="none" cap="none" strike="noStrike">
+      <a:defRPr sz="1400" b="0" i="0" u="none" strike="noStrike" cap="none">
         <a:solidFill>
           <a:srgbClr val="000000"/>
         </a:solidFill>
@@ -224,7 +224,7 @@
         <a:sym typeface="Arial"/>
       </a:defRPr>
     </a:lvl8pPr>
-    <a:lvl9pPr lvl="8" marR="0" rtl="0" algn="l">
+    <a:lvl9pPr marR="0" lvl="8" algn="l" rtl="0">
       <a:lnSpc>
         <a:spcPct val="100000"/>
       </a:lnSpc>
@@ -238,7 +238,7 @@
         <a:srgbClr val="000000"/>
       </a:buClr>
       <a:buFont typeface="Arial"/>
-      <a:defRPr b="0" i="0" sz="1400" u="none" cap="none" strike="noStrike">
+      <a:defRPr sz="1400" b="0" i="0" u="none" strike="noStrike" cap="none">
         <a:solidFill>
           <a:srgbClr val="000000"/>
         </a:solidFill>
@@ -251,7 +251,7 @@
   </p:defaultTextStyle>
   <p:extLst>
     <p:ext uri="{EFAFB233-063F-42B5-8137-9DF3F51BA10A}">
-      <p15:sldGuideLst>
+      <p15:sldGuideLst xmlns:p15="http://schemas.microsoft.com/office/powerpoint/2012/main">
         <p15:guide id="1" orient="horz" pos="1620">
           <p15:clr>
             <a:srgbClr val="A4A3A4"/>
@@ -269,11 +269,16 @@
 </file>
 
 <file path=ppt/notesMasters/notesMaster1.xml><?xml version="1.0" encoding="utf-8"?>
-<p:notesMaster xmlns:a="http://schemas.openxmlformats.org/drawingml/2006/main" xmlns:r="http://schemas.openxmlformats.org/officeDocument/2006/relationships" xmlns:mc="http://schemas.openxmlformats.org/markup-compatibility/2006" xmlns:mv="urn:schemas-microsoft-com:mac:vml" xmlns:p="http://schemas.openxmlformats.org/presentationml/2006/main" xmlns:c="http://schemas.openxmlformats.org/drawingml/2006/chart" xmlns:dgm="http://schemas.openxmlformats.org/drawingml/2006/diagram" xmlns:o="urn:schemas-microsoft-com:office:office" xmlns:v="urn:schemas-microsoft-com:vml" xmlns:pvml="urn:schemas-microsoft-com:office:powerpoint" xmlns:com="http://schemas.openxmlformats.org/drawingml/2006/compatibility" xmlns:p14="http://schemas.microsoft.com/office/powerpoint/2010/main" xmlns:p15="http://schemas.microsoft.com/office/powerpoint/2012/main">
+<p:notesMaster xmlns:a="http://schemas.openxmlformats.org/drawingml/2006/main" xmlns:r="http://schemas.openxmlformats.org/officeDocument/2006/relationships" xmlns:p="http://schemas.openxmlformats.org/presentationml/2006/main">
   <p:cSld>
+    <p:bg>
+      <p:bgRef idx="1001">
+        <a:schemeClr val="bg1"/>
+      </p:bgRef>
+    </p:bg>
     <p:spTree>
       <p:nvGrpSpPr>
-        <p:cNvPr id="2" name="Shape 2"/>
+        <p:cNvPr id="1" name="Shape 2"/>
         <p:cNvGrpSpPr/>
         <p:nvPr/>
       </p:nvGrpSpPr>
@@ -288,9 +293,11 @@
       <p:sp>
         <p:nvSpPr>
           <p:cNvPr id="3" name="Google Shape;3;n"/>
-          <p:cNvSpPr/>
+          <p:cNvSpPr>
+            <a:spLocks noGrp="1" noRot="1" noChangeAspect="1"/>
+          </p:cNvSpPr>
           <p:nvPr>
-            <p:ph idx="2" type="sldImg"/>
+            <p:ph type="sldImg" idx="2"/>
           </p:nvPr>
         </p:nvSpPr>
         <p:spPr>
@@ -299,9 +306,13 @@
             <a:ext cx="6096075" cy="3429000"/>
           </a:xfrm>
           <a:custGeom>
-            <a:rect b="b" l="l" r="r" t="t"/>
+            <a:avLst/>
+            <a:gdLst/>
+            <a:ahLst/>
+            <a:cxnLst/>
+            <a:rect l="l" t="t" r="r" b="b"/>
             <a:pathLst>
-              <a:path extrusionOk="0" h="120000" w="120000">
+              <a:path w="120000" h="120000" extrusionOk="0">
                 <a:moveTo>
                   <a:pt x="0" y="0"/>
                 </a:moveTo>
@@ -319,23 +330,25 @@
             </a:pathLst>
           </a:custGeom>
           <a:noFill/>
-          <a:ln cap="flat" cmpd="sng" w="9525">
+          <a:ln w="9525" cap="flat" cmpd="sng">
             <a:solidFill>
               <a:srgbClr val="000000"/>
             </a:solidFill>
             <a:prstDash val="solid"/>
             <a:round/>
-            <a:headEnd len="sm" w="sm" type="none"/>
-            <a:tailEnd len="sm" w="sm" type="none"/>
+            <a:headEnd type="none" w="sm" len="sm"/>
+            <a:tailEnd type="none" w="sm" len="sm"/>
           </a:ln>
         </p:spPr>
       </p:sp>
       <p:sp>
         <p:nvSpPr>
           <p:cNvPr id="4" name="Google Shape;4;n"/>
-          <p:cNvSpPr txBox="1"/>
+          <p:cNvSpPr txBox="1">
+            <a:spLocks noGrp="1"/>
+          </p:cNvSpPr>
           <p:nvPr>
-            <p:ph idx="1" type="body"/>
+            <p:ph type="body" idx="1"/>
           </p:nvPr>
         </p:nvSpPr>
         <p:spPr>
@@ -352,9 +365,9 @@
           </a:ln>
         </p:spPr>
         <p:txBody>
-          <a:bodyPr anchorCtr="0" anchor="t" bIns="91425" lIns="91425" spcFirstLastPara="1" rIns="91425" wrap="square" tIns="91425"/>
+          <a:bodyPr spcFirstLastPara="1" wrap="square" lIns="91425" tIns="91425" rIns="91425" bIns="91425" anchor="t" anchorCtr="0"/>
           <a:lstStyle>
-            <a:lvl1pPr indent="-298450" lvl="0" marL="457200">
+            <a:lvl1pPr marL="457200" lvl="0" indent="-298450">
               <a:spcBef>
                 <a:spcPts val="0"/>
               </a:spcBef>
@@ -365,7 +378,7 @@
               <a:buChar char="●"/>
               <a:defRPr sz="1100"/>
             </a:lvl1pPr>
-            <a:lvl2pPr indent="-298450" lvl="1" marL="914400">
+            <a:lvl2pPr marL="914400" lvl="1" indent="-298450">
               <a:spcBef>
                 <a:spcPts val="0"/>
               </a:spcBef>
@@ -376,7 +389,7 @@
               <a:buChar char="○"/>
               <a:defRPr sz="1100"/>
             </a:lvl2pPr>
-            <a:lvl3pPr indent="-298450" lvl="2" marL="1371600">
+            <a:lvl3pPr marL="1371600" lvl="2" indent="-298450">
               <a:spcBef>
                 <a:spcPts val="0"/>
               </a:spcBef>
@@ -387,7 +400,7 @@
               <a:buChar char="■"/>
               <a:defRPr sz="1100"/>
             </a:lvl3pPr>
-            <a:lvl4pPr indent="-298450" lvl="3" marL="1828800">
+            <a:lvl4pPr marL="1828800" lvl="3" indent="-298450">
               <a:spcBef>
                 <a:spcPts val="0"/>
               </a:spcBef>
@@ -398,7 +411,7 @@
               <a:buChar char="●"/>
               <a:defRPr sz="1100"/>
             </a:lvl4pPr>
-            <a:lvl5pPr indent="-298450" lvl="4" marL="2286000">
+            <a:lvl5pPr marL="2286000" lvl="4" indent="-298450">
               <a:spcBef>
                 <a:spcPts val="0"/>
               </a:spcBef>
@@ -409,7 +422,7 @@
               <a:buChar char="○"/>
               <a:defRPr sz="1100"/>
             </a:lvl5pPr>
-            <a:lvl6pPr indent="-298450" lvl="5" marL="2743200">
+            <a:lvl6pPr marL="2743200" lvl="5" indent="-298450">
               <a:spcBef>
                 <a:spcPts val="0"/>
               </a:spcBef>
@@ -420,7 +433,7 @@
               <a:buChar char="■"/>
               <a:defRPr sz="1100"/>
             </a:lvl6pPr>
-            <a:lvl7pPr indent="-298450" lvl="6" marL="3200400">
+            <a:lvl7pPr marL="3200400" lvl="6" indent="-298450">
               <a:spcBef>
                 <a:spcPts val="0"/>
               </a:spcBef>
@@ -431,7 +444,7 @@
               <a:buChar char="●"/>
               <a:defRPr sz="1100"/>
             </a:lvl7pPr>
-            <a:lvl8pPr indent="-298450" lvl="7" marL="3657600">
+            <a:lvl8pPr marL="3657600" lvl="7" indent="-298450">
               <a:spcBef>
                 <a:spcPts val="0"/>
               </a:spcBef>
@@ -442,7 +455,7 @@
               <a:buChar char="○"/>
               <a:defRPr sz="1100"/>
             </a:lvl8pPr>
-            <a:lvl9pPr indent="-298450" lvl="8" marL="4114800">
+            <a:lvl9pPr marL="4114800" lvl="8" indent="-298450">
               <a:spcBef>
                 <a:spcPts val="0"/>
               </a:spcBef>
@@ -454,14 +467,16 @@
               <a:defRPr sz="1100"/>
             </a:lvl9pPr>
           </a:lstStyle>
-          <a:p/>
+          <a:p>
+            <a:endParaRPr/>
+          </a:p>
         </p:txBody>
       </p:sp>
     </p:spTree>
   </p:cSld>
-  <p:clrMap accent1="accent1" accent2="accent2" accent3="accent3" accent4="accent4" accent5="accent5" accent6="accent6" bg1="lt1" bg2="dk2" tx1="dk1" tx2="lt2" folHlink="folHlink" hlink="hlink"/>
+  <p:clrMap bg1="lt1" tx1="dk1" bg2="dk2" tx2="lt2" accent1="accent1" accent2="accent2" accent3="accent3" accent4="accent4" accent5="accent5" accent6="accent6" hlink="hlink" folHlink="folHlink"/>
   <p:notesStyle>
-    <a:defPPr lvl="0" marR="0" rtl="0" algn="l">
+    <a:defPPr marR="0" lvl="0" algn="l" rtl="0">
       <a:lnSpc>
         <a:spcPct val="100000"/>
       </a:lnSpc>
@@ -472,7 +487,7 @@
         <a:spcPts val="0"/>
       </a:spcAft>
     </a:defPPr>
-    <a:lvl1pPr lvl="0" marR="0" rtl="0" algn="l">
+    <a:lvl1pPr marR="0" lvl="0" algn="l" rtl="0">
       <a:lnSpc>
         <a:spcPct val="100000"/>
       </a:lnSpc>
@@ -486,7 +501,7 @@
         <a:srgbClr val="000000"/>
       </a:buClr>
       <a:buFont typeface="Arial"/>
-      <a:defRPr b="0" i="0" sz="1400" u="none" cap="none" strike="noStrike">
+      <a:defRPr sz="1400" b="0" i="0" u="none" strike="noStrike" cap="none">
         <a:solidFill>
           <a:srgbClr val="000000"/>
         </a:solidFill>
@@ -496,7 +511,7 @@
         <a:sym typeface="Arial"/>
       </a:defRPr>
     </a:lvl1pPr>
-    <a:lvl2pPr lvl="1" marR="0" rtl="0" algn="l">
+    <a:lvl2pPr marR="0" lvl="1" algn="l" rtl="0">
       <a:lnSpc>
         <a:spcPct val="100000"/>
       </a:lnSpc>
@@ -510,7 +525,7 @@
         <a:srgbClr val="000000"/>
       </a:buClr>
       <a:buFont typeface="Arial"/>
-      <a:defRPr b="0" i="0" sz="1400" u="none" cap="none" strike="noStrike">
+      <a:defRPr sz="1400" b="0" i="0" u="none" strike="noStrike" cap="none">
         <a:solidFill>
           <a:srgbClr val="000000"/>
         </a:solidFill>
@@ -520,7 +535,7 @@
         <a:sym typeface="Arial"/>
       </a:defRPr>
     </a:lvl2pPr>
-    <a:lvl3pPr lvl="2" marR="0" rtl="0" algn="l">
+    <a:lvl3pPr marR="0" lvl="2" algn="l" rtl="0">
       <a:lnSpc>
         <a:spcPct val="100000"/>
       </a:lnSpc>
@@ -534,7 +549,7 @@
         <a:srgbClr val="000000"/>
       </a:buClr>
       <a:buFont typeface="Arial"/>
-      <a:defRPr b="0" i="0" sz="1400" u="none" cap="none" strike="noStrike">
+      <a:defRPr sz="1400" b="0" i="0" u="none" strike="noStrike" cap="none">
         <a:solidFill>
           <a:srgbClr val="000000"/>
         </a:solidFill>
@@ -544,7 +559,7 @@
         <a:sym typeface="Arial"/>
       </a:defRPr>
     </a:lvl3pPr>
-    <a:lvl4pPr lvl="3" marR="0" rtl="0" algn="l">
+    <a:lvl4pPr marR="0" lvl="3" algn="l" rtl="0">
       <a:lnSpc>
         <a:spcPct val="100000"/>
       </a:lnSpc>
@@ -558,7 +573,7 @@
         <a:srgbClr val="000000"/>
       </a:buClr>
       <a:buFont typeface="Arial"/>
-      <a:defRPr b="0" i="0" sz="1400" u="none" cap="none" strike="noStrike">
+      <a:defRPr sz="1400" b="0" i="0" u="none" strike="noStrike" cap="none">
         <a:solidFill>
           <a:srgbClr val="000000"/>
         </a:solidFill>
@@ -568,7 +583,7 @@
         <a:sym typeface="Arial"/>
       </a:defRPr>
     </a:lvl4pPr>
-    <a:lvl5pPr lvl="4" marR="0" rtl="0" algn="l">
+    <a:lvl5pPr marR="0" lvl="4" algn="l" rtl="0">
       <a:lnSpc>
         <a:spcPct val="100000"/>
       </a:lnSpc>
@@ -582,7 +597,7 @@
         <a:srgbClr val="000000"/>
       </a:buClr>
       <a:buFont typeface="Arial"/>
-      <a:defRPr b="0" i="0" sz="1400" u="none" cap="none" strike="noStrike">
+      <a:defRPr sz="1400" b="0" i="0" u="none" strike="noStrike" cap="none">
         <a:solidFill>
           <a:srgbClr val="000000"/>
         </a:solidFill>
@@ -592,7 +607,7 @@
         <a:sym typeface="Arial"/>
       </a:defRPr>
     </a:lvl5pPr>
-    <a:lvl6pPr lvl="5" marR="0" rtl="0" algn="l">
+    <a:lvl6pPr marR="0" lvl="5" algn="l" rtl="0">
       <a:lnSpc>
         <a:spcPct val="100000"/>
       </a:lnSpc>
@@ -606,7 +621,7 @@
         <a:srgbClr val="000000"/>
       </a:buClr>
       <a:buFont typeface="Arial"/>
-      <a:defRPr b="0" i="0" sz="1400" u="none" cap="none" strike="noStrike">
+      <a:defRPr sz="1400" b="0" i="0" u="none" strike="noStrike" cap="none">
         <a:solidFill>
           <a:srgbClr val="000000"/>
         </a:solidFill>
@@ -616,7 +631,7 @@
         <a:sym typeface="Arial"/>
       </a:defRPr>
     </a:lvl6pPr>
-    <a:lvl7pPr lvl="6" marR="0" rtl="0" algn="l">
+    <a:lvl7pPr marR="0" lvl="6" algn="l" rtl="0">
       <a:lnSpc>
         <a:spcPct val="100000"/>
       </a:lnSpc>
@@ -630,7 +645,7 @@
         <a:srgbClr val="000000"/>
       </a:buClr>
       <a:buFont typeface="Arial"/>
-      <a:defRPr b="0" i="0" sz="1400" u="none" cap="none" strike="noStrike">
+      <a:defRPr sz="1400" b="0" i="0" u="none" strike="noStrike" cap="none">
         <a:solidFill>
           <a:srgbClr val="000000"/>
         </a:solidFill>
@@ -640,7 +655,7 @@
         <a:sym typeface="Arial"/>
       </a:defRPr>
     </a:lvl7pPr>
-    <a:lvl8pPr lvl="7" marR="0" rtl="0" algn="l">
+    <a:lvl8pPr marR="0" lvl="7" algn="l" rtl="0">
       <a:lnSpc>
         <a:spcPct val="100000"/>
       </a:lnSpc>
@@ -654,7 +669,7 @@
         <a:srgbClr val="000000"/>
       </a:buClr>
       <a:buFont typeface="Arial"/>
-      <a:defRPr b="0" i="0" sz="1400" u="none" cap="none" strike="noStrike">
+      <a:defRPr sz="1400" b="0" i="0" u="none" strike="noStrike" cap="none">
         <a:solidFill>
           <a:srgbClr val="000000"/>
         </a:solidFill>
@@ -664,7 +679,7 @@
         <a:sym typeface="Arial"/>
       </a:defRPr>
     </a:lvl8pPr>
-    <a:lvl9pPr lvl="8" marR="0" rtl="0" algn="l">
+    <a:lvl9pPr marR="0" lvl="8" algn="l" rtl="0">
       <a:lnSpc>
         <a:spcPct val="100000"/>
       </a:lnSpc>
@@ -678,7 +693,7 @@
         <a:srgbClr val="000000"/>
       </a:buClr>
       <a:buFont typeface="Arial"/>
-      <a:defRPr b="0" i="0" sz="1400" u="none" cap="none" strike="noStrike">
+      <a:defRPr sz="1400" b="0" i="0" u="none" strike="noStrike" cap="none">
         <a:solidFill>
           <a:srgbClr val="000000"/>
         </a:solidFill>
@@ -693,11 +708,11 @@
 </file>
 
 <file path=ppt/notesSlides/notesSlide1.xml><?xml version="1.0" encoding="utf-8"?>
-<p:notes xmlns:a="http://schemas.openxmlformats.org/drawingml/2006/main" xmlns:r="http://schemas.openxmlformats.org/officeDocument/2006/relationships" xmlns:mc="http://schemas.openxmlformats.org/markup-compatibility/2006" xmlns:mv="urn:schemas-microsoft-com:mac:vml" xmlns:p="http://schemas.openxmlformats.org/presentationml/2006/main" xmlns:c="http://schemas.openxmlformats.org/drawingml/2006/chart" xmlns:dgm="http://schemas.openxmlformats.org/drawingml/2006/diagram" xmlns:o="urn:schemas-microsoft-com:office:office" xmlns:v="urn:schemas-microsoft-com:vml" xmlns:pvml="urn:schemas-microsoft-com:office:powerpoint" xmlns:com="http://schemas.openxmlformats.org/drawingml/2006/compatibility" xmlns:p14="http://schemas.microsoft.com/office/powerpoint/2010/main" xmlns:p15="http://schemas.microsoft.com/office/powerpoint/2012/main" showMasterPhAnim="0" showMasterSp="0">
+<p:notes xmlns:a="http://schemas.openxmlformats.org/drawingml/2006/main" xmlns:r="http://schemas.openxmlformats.org/officeDocument/2006/relationships" xmlns:p="http://schemas.openxmlformats.org/presentationml/2006/main" showMasterSp="0" showMasterPhAnim="0">
   <p:cSld>
     <p:spTree>
       <p:nvGrpSpPr>
-        <p:cNvPr id="50" name="Shape 50"/>
+        <p:cNvPr id="1" name="Shape 50"/>
         <p:cNvGrpSpPr/>
         <p:nvPr/>
       </p:nvGrpSpPr>
@@ -712,9 +727,11 @@
       <p:sp>
         <p:nvSpPr>
           <p:cNvPr id="51" name="Google Shape;51;p:notes"/>
-          <p:cNvSpPr/>
+          <p:cNvSpPr>
+            <a:spLocks noGrp="1" noRot="1" noChangeAspect="1"/>
+          </p:cNvSpPr>
           <p:nvPr>
-            <p:ph idx="2" type="sldImg"/>
+            <p:ph type="sldImg" idx="2"/>
           </p:nvPr>
         </p:nvSpPr>
         <p:spPr>
@@ -723,9 +740,13 @@
             <a:ext cx="6096075" cy="3429000"/>
           </a:xfrm>
           <a:custGeom>
-            <a:rect b="b" l="l" r="r" t="t"/>
+            <a:avLst/>
+            <a:gdLst/>
+            <a:ahLst/>
+            <a:cxnLst/>
+            <a:rect l="l" t="t" r="r" b="b"/>
             <a:pathLst>
-              <a:path extrusionOk="0" h="120000" w="120000">
+              <a:path w="120000" h="120000" extrusionOk="0">
                 <a:moveTo>
                   <a:pt x="0" y="0"/>
                 </a:moveTo>
@@ -747,9 +768,11 @@
       <p:sp>
         <p:nvSpPr>
           <p:cNvPr id="52" name="Google Shape;52;p:notes"/>
-          <p:cNvSpPr txBox="1"/>
+          <p:cNvSpPr txBox="1">
+            <a:spLocks noGrp="1"/>
+          </p:cNvSpPr>
           <p:nvPr>
-            <p:ph idx="1" type="body"/>
+            <p:ph type="body" idx="1"/>
           </p:nvPr>
         </p:nvSpPr>
         <p:spPr>
@@ -762,12 +785,12 @@
           </a:prstGeom>
         </p:spPr>
         <p:txBody>
-          <a:bodyPr anchorCtr="0" anchor="t" bIns="91425" lIns="91425" spcFirstLastPara="1" rIns="91425" wrap="square" tIns="91425">
+          <a:bodyPr spcFirstLastPara="1" wrap="square" lIns="91425" tIns="91425" rIns="91425" bIns="91425" anchor="t" anchorCtr="0">
             <a:noAutofit/>
           </a:bodyPr>
           <a:lstStyle/>
           <a:p>
-            <a:pPr indent="0" lvl="0" marL="0" rtl="0" algn="l">
+            <a:pPr marL="0" lvl="0" indent="0" algn="l" rtl="0">
               <a:spcBef>
                 <a:spcPts val="0"/>
               </a:spcBef>
@@ -776,9 +799,6 @@
               </a:spcAft>
               <a:buNone/>
             </a:pPr>
-            <a:r>
-              <a:t/>
-            </a:r>
             <a:endParaRPr/>
           </a:p>
         </p:txBody>
@@ -792,11 +812,11 @@
 </file>
 
 <file path=ppt/notesSlides/notesSlide2.xml><?xml version="1.0" encoding="utf-8"?>
-<p:notes xmlns:a="http://schemas.openxmlformats.org/drawingml/2006/main" xmlns:r="http://schemas.openxmlformats.org/officeDocument/2006/relationships" xmlns:mc="http://schemas.openxmlformats.org/markup-compatibility/2006" xmlns:mv="urn:schemas-microsoft-com:mac:vml" xmlns:p="http://schemas.openxmlformats.org/presentationml/2006/main" xmlns:c="http://schemas.openxmlformats.org/drawingml/2006/chart" xmlns:dgm="http://schemas.openxmlformats.org/drawingml/2006/diagram" xmlns:o="urn:schemas-microsoft-com:office:office" xmlns:v="urn:schemas-microsoft-com:vml" xmlns:pvml="urn:schemas-microsoft-com:office:powerpoint" xmlns:com="http://schemas.openxmlformats.org/drawingml/2006/compatibility" xmlns:p14="http://schemas.microsoft.com/office/powerpoint/2010/main" xmlns:p15="http://schemas.microsoft.com/office/powerpoint/2012/main" showMasterPhAnim="0" showMasterSp="0">
+<p:notes xmlns:a="http://schemas.openxmlformats.org/drawingml/2006/main" xmlns:r="http://schemas.openxmlformats.org/officeDocument/2006/relationships" xmlns:p="http://schemas.openxmlformats.org/presentationml/2006/main" showMasterSp="0" showMasterPhAnim="0">
   <p:cSld>
     <p:spTree>
       <p:nvGrpSpPr>
-        <p:cNvPr id="56" name="Shape 56"/>
+        <p:cNvPr id="1" name="Shape 56"/>
         <p:cNvGrpSpPr/>
         <p:nvPr/>
       </p:nvGrpSpPr>
@@ -811,9 +831,11 @@
       <p:sp>
         <p:nvSpPr>
           <p:cNvPr id="57" name="Google Shape;57;g543d964483_1_0:notes"/>
-          <p:cNvSpPr/>
+          <p:cNvSpPr>
+            <a:spLocks noGrp="1" noRot="1" noChangeAspect="1"/>
+          </p:cNvSpPr>
           <p:nvPr>
-            <p:ph idx="2" type="sldImg"/>
+            <p:ph type="sldImg" idx="2"/>
           </p:nvPr>
         </p:nvSpPr>
         <p:spPr>
@@ -822,9 +844,13 @@
             <a:ext cx="6096000" cy="3429000"/>
           </a:xfrm>
           <a:custGeom>
-            <a:rect b="b" l="l" r="r" t="t"/>
+            <a:avLst/>
+            <a:gdLst/>
+            <a:ahLst/>
+            <a:cxnLst/>
+            <a:rect l="l" t="t" r="r" b="b"/>
             <a:pathLst>
-              <a:path extrusionOk="0" h="120000" w="120000">
+              <a:path w="120000" h="120000" extrusionOk="0">
                 <a:moveTo>
                   <a:pt x="0" y="0"/>
                 </a:moveTo>
@@ -846,9 +872,11 @@
       <p:sp>
         <p:nvSpPr>
           <p:cNvPr id="58" name="Google Shape;58;g543d964483_1_0:notes"/>
-          <p:cNvSpPr txBox="1"/>
+          <p:cNvSpPr txBox="1">
+            <a:spLocks noGrp="1"/>
+          </p:cNvSpPr>
           <p:nvPr>
-            <p:ph idx="1" type="body"/>
+            <p:ph type="body" idx="1"/>
           </p:nvPr>
         </p:nvSpPr>
         <p:spPr>
@@ -861,12 +889,12 @@
           </a:prstGeom>
         </p:spPr>
         <p:txBody>
-          <a:bodyPr anchorCtr="0" anchor="t" bIns="91425" lIns="91425" spcFirstLastPara="1" rIns="91425" wrap="square" tIns="91425">
+          <a:bodyPr spcFirstLastPara="1" wrap="square" lIns="91425" tIns="91425" rIns="91425" bIns="91425" anchor="t" anchorCtr="0">
             <a:noAutofit/>
           </a:bodyPr>
           <a:lstStyle/>
           <a:p>
-            <a:pPr indent="0" lvl="0" marL="0" rtl="0" algn="l">
+            <a:pPr marL="0" lvl="0" indent="0" algn="l" rtl="0">
               <a:spcBef>
                 <a:spcPts val="0"/>
               </a:spcBef>
@@ -875,9 +903,6 @@
               </a:spcAft>
               <a:buNone/>
             </a:pPr>
-            <a:r>
-              <a:t/>
-            </a:r>
             <a:endParaRPr/>
           </a:p>
         </p:txBody>
@@ -891,11 +916,11 @@
 </file>
 
 <file path=ppt/notesSlides/notesSlide3.xml><?xml version="1.0" encoding="utf-8"?>
-<p:notes xmlns:a="http://schemas.openxmlformats.org/drawingml/2006/main" xmlns:r="http://schemas.openxmlformats.org/officeDocument/2006/relationships" xmlns:mc="http://schemas.openxmlformats.org/markup-compatibility/2006" xmlns:mv="urn:schemas-microsoft-com:mac:vml" xmlns:p="http://schemas.openxmlformats.org/presentationml/2006/main" xmlns:c="http://schemas.openxmlformats.org/drawingml/2006/chart" xmlns:dgm="http://schemas.openxmlformats.org/drawingml/2006/diagram" xmlns:o="urn:schemas-microsoft-com:office:office" xmlns:v="urn:schemas-microsoft-com:vml" xmlns:pvml="urn:schemas-microsoft-com:office:powerpoint" xmlns:com="http://schemas.openxmlformats.org/drawingml/2006/compatibility" xmlns:p14="http://schemas.microsoft.com/office/powerpoint/2010/main" xmlns:p15="http://schemas.microsoft.com/office/powerpoint/2012/main" showMasterPhAnim="0" showMasterSp="0">
+<p:notes xmlns:a="http://schemas.openxmlformats.org/drawingml/2006/main" xmlns:r="http://schemas.openxmlformats.org/officeDocument/2006/relationships" xmlns:p="http://schemas.openxmlformats.org/presentationml/2006/main" showMasterSp="0" showMasterPhAnim="0">
   <p:cSld>
     <p:spTree>
       <p:nvGrpSpPr>
-        <p:cNvPr id="62" name="Shape 62"/>
+        <p:cNvPr id="1" name="Shape 62"/>
         <p:cNvGrpSpPr/>
         <p:nvPr/>
       </p:nvGrpSpPr>
@@ -910,9 +935,11 @@
       <p:sp>
         <p:nvSpPr>
           <p:cNvPr id="63" name="Google Shape;63;g543d964483_2_0:notes"/>
-          <p:cNvSpPr/>
+          <p:cNvSpPr>
+            <a:spLocks noGrp="1" noRot="1" noChangeAspect="1"/>
+          </p:cNvSpPr>
           <p:nvPr>
-            <p:ph idx="2" type="sldImg"/>
+            <p:ph type="sldImg" idx="2"/>
           </p:nvPr>
         </p:nvSpPr>
         <p:spPr>
@@ -921,9 +948,13 @@
             <a:ext cx="6096000" cy="3429000"/>
           </a:xfrm>
           <a:custGeom>
-            <a:rect b="b" l="l" r="r" t="t"/>
+            <a:avLst/>
+            <a:gdLst/>
+            <a:ahLst/>
+            <a:cxnLst/>
+            <a:rect l="l" t="t" r="r" b="b"/>
             <a:pathLst>
-              <a:path extrusionOk="0" h="120000" w="120000">
+              <a:path w="120000" h="120000" extrusionOk="0">
                 <a:moveTo>
                   <a:pt x="0" y="0"/>
                 </a:moveTo>
@@ -945,9 +976,11 @@
       <p:sp>
         <p:nvSpPr>
           <p:cNvPr id="64" name="Google Shape;64;g543d964483_2_0:notes"/>
-          <p:cNvSpPr txBox="1"/>
+          <p:cNvSpPr txBox="1">
+            <a:spLocks noGrp="1"/>
+          </p:cNvSpPr>
           <p:nvPr>
-            <p:ph idx="1" type="body"/>
+            <p:ph type="body" idx="1"/>
           </p:nvPr>
         </p:nvSpPr>
         <p:spPr>
@@ -960,12 +993,12 @@
           </a:prstGeom>
         </p:spPr>
         <p:txBody>
-          <a:bodyPr anchorCtr="0" anchor="t" bIns="91425" lIns="91425" spcFirstLastPara="1" rIns="91425" wrap="square" tIns="91425">
+          <a:bodyPr spcFirstLastPara="1" wrap="square" lIns="91425" tIns="91425" rIns="91425" bIns="91425" anchor="t" anchorCtr="0">
             <a:noAutofit/>
           </a:bodyPr>
           <a:lstStyle/>
           <a:p>
-            <a:pPr indent="0" lvl="0" marL="0" rtl="0" algn="l">
+            <a:pPr marL="0" lvl="0" indent="0" algn="l" rtl="0">
               <a:spcBef>
                 <a:spcPts val="0"/>
               </a:spcBef>
@@ -974,9 +1007,6 @@
               </a:spcAft>
               <a:buNone/>
             </a:pPr>
-            <a:r>
-              <a:t/>
-            </a:r>
             <a:endParaRPr/>
           </a:p>
         </p:txBody>
@@ -990,11 +1020,11 @@
 </file>
 
 <file path=ppt/notesSlides/notesSlide4.xml><?xml version="1.0" encoding="utf-8"?>
-<p:notes xmlns:a="http://schemas.openxmlformats.org/drawingml/2006/main" xmlns:r="http://schemas.openxmlformats.org/officeDocument/2006/relationships" xmlns:mc="http://schemas.openxmlformats.org/markup-compatibility/2006" xmlns:mv="urn:schemas-microsoft-com:mac:vml" xmlns:p="http://schemas.openxmlformats.org/presentationml/2006/main" xmlns:c="http://schemas.openxmlformats.org/drawingml/2006/chart" xmlns:dgm="http://schemas.openxmlformats.org/drawingml/2006/diagram" xmlns:o="urn:schemas-microsoft-com:office:office" xmlns:v="urn:schemas-microsoft-com:vml" xmlns:pvml="urn:schemas-microsoft-com:office:powerpoint" xmlns:com="http://schemas.openxmlformats.org/drawingml/2006/compatibility" xmlns:p14="http://schemas.microsoft.com/office/powerpoint/2010/main" xmlns:p15="http://schemas.microsoft.com/office/powerpoint/2012/main" showMasterPhAnim="0" showMasterSp="0">
+<p:notes xmlns:a="http://schemas.openxmlformats.org/drawingml/2006/main" xmlns:r="http://schemas.openxmlformats.org/officeDocument/2006/relationships" xmlns:p="http://schemas.openxmlformats.org/presentationml/2006/main" showMasterSp="0" showMasterPhAnim="0">
   <p:cSld>
     <p:spTree>
       <p:nvGrpSpPr>
-        <p:cNvPr id="68" name="Shape 68"/>
+        <p:cNvPr id="1" name="Shape 68"/>
         <p:cNvGrpSpPr/>
         <p:nvPr/>
       </p:nvGrpSpPr>
@@ -1009,9 +1039,11 @@
       <p:sp>
         <p:nvSpPr>
           <p:cNvPr id="69" name="Google Shape;69;g543d964483_1_21:notes"/>
-          <p:cNvSpPr/>
+          <p:cNvSpPr>
+            <a:spLocks noGrp="1" noRot="1" noChangeAspect="1"/>
+          </p:cNvSpPr>
           <p:nvPr>
-            <p:ph idx="2" type="sldImg"/>
+            <p:ph type="sldImg" idx="2"/>
           </p:nvPr>
         </p:nvSpPr>
         <p:spPr>
@@ -1020,9 +1052,13 @@
             <a:ext cx="6096000" cy="3429000"/>
           </a:xfrm>
           <a:custGeom>
-            <a:rect b="b" l="l" r="r" t="t"/>
+            <a:avLst/>
+            <a:gdLst/>
+            <a:ahLst/>
+            <a:cxnLst/>
+            <a:rect l="l" t="t" r="r" b="b"/>
             <a:pathLst>
-              <a:path extrusionOk="0" h="120000" w="120000">
+              <a:path w="120000" h="120000" extrusionOk="0">
                 <a:moveTo>
                   <a:pt x="0" y="0"/>
                 </a:moveTo>
@@ -1044,9 +1080,11 @@
       <p:sp>
         <p:nvSpPr>
           <p:cNvPr id="70" name="Google Shape;70;g543d964483_1_21:notes"/>
-          <p:cNvSpPr txBox="1"/>
+          <p:cNvSpPr txBox="1">
+            <a:spLocks noGrp="1"/>
+          </p:cNvSpPr>
           <p:nvPr>
-            <p:ph idx="1" type="body"/>
+            <p:ph type="body" idx="1"/>
           </p:nvPr>
         </p:nvSpPr>
         <p:spPr>
@@ -1059,12 +1097,12 @@
           </a:prstGeom>
         </p:spPr>
         <p:txBody>
-          <a:bodyPr anchorCtr="0" anchor="t" bIns="91425" lIns="91425" spcFirstLastPara="1" rIns="91425" wrap="square" tIns="91425">
+          <a:bodyPr spcFirstLastPara="1" wrap="square" lIns="91425" tIns="91425" rIns="91425" bIns="91425" anchor="t" anchorCtr="0">
             <a:noAutofit/>
           </a:bodyPr>
           <a:lstStyle/>
           <a:p>
-            <a:pPr indent="0" lvl="0" marL="0" rtl="0" algn="l">
+            <a:pPr marL="0" lvl="0" indent="0" algn="l" rtl="0">
               <a:spcBef>
                 <a:spcPts val="0"/>
               </a:spcBef>
@@ -1073,9 +1111,6 @@
               </a:spcAft>
               <a:buNone/>
             </a:pPr>
-            <a:r>
-              <a:t/>
-            </a:r>
             <a:endParaRPr/>
           </a:p>
         </p:txBody>
@@ -1089,11 +1124,11 @@
 </file>
 
 <file path=ppt/notesSlides/notesSlide5.xml><?xml version="1.0" encoding="utf-8"?>
-<p:notes xmlns:a="http://schemas.openxmlformats.org/drawingml/2006/main" xmlns:r="http://schemas.openxmlformats.org/officeDocument/2006/relationships" xmlns:mc="http://schemas.openxmlformats.org/markup-compatibility/2006" xmlns:mv="urn:schemas-microsoft-com:mac:vml" xmlns:p="http://schemas.openxmlformats.org/presentationml/2006/main" xmlns:c="http://schemas.openxmlformats.org/drawingml/2006/chart" xmlns:dgm="http://schemas.openxmlformats.org/drawingml/2006/diagram" xmlns:o="urn:schemas-microsoft-com:office:office" xmlns:v="urn:schemas-microsoft-com:vml" xmlns:pvml="urn:schemas-microsoft-com:office:powerpoint" xmlns:com="http://schemas.openxmlformats.org/drawingml/2006/compatibility" xmlns:p14="http://schemas.microsoft.com/office/powerpoint/2010/main" xmlns:p15="http://schemas.microsoft.com/office/powerpoint/2012/main" showMasterPhAnim="0" showMasterSp="0">
+<p:notes xmlns:a="http://schemas.openxmlformats.org/drawingml/2006/main" xmlns:r="http://schemas.openxmlformats.org/officeDocument/2006/relationships" xmlns:p="http://schemas.openxmlformats.org/presentationml/2006/main" showMasterSp="0" showMasterPhAnim="0">
   <p:cSld>
     <p:spTree>
       <p:nvGrpSpPr>
-        <p:cNvPr id="75" name="Shape 75"/>
+        <p:cNvPr id="1" name="Shape 75"/>
         <p:cNvGrpSpPr/>
         <p:nvPr/>
       </p:nvGrpSpPr>
@@ -1108,20 +1143,26 @@
       <p:sp>
         <p:nvSpPr>
           <p:cNvPr id="76" name="Google Shape;76;g543d964483_1_12:notes"/>
-          <p:cNvSpPr/>
+          <p:cNvSpPr>
+            <a:spLocks noGrp="1" noRot="1" noChangeAspect="1"/>
+          </p:cNvSpPr>
           <p:nvPr>
-            <p:ph idx="2" type="sldImg"/>
+            <p:ph type="sldImg" idx="2"/>
           </p:nvPr>
         </p:nvSpPr>
         <p:spPr>
           <a:xfrm>
-            <a:off x="381300" y="685800"/>
+            <a:off x="381000" y="685800"/>
             <a:ext cx="6096000" cy="3429000"/>
           </a:xfrm>
           <a:custGeom>
-            <a:rect b="b" l="l" r="r" t="t"/>
+            <a:avLst/>
+            <a:gdLst/>
+            <a:ahLst/>
+            <a:cxnLst/>
+            <a:rect l="l" t="t" r="r" b="b"/>
             <a:pathLst>
-              <a:path extrusionOk="0" h="120000" w="120000">
+              <a:path w="120000" h="120000" extrusionOk="0">
                 <a:moveTo>
                   <a:pt x="0" y="0"/>
                 </a:moveTo>
@@ -1143,9 +1184,11 @@
       <p:sp>
         <p:nvSpPr>
           <p:cNvPr id="77" name="Google Shape;77;g543d964483_1_12:notes"/>
-          <p:cNvSpPr txBox="1"/>
+          <p:cNvSpPr txBox="1">
+            <a:spLocks noGrp="1"/>
+          </p:cNvSpPr>
           <p:nvPr>
-            <p:ph idx="1" type="body"/>
+            <p:ph type="body" idx="1"/>
           </p:nvPr>
         </p:nvSpPr>
         <p:spPr>
@@ -1158,12 +1201,12 @@
           </a:prstGeom>
         </p:spPr>
         <p:txBody>
-          <a:bodyPr anchorCtr="0" anchor="t" bIns="91425" lIns="91425" spcFirstLastPara="1" rIns="91425" wrap="square" tIns="91425">
+          <a:bodyPr spcFirstLastPara="1" wrap="square" lIns="91425" tIns="91425" rIns="91425" bIns="91425" anchor="t" anchorCtr="0">
             <a:noAutofit/>
           </a:bodyPr>
           <a:lstStyle/>
           <a:p>
-            <a:pPr indent="0" lvl="0" marL="0" rtl="0" algn="l">
+            <a:pPr marL="0" lvl="0" indent="0" algn="l" rtl="0">
               <a:spcBef>
                 <a:spcPts val="0"/>
               </a:spcBef>
@@ -1172,9 +1215,6 @@
               </a:spcAft>
               <a:buNone/>
             </a:pPr>
-            <a:r>
-              <a:t/>
-            </a:r>
             <a:endParaRPr/>
           </a:p>
         </p:txBody>
@@ -1188,11 +1228,11 @@
 </file>
 
 <file path=ppt/notesSlides/notesSlide6.xml><?xml version="1.0" encoding="utf-8"?>
-<p:notes xmlns:a="http://schemas.openxmlformats.org/drawingml/2006/main" xmlns:r="http://schemas.openxmlformats.org/officeDocument/2006/relationships" xmlns:mc="http://schemas.openxmlformats.org/markup-compatibility/2006" xmlns:mv="urn:schemas-microsoft-com:mac:vml" xmlns:p="http://schemas.openxmlformats.org/presentationml/2006/main" xmlns:c="http://schemas.openxmlformats.org/drawingml/2006/chart" xmlns:dgm="http://schemas.openxmlformats.org/drawingml/2006/diagram" xmlns:o="urn:schemas-microsoft-com:office:office" xmlns:v="urn:schemas-microsoft-com:vml" xmlns:pvml="urn:schemas-microsoft-com:office:powerpoint" xmlns:com="http://schemas.openxmlformats.org/drawingml/2006/compatibility" xmlns:p14="http://schemas.microsoft.com/office/powerpoint/2010/main" xmlns:p15="http://schemas.microsoft.com/office/powerpoint/2012/main" showMasterPhAnim="0" showMasterSp="0">
+<p:notes xmlns:a="http://schemas.openxmlformats.org/drawingml/2006/main" xmlns:r="http://schemas.openxmlformats.org/officeDocument/2006/relationships" xmlns:p="http://schemas.openxmlformats.org/presentationml/2006/main" showMasterSp="0" showMasterPhAnim="0">
   <p:cSld>
     <p:spTree>
       <p:nvGrpSpPr>
-        <p:cNvPr id="83" name="Shape 83"/>
+        <p:cNvPr id="1" name="Shape 83"/>
         <p:cNvGrpSpPr/>
         <p:nvPr/>
       </p:nvGrpSpPr>
@@ -1207,9 +1247,11 @@
       <p:sp>
         <p:nvSpPr>
           <p:cNvPr id="84" name="Google Shape;84;g543d964483_1_6:notes"/>
-          <p:cNvSpPr/>
+          <p:cNvSpPr>
+            <a:spLocks noGrp="1" noRot="1" noChangeAspect="1"/>
+          </p:cNvSpPr>
           <p:nvPr>
-            <p:ph idx="2" type="sldImg"/>
+            <p:ph type="sldImg" idx="2"/>
           </p:nvPr>
         </p:nvSpPr>
         <p:spPr>
@@ -1218,9 +1260,13 @@
             <a:ext cx="6096000" cy="3429000"/>
           </a:xfrm>
           <a:custGeom>
-            <a:rect b="b" l="l" r="r" t="t"/>
+            <a:avLst/>
+            <a:gdLst/>
+            <a:ahLst/>
+            <a:cxnLst/>
+            <a:rect l="l" t="t" r="r" b="b"/>
             <a:pathLst>
-              <a:path extrusionOk="0" h="120000" w="120000">
+              <a:path w="120000" h="120000" extrusionOk="0">
                 <a:moveTo>
                   <a:pt x="0" y="0"/>
                 </a:moveTo>
@@ -1242,9 +1288,11 @@
       <p:sp>
         <p:nvSpPr>
           <p:cNvPr id="85" name="Google Shape;85;g543d964483_1_6:notes"/>
-          <p:cNvSpPr txBox="1"/>
+          <p:cNvSpPr txBox="1">
+            <a:spLocks noGrp="1"/>
+          </p:cNvSpPr>
           <p:nvPr>
-            <p:ph idx="1" type="body"/>
+            <p:ph type="body" idx="1"/>
           </p:nvPr>
         </p:nvSpPr>
         <p:spPr>
@@ -1257,12 +1305,12 @@
           </a:prstGeom>
         </p:spPr>
         <p:txBody>
-          <a:bodyPr anchorCtr="0" anchor="t" bIns="91425" lIns="91425" spcFirstLastPara="1" rIns="91425" wrap="square" tIns="91425">
+          <a:bodyPr spcFirstLastPara="1" wrap="square" lIns="91425" tIns="91425" rIns="91425" bIns="91425" anchor="t" anchorCtr="0">
             <a:noAutofit/>
           </a:bodyPr>
           <a:lstStyle/>
           <a:p>
-            <a:pPr indent="0" lvl="0" marL="0" rtl="0" algn="l">
+            <a:pPr marL="0" lvl="0" indent="0" algn="l" rtl="0">
               <a:spcBef>
                 <a:spcPts val="0"/>
               </a:spcBef>
@@ -1271,9 +1319,6 @@
               </a:spcAft>
               <a:buNone/>
             </a:pPr>
-            <a:r>
-              <a:t/>
-            </a:r>
             <a:endParaRPr/>
           </a:p>
         </p:txBody>
@@ -1287,11 +1332,11 @@
 </file>
 
 <file path=ppt/notesSlides/notesSlide7.xml><?xml version="1.0" encoding="utf-8"?>
-<p:notes xmlns:a="http://schemas.openxmlformats.org/drawingml/2006/main" xmlns:r="http://schemas.openxmlformats.org/officeDocument/2006/relationships" xmlns:mc="http://schemas.openxmlformats.org/markup-compatibility/2006" xmlns:mv="urn:schemas-microsoft-com:mac:vml" xmlns:p="http://schemas.openxmlformats.org/presentationml/2006/main" xmlns:c="http://schemas.openxmlformats.org/drawingml/2006/chart" xmlns:dgm="http://schemas.openxmlformats.org/drawingml/2006/diagram" xmlns:o="urn:schemas-microsoft-com:office:office" xmlns:v="urn:schemas-microsoft-com:vml" xmlns:pvml="urn:schemas-microsoft-com:office:powerpoint" xmlns:com="http://schemas.openxmlformats.org/drawingml/2006/compatibility" xmlns:p14="http://schemas.microsoft.com/office/powerpoint/2010/main" xmlns:p15="http://schemas.microsoft.com/office/powerpoint/2012/main" showMasterPhAnim="0" showMasterSp="0">
+<p:notes xmlns:a="http://schemas.openxmlformats.org/drawingml/2006/main" xmlns:r="http://schemas.openxmlformats.org/officeDocument/2006/relationships" xmlns:p="http://schemas.openxmlformats.org/presentationml/2006/main" showMasterSp="0" showMasterPhAnim="0">
   <p:cSld>
     <p:spTree>
       <p:nvGrpSpPr>
-        <p:cNvPr id="90" name="Shape 90"/>
+        <p:cNvPr id="1" name="Shape 90"/>
         <p:cNvGrpSpPr/>
         <p:nvPr/>
       </p:nvGrpSpPr>
@@ -1306,9 +1351,11 @@
       <p:sp>
         <p:nvSpPr>
           <p:cNvPr id="91" name="Google Shape;91;g543d964483_2_8:notes"/>
-          <p:cNvSpPr/>
+          <p:cNvSpPr>
+            <a:spLocks noGrp="1" noRot="1" noChangeAspect="1"/>
+          </p:cNvSpPr>
           <p:nvPr>
-            <p:ph idx="2" type="sldImg"/>
+            <p:ph type="sldImg" idx="2"/>
           </p:nvPr>
         </p:nvSpPr>
         <p:spPr>
@@ -1317,9 +1364,13 @@
             <a:ext cx="6096000" cy="3429000"/>
           </a:xfrm>
           <a:custGeom>
-            <a:rect b="b" l="l" r="r" t="t"/>
+            <a:avLst/>
+            <a:gdLst/>
+            <a:ahLst/>
+            <a:cxnLst/>
+            <a:rect l="l" t="t" r="r" b="b"/>
             <a:pathLst>
-              <a:path extrusionOk="0" h="120000" w="120000">
+              <a:path w="120000" h="120000" extrusionOk="0">
                 <a:moveTo>
                   <a:pt x="0" y="0"/>
                 </a:moveTo>
@@ -1341,9 +1392,11 @@
       <p:sp>
         <p:nvSpPr>
           <p:cNvPr id="92" name="Google Shape;92;g543d964483_2_8:notes"/>
-          <p:cNvSpPr txBox="1"/>
+          <p:cNvSpPr txBox="1">
+            <a:spLocks noGrp="1"/>
+          </p:cNvSpPr>
           <p:nvPr>
-            <p:ph idx="1" type="body"/>
+            <p:ph type="body" idx="1"/>
           </p:nvPr>
         </p:nvSpPr>
         <p:spPr>
@@ -1356,12 +1409,12 @@
           </a:prstGeom>
         </p:spPr>
         <p:txBody>
-          <a:bodyPr anchorCtr="0" anchor="t" bIns="91425" lIns="91425" spcFirstLastPara="1" rIns="91425" wrap="square" tIns="91425">
+          <a:bodyPr spcFirstLastPara="1" wrap="square" lIns="91425" tIns="91425" rIns="91425" bIns="91425" anchor="t" anchorCtr="0">
             <a:noAutofit/>
           </a:bodyPr>
           <a:lstStyle/>
           <a:p>
-            <a:pPr indent="0" lvl="0" marL="0" rtl="0" algn="l">
+            <a:pPr marL="0" lvl="0" indent="0" algn="l" rtl="0">
               <a:spcBef>
                 <a:spcPts val="0"/>
               </a:spcBef>
@@ -1370,9 +1423,6 @@
               </a:spcAft>
               <a:buNone/>
             </a:pPr>
-            <a:r>
-              <a:t/>
-            </a:r>
             <a:endParaRPr/>
           </a:p>
         </p:txBody>
@@ -1386,11 +1436,11 @@
 </file>
 
 <file path=ppt/notesSlides/notesSlide8.xml><?xml version="1.0" encoding="utf-8"?>
-<p:notes xmlns:a="http://schemas.openxmlformats.org/drawingml/2006/main" xmlns:r="http://schemas.openxmlformats.org/officeDocument/2006/relationships" xmlns:mc="http://schemas.openxmlformats.org/markup-compatibility/2006" xmlns:mv="urn:schemas-microsoft-com:mac:vml" xmlns:p="http://schemas.openxmlformats.org/presentationml/2006/main" xmlns:c="http://schemas.openxmlformats.org/drawingml/2006/chart" xmlns:dgm="http://schemas.openxmlformats.org/drawingml/2006/diagram" xmlns:o="urn:schemas-microsoft-com:office:office" xmlns:v="urn:schemas-microsoft-com:vml" xmlns:pvml="urn:schemas-microsoft-com:office:powerpoint" xmlns:com="http://schemas.openxmlformats.org/drawingml/2006/compatibility" xmlns:p14="http://schemas.microsoft.com/office/powerpoint/2010/main" xmlns:p15="http://schemas.microsoft.com/office/powerpoint/2012/main" showMasterPhAnim="0" showMasterSp="0">
+<p:notes xmlns:a="http://schemas.openxmlformats.org/drawingml/2006/main" xmlns:r="http://schemas.openxmlformats.org/officeDocument/2006/relationships" xmlns:p="http://schemas.openxmlformats.org/presentationml/2006/main" showMasterSp="0" showMasterPhAnim="0">
   <p:cSld>
     <p:spTree>
       <p:nvGrpSpPr>
-        <p:cNvPr id="96" name="Shape 96"/>
+        <p:cNvPr id="1" name="Shape 96"/>
         <p:cNvGrpSpPr/>
         <p:nvPr/>
       </p:nvGrpSpPr>
@@ -1405,9 +1455,11 @@
       <p:sp>
         <p:nvSpPr>
           <p:cNvPr id="97" name="Google Shape;97;g543d964483_0_45:notes"/>
-          <p:cNvSpPr/>
+          <p:cNvSpPr>
+            <a:spLocks noGrp="1" noRot="1" noChangeAspect="1"/>
+          </p:cNvSpPr>
           <p:nvPr>
-            <p:ph idx="2" type="sldImg"/>
+            <p:ph type="sldImg" idx="2"/>
           </p:nvPr>
         </p:nvSpPr>
         <p:spPr>
@@ -1416,9 +1468,13 @@
             <a:ext cx="6096000" cy="3429000"/>
           </a:xfrm>
           <a:custGeom>
-            <a:rect b="b" l="l" r="r" t="t"/>
+            <a:avLst/>
+            <a:gdLst/>
+            <a:ahLst/>
+            <a:cxnLst/>
+            <a:rect l="l" t="t" r="r" b="b"/>
             <a:pathLst>
-              <a:path extrusionOk="0" h="120000" w="120000">
+              <a:path w="120000" h="120000" extrusionOk="0">
                 <a:moveTo>
                   <a:pt x="0" y="0"/>
                 </a:moveTo>
@@ -1440,9 +1496,11 @@
       <p:sp>
         <p:nvSpPr>
           <p:cNvPr id="98" name="Google Shape;98;g543d964483_0_45:notes"/>
-          <p:cNvSpPr txBox="1"/>
+          <p:cNvSpPr txBox="1">
+            <a:spLocks noGrp="1"/>
+          </p:cNvSpPr>
           <p:nvPr>
-            <p:ph idx="1" type="body"/>
+            <p:ph type="body" idx="1"/>
           </p:nvPr>
         </p:nvSpPr>
         <p:spPr>
@@ -1455,12 +1513,12 @@
           </a:prstGeom>
         </p:spPr>
         <p:txBody>
-          <a:bodyPr anchorCtr="0" anchor="t" bIns="91425" lIns="91425" spcFirstLastPara="1" rIns="91425" wrap="square" tIns="91425">
+          <a:bodyPr spcFirstLastPara="1" wrap="square" lIns="91425" tIns="91425" rIns="91425" bIns="91425" anchor="t" anchorCtr="0">
             <a:noAutofit/>
           </a:bodyPr>
           <a:lstStyle/>
           <a:p>
-            <a:pPr indent="0" lvl="0" marL="0" rtl="0" algn="l">
+            <a:pPr marL="0" lvl="0" indent="0" algn="l" rtl="0">
               <a:spcBef>
                 <a:spcPts val="0"/>
               </a:spcBef>
@@ -1469,9 +1527,6 @@
               </a:spcAft>
               <a:buNone/>
             </a:pPr>
-            <a:r>
-              <a:t/>
-            </a:r>
             <a:endParaRPr/>
           </a:p>
         </p:txBody>
@@ -1485,11 +1540,11 @@
 </file>
 
 <file path=ppt/notesSlides/notesSlide9.xml><?xml version="1.0" encoding="utf-8"?>
-<p:notes xmlns:a="http://schemas.openxmlformats.org/drawingml/2006/main" xmlns:r="http://schemas.openxmlformats.org/officeDocument/2006/relationships" xmlns:mc="http://schemas.openxmlformats.org/markup-compatibility/2006" xmlns:mv="urn:schemas-microsoft-com:mac:vml" xmlns:p="http://schemas.openxmlformats.org/presentationml/2006/main" xmlns:c="http://schemas.openxmlformats.org/drawingml/2006/chart" xmlns:dgm="http://schemas.openxmlformats.org/drawingml/2006/diagram" xmlns:o="urn:schemas-microsoft-com:office:office" xmlns:v="urn:schemas-microsoft-com:vml" xmlns:pvml="urn:schemas-microsoft-com:office:powerpoint" xmlns:com="http://schemas.openxmlformats.org/drawingml/2006/compatibility" xmlns:p14="http://schemas.microsoft.com/office/powerpoint/2010/main" xmlns:p15="http://schemas.microsoft.com/office/powerpoint/2012/main" showMasterPhAnim="0" showMasterSp="0">
+<p:notes xmlns:a="http://schemas.openxmlformats.org/drawingml/2006/main" xmlns:r="http://schemas.openxmlformats.org/officeDocument/2006/relationships" xmlns:p="http://schemas.openxmlformats.org/presentationml/2006/main" showMasterSp="0" showMasterPhAnim="0">
   <p:cSld>
     <p:spTree>
       <p:nvGrpSpPr>
-        <p:cNvPr id="102" name="Shape 102"/>
+        <p:cNvPr id="1" name="Shape 102"/>
         <p:cNvGrpSpPr/>
         <p:nvPr/>
       </p:nvGrpSpPr>
@@ -1504,9 +1559,11 @@
       <p:sp>
         <p:nvSpPr>
           <p:cNvPr id="103" name="Google Shape;103;g543d964483_2_17:notes"/>
-          <p:cNvSpPr/>
+          <p:cNvSpPr>
+            <a:spLocks noGrp="1" noRot="1" noChangeAspect="1"/>
+          </p:cNvSpPr>
           <p:nvPr>
-            <p:ph idx="2" type="sldImg"/>
+            <p:ph type="sldImg" idx="2"/>
           </p:nvPr>
         </p:nvSpPr>
         <p:spPr>
@@ -1515,9 +1572,13 @@
             <a:ext cx="6096000" cy="3429000"/>
           </a:xfrm>
           <a:custGeom>
-            <a:rect b="b" l="l" r="r" t="t"/>
+            <a:avLst/>
+            <a:gdLst/>
+            <a:ahLst/>
+            <a:cxnLst/>
+            <a:rect l="l" t="t" r="r" b="b"/>
             <a:pathLst>
-              <a:path extrusionOk="0" h="120000" w="120000">
+              <a:path w="120000" h="120000" extrusionOk="0">
                 <a:moveTo>
                   <a:pt x="0" y="0"/>
                 </a:moveTo>
@@ -1539,9 +1600,11 @@
       <p:sp>
         <p:nvSpPr>
           <p:cNvPr id="104" name="Google Shape;104;g543d964483_2_17:notes"/>
-          <p:cNvSpPr txBox="1"/>
+          <p:cNvSpPr txBox="1">
+            <a:spLocks noGrp="1"/>
+          </p:cNvSpPr>
           <p:nvPr>
-            <p:ph idx="1" type="body"/>
+            <p:ph type="body" idx="1"/>
           </p:nvPr>
         </p:nvSpPr>
         <p:spPr>
@@ -1554,12 +1617,12 @@
           </a:prstGeom>
         </p:spPr>
         <p:txBody>
-          <a:bodyPr anchorCtr="0" anchor="t" bIns="91425" lIns="91425" spcFirstLastPara="1" rIns="91425" wrap="square" tIns="91425">
+          <a:bodyPr spcFirstLastPara="1" wrap="square" lIns="91425" tIns="91425" rIns="91425" bIns="91425" anchor="t" anchorCtr="0">
             <a:noAutofit/>
           </a:bodyPr>
           <a:lstStyle/>
           <a:p>
-            <a:pPr indent="0" lvl="0" marL="0" rtl="0" algn="l">
+            <a:pPr marL="0" lvl="0" indent="0" algn="l" rtl="0">
               <a:spcBef>
                 <a:spcPts val="0"/>
               </a:spcBef>
@@ -1568,9 +1631,6 @@
               </a:spcAft>
               <a:buNone/>
             </a:pPr>
-            <a:r>
-              <a:t/>
-            </a:r>
             <a:endParaRPr/>
           </a:p>
         </p:txBody>
@@ -1584,11 +1644,11 @@
 </file>
 
 <file path=ppt/slideLayouts/slideLayout1.xml><?xml version="1.0" encoding="utf-8"?>
-<p:sldLayout xmlns:a="http://schemas.openxmlformats.org/drawingml/2006/main" xmlns:r="http://schemas.openxmlformats.org/officeDocument/2006/relationships" xmlns:mc="http://schemas.openxmlformats.org/markup-compatibility/2006" xmlns:mv="urn:schemas-microsoft-com:mac:vml" xmlns:p="http://schemas.openxmlformats.org/presentationml/2006/main" xmlns:c="http://schemas.openxmlformats.org/drawingml/2006/chart" xmlns:dgm="http://schemas.openxmlformats.org/drawingml/2006/diagram" xmlns:o="urn:schemas-microsoft-com:office:office" xmlns:v="urn:schemas-microsoft-com:vml" xmlns:pvml="urn:schemas-microsoft-com:office:powerpoint" xmlns:com="http://schemas.openxmlformats.org/drawingml/2006/compatibility" xmlns:p14="http://schemas.microsoft.com/office/powerpoint/2010/main" xmlns:p15="http://schemas.microsoft.com/office/powerpoint/2012/main" matchingName="Title slide" type="title">
+<p:sldLayout xmlns:a="http://schemas.openxmlformats.org/drawingml/2006/main" xmlns:r="http://schemas.openxmlformats.org/officeDocument/2006/relationships" xmlns:p="http://schemas.openxmlformats.org/presentationml/2006/main" matchingName="Title slide" type="title">
   <p:cSld name="TITLE">
     <p:spTree>
       <p:nvGrpSpPr>
-        <p:cNvPr id="9" name="Shape 9"/>
+        <p:cNvPr id="1" name="Shape 9"/>
         <p:cNvGrpSpPr/>
         <p:nvPr/>
       </p:nvGrpSpPr>
@@ -1603,7 +1663,9 @@
       <p:sp>
         <p:nvSpPr>
           <p:cNvPr id="10" name="Google Shape;10;p2"/>
-          <p:cNvSpPr txBox="1"/>
+          <p:cNvSpPr txBox="1">
+            <a:spLocks noGrp="1"/>
+          </p:cNvSpPr>
           <p:nvPr>
             <p:ph type="ctrTitle"/>
           </p:nvPr>
@@ -1618,7 +1680,7 @@
           </a:prstGeom>
         </p:spPr>
         <p:txBody>
-          <a:bodyPr anchorCtr="0" anchor="b" bIns="91425" lIns="91425" spcFirstLastPara="1" rIns="91425" wrap="square" tIns="91425"/>
+          <a:bodyPr spcFirstLastPara="1" wrap="square" lIns="91425" tIns="91425" rIns="91425" bIns="91425" anchor="b" anchorCtr="0"/>
           <a:lstStyle>
             <a:lvl1pPr lvl="0" algn="ctr">
               <a:spcBef>
@@ -1720,15 +1782,19 @@
               <a:defRPr sz="5200"/>
             </a:lvl9pPr>
           </a:lstStyle>
-          <a:p/>
+          <a:p>
+            <a:endParaRPr/>
+          </a:p>
         </p:txBody>
       </p:sp>
       <p:sp>
         <p:nvSpPr>
           <p:cNvPr id="11" name="Google Shape;11;p2"/>
-          <p:cNvSpPr txBox="1"/>
+          <p:cNvSpPr txBox="1">
+            <a:spLocks noGrp="1"/>
+          </p:cNvSpPr>
           <p:nvPr>
-            <p:ph idx="1" type="subTitle"/>
+            <p:ph type="subTitle" idx="1"/>
           </p:nvPr>
         </p:nvSpPr>
         <p:spPr>
@@ -1741,7 +1807,7 @@
           </a:prstGeom>
         </p:spPr>
         <p:txBody>
-          <a:bodyPr anchorCtr="0" anchor="t" bIns="91425" lIns="91425" spcFirstLastPara="1" rIns="91425" wrap="square" tIns="91425"/>
+          <a:bodyPr spcFirstLastPara="1" wrap="square" lIns="91425" tIns="91425" rIns="91425" bIns="91425" anchor="t" anchorCtr="0"/>
           <a:lstStyle>
             <a:lvl1pPr lvl="0" algn="ctr">
               <a:lnSpc>
@@ -1870,15 +1936,19 @@
               <a:defRPr sz="2800"/>
             </a:lvl9pPr>
           </a:lstStyle>
-          <a:p/>
+          <a:p>
+            <a:endParaRPr/>
+          </a:p>
         </p:txBody>
       </p:sp>
       <p:sp>
         <p:nvSpPr>
           <p:cNvPr id="12" name="Google Shape;12;p2"/>
-          <p:cNvSpPr txBox="1"/>
+          <p:cNvSpPr txBox="1">
+            <a:spLocks noGrp="1"/>
+          </p:cNvSpPr>
           <p:nvPr>
-            <p:ph idx="12" type="sldNum"/>
+            <p:ph type="sldNum" idx="12"/>
           </p:nvPr>
         </p:nvSpPr>
         <p:spPr>
@@ -1891,7 +1961,7 @@
           </a:prstGeom>
         </p:spPr>
         <p:txBody>
-          <a:bodyPr anchorCtr="0" anchor="ctr" bIns="91425" lIns="91425" spcFirstLastPara="1" rIns="91425" wrap="square" tIns="91425">
+          <a:bodyPr spcFirstLastPara="1" wrap="square" lIns="91425" tIns="91425" rIns="91425" bIns="91425" anchor="ctr" anchorCtr="0">
             <a:noAutofit/>
           </a:bodyPr>
           <a:lstStyle>
@@ -1933,7 +2003,7 @@
             </a:lvl9pPr>
           </a:lstStyle>
           <a:p>
-            <a:pPr indent="0" lvl="0" marL="0" rtl="0" algn="r">
+            <a:pPr marL="0" lvl="0" indent="0" algn="r" rtl="0">
               <a:spcBef>
                 <a:spcPts val="0"/>
               </a:spcBef>
@@ -1959,11 +2029,11 @@
 </file>
 
 <file path=ppt/slideLayouts/slideLayout10.xml><?xml version="1.0" encoding="utf-8"?>
-<p:sldLayout xmlns:a="http://schemas.openxmlformats.org/drawingml/2006/main" xmlns:r="http://schemas.openxmlformats.org/officeDocument/2006/relationships" xmlns:mc="http://schemas.openxmlformats.org/markup-compatibility/2006" xmlns:mv="urn:schemas-microsoft-com:mac:vml" xmlns:p="http://schemas.openxmlformats.org/presentationml/2006/main" xmlns:c="http://schemas.openxmlformats.org/drawingml/2006/chart" xmlns:dgm="http://schemas.openxmlformats.org/drawingml/2006/diagram" xmlns:o="urn:schemas-microsoft-com:office:office" xmlns:v="urn:schemas-microsoft-com:vml" xmlns:pvml="urn:schemas-microsoft-com:office:powerpoint" xmlns:com="http://schemas.openxmlformats.org/drawingml/2006/compatibility" xmlns:p14="http://schemas.microsoft.com/office/powerpoint/2010/main" xmlns:p15="http://schemas.microsoft.com/office/powerpoint/2012/main" matchingName="Big number">
+<p:sldLayout xmlns:a="http://schemas.openxmlformats.org/drawingml/2006/main" xmlns:r="http://schemas.openxmlformats.org/officeDocument/2006/relationships" xmlns:p="http://schemas.openxmlformats.org/presentationml/2006/main" matchingName="Big number">
   <p:cSld name="BIG_NUMBER">
     <p:spTree>
       <p:nvGrpSpPr>
-        <p:cNvPr id="44" name="Shape 44"/>
+        <p:cNvPr id="1" name="Shape 44"/>
         <p:cNvGrpSpPr/>
         <p:nvPr/>
       </p:nvGrpSpPr>
@@ -1978,9 +2048,11 @@
       <p:sp>
         <p:nvSpPr>
           <p:cNvPr id="45" name="Google Shape;45;p11"/>
-          <p:cNvSpPr txBox="1"/>
+          <p:cNvSpPr txBox="1">
+            <a:spLocks noGrp="1"/>
+          </p:cNvSpPr>
           <p:nvPr>
-            <p:ph hasCustomPrompt="1" type="title"/>
+            <p:ph type="title" hasCustomPrompt="1"/>
           </p:nvPr>
         </p:nvSpPr>
         <p:spPr>
@@ -1993,7 +2065,7 @@
           </a:prstGeom>
         </p:spPr>
         <p:txBody>
-          <a:bodyPr anchorCtr="0" anchor="b" bIns="91425" lIns="91425" spcFirstLastPara="1" rIns="91425" wrap="square" tIns="91425"/>
+          <a:bodyPr spcFirstLastPara="1" wrap="square" lIns="91425" tIns="91425" rIns="91425" bIns="91425" anchor="b" anchorCtr="0"/>
           <a:lstStyle>
             <a:lvl1pPr lvl="0" algn="ctr">
               <a:spcBef>
@@ -2105,9 +2177,11 @@
       <p:sp>
         <p:nvSpPr>
           <p:cNvPr id="46" name="Google Shape;46;p11"/>
-          <p:cNvSpPr txBox="1"/>
+          <p:cNvSpPr txBox="1">
+            <a:spLocks noGrp="1"/>
+          </p:cNvSpPr>
           <p:nvPr>
-            <p:ph idx="1" type="body"/>
+            <p:ph type="body" idx="1"/>
           </p:nvPr>
         </p:nvSpPr>
         <p:spPr>
@@ -2120,9 +2194,9 @@
           </a:prstGeom>
         </p:spPr>
         <p:txBody>
-          <a:bodyPr anchorCtr="0" anchor="t" bIns="91425" lIns="91425" spcFirstLastPara="1" rIns="91425" wrap="square" tIns="91425"/>
+          <a:bodyPr spcFirstLastPara="1" wrap="square" lIns="91425" tIns="91425" rIns="91425" bIns="91425" anchor="t" anchorCtr="0"/>
           <a:lstStyle>
-            <a:lvl1pPr indent="-342900" lvl="0" marL="457200" algn="ctr">
+            <a:lvl1pPr marL="457200" lvl="0" indent="-342900" algn="ctr">
               <a:spcBef>
                 <a:spcPts val="0"/>
               </a:spcBef>
@@ -2133,7 +2207,7 @@
               <a:buChar char="●"/>
               <a:defRPr/>
             </a:lvl1pPr>
-            <a:lvl2pPr indent="-317500" lvl="1" marL="914400" algn="ctr">
+            <a:lvl2pPr marL="914400" lvl="1" indent="-317500" algn="ctr">
               <a:spcBef>
                 <a:spcPts val="1600"/>
               </a:spcBef>
@@ -2144,7 +2218,7 @@
               <a:buChar char="○"/>
               <a:defRPr/>
             </a:lvl2pPr>
-            <a:lvl3pPr indent="-317500" lvl="2" marL="1371600" algn="ctr">
+            <a:lvl3pPr marL="1371600" lvl="2" indent="-317500" algn="ctr">
               <a:spcBef>
                 <a:spcPts val="1600"/>
               </a:spcBef>
@@ -2155,7 +2229,7 @@
               <a:buChar char="■"/>
               <a:defRPr/>
             </a:lvl3pPr>
-            <a:lvl4pPr indent="-317500" lvl="3" marL="1828800" algn="ctr">
+            <a:lvl4pPr marL="1828800" lvl="3" indent="-317500" algn="ctr">
               <a:spcBef>
                 <a:spcPts val="1600"/>
               </a:spcBef>
@@ -2166,7 +2240,7 @@
               <a:buChar char="●"/>
               <a:defRPr/>
             </a:lvl4pPr>
-            <a:lvl5pPr indent="-317500" lvl="4" marL="2286000" algn="ctr">
+            <a:lvl5pPr marL="2286000" lvl="4" indent="-317500" algn="ctr">
               <a:spcBef>
                 <a:spcPts val="1600"/>
               </a:spcBef>
@@ -2177,7 +2251,7 @@
               <a:buChar char="○"/>
               <a:defRPr/>
             </a:lvl5pPr>
-            <a:lvl6pPr indent="-317500" lvl="5" marL="2743200" algn="ctr">
+            <a:lvl6pPr marL="2743200" lvl="5" indent="-317500" algn="ctr">
               <a:spcBef>
                 <a:spcPts val="1600"/>
               </a:spcBef>
@@ -2188,7 +2262,7 @@
               <a:buChar char="■"/>
               <a:defRPr/>
             </a:lvl6pPr>
-            <a:lvl7pPr indent="-317500" lvl="6" marL="3200400" algn="ctr">
+            <a:lvl7pPr marL="3200400" lvl="6" indent="-317500" algn="ctr">
               <a:spcBef>
                 <a:spcPts val="1600"/>
               </a:spcBef>
@@ -2199,7 +2273,7 @@
               <a:buChar char="●"/>
               <a:defRPr/>
             </a:lvl7pPr>
-            <a:lvl8pPr indent="-317500" lvl="7" marL="3657600" algn="ctr">
+            <a:lvl8pPr marL="3657600" lvl="7" indent="-317500" algn="ctr">
               <a:spcBef>
                 <a:spcPts val="1600"/>
               </a:spcBef>
@@ -2210,7 +2284,7 @@
               <a:buChar char="○"/>
               <a:defRPr/>
             </a:lvl8pPr>
-            <a:lvl9pPr indent="-317500" lvl="8" marL="4114800" algn="ctr">
+            <a:lvl9pPr marL="4114800" lvl="8" indent="-317500" algn="ctr">
               <a:spcBef>
                 <a:spcPts val="1600"/>
               </a:spcBef>
@@ -2222,15 +2296,19 @@
               <a:defRPr/>
             </a:lvl9pPr>
           </a:lstStyle>
-          <a:p/>
+          <a:p>
+            <a:endParaRPr/>
+          </a:p>
         </p:txBody>
       </p:sp>
       <p:sp>
         <p:nvSpPr>
           <p:cNvPr id="47" name="Google Shape;47;p11"/>
-          <p:cNvSpPr txBox="1"/>
+          <p:cNvSpPr txBox="1">
+            <a:spLocks noGrp="1"/>
+          </p:cNvSpPr>
           <p:nvPr>
-            <p:ph idx="12" type="sldNum"/>
+            <p:ph type="sldNum" idx="12"/>
           </p:nvPr>
         </p:nvSpPr>
         <p:spPr>
@@ -2243,7 +2321,7 @@
           </a:prstGeom>
         </p:spPr>
         <p:txBody>
-          <a:bodyPr anchorCtr="0" anchor="ctr" bIns="91425" lIns="91425" spcFirstLastPara="1" rIns="91425" wrap="square" tIns="91425">
+          <a:bodyPr spcFirstLastPara="1" wrap="square" lIns="91425" tIns="91425" rIns="91425" bIns="91425" anchor="ctr" anchorCtr="0">
             <a:noAutofit/>
           </a:bodyPr>
           <a:lstStyle>
@@ -2285,7 +2363,7 @@
             </a:lvl9pPr>
           </a:lstStyle>
           <a:p>
-            <a:pPr indent="0" lvl="0" marL="0" rtl="0" algn="r">
+            <a:pPr marL="0" lvl="0" indent="0" algn="r" rtl="0">
               <a:spcBef>
                 <a:spcPts val="0"/>
               </a:spcBef>
@@ -2311,11 +2389,11 @@
 </file>
 
 <file path=ppt/slideLayouts/slideLayout11.xml><?xml version="1.0" encoding="utf-8"?>
-<p:sldLayout xmlns:a="http://schemas.openxmlformats.org/drawingml/2006/main" xmlns:r="http://schemas.openxmlformats.org/officeDocument/2006/relationships" xmlns:mc="http://schemas.openxmlformats.org/markup-compatibility/2006" xmlns:mv="urn:schemas-microsoft-com:mac:vml" xmlns:p="http://schemas.openxmlformats.org/presentationml/2006/main" xmlns:c="http://schemas.openxmlformats.org/drawingml/2006/chart" xmlns:dgm="http://schemas.openxmlformats.org/drawingml/2006/diagram" xmlns:o="urn:schemas-microsoft-com:office:office" xmlns:v="urn:schemas-microsoft-com:vml" xmlns:pvml="urn:schemas-microsoft-com:office:powerpoint" xmlns:com="http://schemas.openxmlformats.org/drawingml/2006/compatibility" xmlns:p14="http://schemas.microsoft.com/office/powerpoint/2010/main" xmlns:p15="http://schemas.microsoft.com/office/powerpoint/2012/main" matchingName="Blank" type="blank">
+<p:sldLayout xmlns:a="http://schemas.openxmlformats.org/drawingml/2006/main" xmlns:r="http://schemas.openxmlformats.org/officeDocument/2006/relationships" xmlns:p="http://schemas.openxmlformats.org/presentationml/2006/main" matchingName="Blank" type="blank">
   <p:cSld name="BLANK">
     <p:spTree>
       <p:nvGrpSpPr>
-        <p:cNvPr id="48" name="Shape 48"/>
+        <p:cNvPr id="1" name="Shape 48"/>
         <p:cNvGrpSpPr/>
         <p:nvPr/>
       </p:nvGrpSpPr>
@@ -2330,9 +2408,11 @@
       <p:sp>
         <p:nvSpPr>
           <p:cNvPr id="49" name="Google Shape;49;p12"/>
-          <p:cNvSpPr txBox="1"/>
+          <p:cNvSpPr txBox="1">
+            <a:spLocks noGrp="1"/>
+          </p:cNvSpPr>
           <p:nvPr>
-            <p:ph idx="12" type="sldNum"/>
+            <p:ph type="sldNum" idx="12"/>
           </p:nvPr>
         </p:nvSpPr>
         <p:spPr>
@@ -2345,7 +2425,7 @@
           </a:prstGeom>
         </p:spPr>
         <p:txBody>
-          <a:bodyPr anchorCtr="0" anchor="ctr" bIns="91425" lIns="91425" spcFirstLastPara="1" rIns="91425" wrap="square" tIns="91425">
+          <a:bodyPr spcFirstLastPara="1" wrap="square" lIns="91425" tIns="91425" rIns="91425" bIns="91425" anchor="ctr" anchorCtr="0">
             <a:noAutofit/>
           </a:bodyPr>
           <a:lstStyle>
@@ -2387,7 +2467,7 @@
             </a:lvl9pPr>
           </a:lstStyle>
           <a:p>
-            <a:pPr indent="0" lvl="0" marL="0" rtl="0" algn="r">
+            <a:pPr marL="0" lvl="0" indent="0" algn="r" rtl="0">
               <a:spcBef>
                 <a:spcPts val="0"/>
               </a:spcBef>
@@ -2413,11 +2493,11 @@
 </file>
 
 <file path=ppt/slideLayouts/slideLayout2.xml><?xml version="1.0" encoding="utf-8"?>
-<p:sldLayout xmlns:a="http://schemas.openxmlformats.org/drawingml/2006/main" xmlns:r="http://schemas.openxmlformats.org/officeDocument/2006/relationships" xmlns:mc="http://schemas.openxmlformats.org/markup-compatibility/2006" xmlns:mv="urn:schemas-microsoft-com:mac:vml" xmlns:p="http://schemas.openxmlformats.org/presentationml/2006/main" xmlns:c="http://schemas.openxmlformats.org/drawingml/2006/chart" xmlns:dgm="http://schemas.openxmlformats.org/drawingml/2006/diagram" xmlns:o="urn:schemas-microsoft-com:office:office" xmlns:v="urn:schemas-microsoft-com:vml" xmlns:pvml="urn:schemas-microsoft-com:office:powerpoint" xmlns:com="http://schemas.openxmlformats.org/drawingml/2006/compatibility" xmlns:p14="http://schemas.microsoft.com/office/powerpoint/2010/main" xmlns:p15="http://schemas.microsoft.com/office/powerpoint/2012/main" matchingName="Section header" type="secHead">
+<p:sldLayout xmlns:a="http://schemas.openxmlformats.org/drawingml/2006/main" xmlns:r="http://schemas.openxmlformats.org/officeDocument/2006/relationships" xmlns:p="http://schemas.openxmlformats.org/presentationml/2006/main" matchingName="Section header" type="secHead">
   <p:cSld name="SECTION_HEADER">
     <p:spTree>
       <p:nvGrpSpPr>
-        <p:cNvPr id="13" name="Shape 13"/>
+        <p:cNvPr id="1" name="Shape 13"/>
         <p:cNvGrpSpPr/>
         <p:nvPr/>
       </p:nvGrpSpPr>
@@ -2432,7 +2512,9 @@
       <p:sp>
         <p:nvSpPr>
           <p:cNvPr id="14" name="Google Shape;14;p3"/>
-          <p:cNvSpPr txBox="1"/>
+          <p:cNvSpPr txBox="1">
+            <a:spLocks noGrp="1"/>
+          </p:cNvSpPr>
           <p:nvPr>
             <p:ph type="title"/>
           </p:nvPr>
@@ -2447,7 +2529,7 @@
           </a:prstGeom>
         </p:spPr>
         <p:txBody>
-          <a:bodyPr anchorCtr="0" anchor="ctr" bIns="91425" lIns="91425" spcFirstLastPara="1" rIns="91425" wrap="square" tIns="91425"/>
+          <a:bodyPr spcFirstLastPara="1" wrap="square" lIns="91425" tIns="91425" rIns="91425" bIns="91425" anchor="ctr" anchorCtr="0"/>
           <a:lstStyle>
             <a:lvl1pPr lvl="0" algn="ctr">
               <a:spcBef>
@@ -2549,15 +2631,19 @@
               <a:defRPr sz="3600"/>
             </a:lvl9pPr>
           </a:lstStyle>
-          <a:p/>
+          <a:p>
+            <a:endParaRPr/>
+          </a:p>
         </p:txBody>
       </p:sp>
       <p:sp>
         <p:nvSpPr>
           <p:cNvPr id="15" name="Google Shape;15;p3"/>
-          <p:cNvSpPr txBox="1"/>
+          <p:cNvSpPr txBox="1">
+            <a:spLocks noGrp="1"/>
+          </p:cNvSpPr>
           <p:nvPr>
-            <p:ph idx="12" type="sldNum"/>
+            <p:ph type="sldNum" idx="12"/>
           </p:nvPr>
         </p:nvSpPr>
         <p:spPr>
@@ -2570,7 +2656,7 @@
           </a:prstGeom>
         </p:spPr>
         <p:txBody>
-          <a:bodyPr anchorCtr="0" anchor="ctr" bIns="91425" lIns="91425" spcFirstLastPara="1" rIns="91425" wrap="square" tIns="91425">
+          <a:bodyPr spcFirstLastPara="1" wrap="square" lIns="91425" tIns="91425" rIns="91425" bIns="91425" anchor="ctr" anchorCtr="0">
             <a:noAutofit/>
           </a:bodyPr>
           <a:lstStyle>
@@ -2612,7 +2698,7 @@
             </a:lvl9pPr>
           </a:lstStyle>
           <a:p>
-            <a:pPr indent="0" lvl="0" marL="0" rtl="0" algn="r">
+            <a:pPr marL="0" lvl="0" indent="0" algn="r" rtl="0">
               <a:spcBef>
                 <a:spcPts val="0"/>
               </a:spcBef>
@@ -2638,11 +2724,11 @@
 </file>
 
 <file path=ppt/slideLayouts/slideLayout3.xml><?xml version="1.0" encoding="utf-8"?>
-<p:sldLayout xmlns:a="http://schemas.openxmlformats.org/drawingml/2006/main" xmlns:r="http://schemas.openxmlformats.org/officeDocument/2006/relationships" xmlns:mc="http://schemas.openxmlformats.org/markup-compatibility/2006" xmlns:mv="urn:schemas-microsoft-com:mac:vml" xmlns:p="http://schemas.openxmlformats.org/presentationml/2006/main" xmlns:c="http://schemas.openxmlformats.org/drawingml/2006/chart" xmlns:dgm="http://schemas.openxmlformats.org/drawingml/2006/diagram" xmlns:o="urn:schemas-microsoft-com:office:office" xmlns:v="urn:schemas-microsoft-com:vml" xmlns:pvml="urn:schemas-microsoft-com:office:powerpoint" xmlns:com="http://schemas.openxmlformats.org/drawingml/2006/compatibility" xmlns:p14="http://schemas.microsoft.com/office/powerpoint/2010/main" xmlns:p15="http://schemas.microsoft.com/office/powerpoint/2012/main" matchingName="Title and body" type="tx">
+<p:sldLayout xmlns:a="http://schemas.openxmlformats.org/drawingml/2006/main" xmlns:r="http://schemas.openxmlformats.org/officeDocument/2006/relationships" xmlns:p="http://schemas.openxmlformats.org/presentationml/2006/main" matchingName="Title and body" type="tx">
   <p:cSld name="TITLE_AND_BODY">
     <p:spTree>
       <p:nvGrpSpPr>
-        <p:cNvPr id="16" name="Shape 16"/>
+        <p:cNvPr id="1" name="Shape 16"/>
         <p:cNvGrpSpPr/>
         <p:nvPr/>
       </p:nvGrpSpPr>
@@ -2657,7 +2743,9 @@
       <p:sp>
         <p:nvSpPr>
           <p:cNvPr id="17" name="Google Shape;17;p4"/>
-          <p:cNvSpPr txBox="1"/>
+          <p:cNvSpPr txBox="1">
+            <a:spLocks noGrp="1"/>
+          </p:cNvSpPr>
           <p:nvPr>
             <p:ph type="title"/>
           </p:nvPr>
@@ -2672,7 +2760,7 @@
           </a:prstGeom>
         </p:spPr>
         <p:txBody>
-          <a:bodyPr anchorCtr="0" anchor="t" bIns="91425" lIns="91425" spcFirstLastPara="1" rIns="91425" wrap="square" tIns="91425"/>
+          <a:bodyPr spcFirstLastPara="1" wrap="square" lIns="91425" tIns="91425" rIns="91425" bIns="91425" anchor="t" anchorCtr="0"/>
           <a:lstStyle>
             <a:lvl1pPr lvl="0">
               <a:spcBef>
@@ -2774,15 +2862,19 @@
               <a:defRPr/>
             </a:lvl9pPr>
           </a:lstStyle>
-          <a:p/>
+          <a:p>
+            <a:endParaRPr/>
+          </a:p>
         </p:txBody>
       </p:sp>
       <p:sp>
         <p:nvSpPr>
           <p:cNvPr id="18" name="Google Shape;18;p4"/>
-          <p:cNvSpPr txBox="1"/>
+          <p:cNvSpPr txBox="1">
+            <a:spLocks noGrp="1"/>
+          </p:cNvSpPr>
           <p:nvPr>
-            <p:ph idx="1" type="body"/>
+            <p:ph type="body" idx="1"/>
           </p:nvPr>
         </p:nvSpPr>
         <p:spPr>
@@ -2795,9 +2887,9 @@
           </a:prstGeom>
         </p:spPr>
         <p:txBody>
-          <a:bodyPr anchorCtr="0" anchor="t" bIns="91425" lIns="91425" spcFirstLastPara="1" rIns="91425" wrap="square" tIns="91425"/>
+          <a:bodyPr spcFirstLastPara="1" wrap="square" lIns="91425" tIns="91425" rIns="91425" bIns="91425" anchor="t" anchorCtr="0"/>
           <a:lstStyle>
-            <a:lvl1pPr indent="-342900" lvl="0" marL="457200">
+            <a:lvl1pPr marL="457200" lvl="0" indent="-342900">
               <a:spcBef>
                 <a:spcPts val="0"/>
               </a:spcBef>
@@ -2808,7 +2900,7 @@
               <a:buChar char="●"/>
               <a:defRPr/>
             </a:lvl1pPr>
-            <a:lvl2pPr indent="-317500" lvl="1" marL="914400">
+            <a:lvl2pPr marL="914400" lvl="1" indent="-317500">
               <a:spcBef>
                 <a:spcPts val="1600"/>
               </a:spcBef>
@@ -2819,7 +2911,7 @@
               <a:buChar char="○"/>
               <a:defRPr/>
             </a:lvl2pPr>
-            <a:lvl3pPr indent="-317500" lvl="2" marL="1371600">
+            <a:lvl3pPr marL="1371600" lvl="2" indent="-317500">
               <a:spcBef>
                 <a:spcPts val="1600"/>
               </a:spcBef>
@@ -2830,7 +2922,7 @@
               <a:buChar char="■"/>
               <a:defRPr/>
             </a:lvl3pPr>
-            <a:lvl4pPr indent="-317500" lvl="3" marL="1828800">
+            <a:lvl4pPr marL="1828800" lvl="3" indent="-317500">
               <a:spcBef>
                 <a:spcPts val="1600"/>
               </a:spcBef>
@@ -2841,7 +2933,7 @@
               <a:buChar char="●"/>
               <a:defRPr/>
             </a:lvl4pPr>
-            <a:lvl5pPr indent="-317500" lvl="4" marL="2286000">
+            <a:lvl5pPr marL="2286000" lvl="4" indent="-317500">
               <a:spcBef>
                 <a:spcPts val="1600"/>
               </a:spcBef>
@@ -2852,7 +2944,7 @@
               <a:buChar char="○"/>
               <a:defRPr/>
             </a:lvl5pPr>
-            <a:lvl6pPr indent="-317500" lvl="5" marL="2743200">
+            <a:lvl6pPr marL="2743200" lvl="5" indent="-317500">
               <a:spcBef>
                 <a:spcPts val="1600"/>
               </a:spcBef>
@@ -2863,7 +2955,7 @@
               <a:buChar char="■"/>
               <a:defRPr/>
             </a:lvl6pPr>
-            <a:lvl7pPr indent="-317500" lvl="6" marL="3200400">
+            <a:lvl7pPr marL="3200400" lvl="6" indent="-317500">
               <a:spcBef>
                 <a:spcPts val="1600"/>
               </a:spcBef>
@@ -2874,7 +2966,7 @@
               <a:buChar char="●"/>
               <a:defRPr/>
             </a:lvl7pPr>
-            <a:lvl8pPr indent="-317500" lvl="7" marL="3657600">
+            <a:lvl8pPr marL="3657600" lvl="7" indent="-317500">
               <a:spcBef>
                 <a:spcPts val="1600"/>
               </a:spcBef>
@@ -2885,7 +2977,7 @@
               <a:buChar char="○"/>
               <a:defRPr/>
             </a:lvl8pPr>
-            <a:lvl9pPr indent="-317500" lvl="8" marL="4114800">
+            <a:lvl9pPr marL="4114800" lvl="8" indent="-317500">
               <a:spcBef>
                 <a:spcPts val="1600"/>
               </a:spcBef>
@@ -2897,15 +2989,19 @@
               <a:defRPr/>
             </a:lvl9pPr>
           </a:lstStyle>
-          <a:p/>
+          <a:p>
+            <a:endParaRPr/>
+          </a:p>
         </p:txBody>
       </p:sp>
       <p:sp>
         <p:nvSpPr>
           <p:cNvPr id="19" name="Google Shape;19;p4"/>
-          <p:cNvSpPr txBox="1"/>
+          <p:cNvSpPr txBox="1">
+            <a:spLocks noGrp="1"/>
+          </p:cNvSpPr>
           <p:nvPr>
-            <p:ph idx="12" type="sldNum"/>
+            <p:ph type="sldNum" idx="12"/>
           </p:nvPr>
         </p:nvSpPr>
         <p:spPr>
@@ -2918,7 +3014,7 @@
           </a:prstGeom>
         </p:spPr>
         <p:txBody>
-          <a:bodyPr anchorCtr="0" anchor="ctr" bIns="91425" lIns="91425" spcFirstLastPara="1" rIns="91425" wrap="square" tIns="91425">
+          <a:bodyPr spcFirstLastPara="1" wrap="square" lIns="91425" tIns="91425" rIns="91425" bIns="91425" anchor="ctr" anchorCtr="0">
             <a:noAutofit/>
           </a:bodyPr>
           <a:lstStyle>
@@ -2960,7 +3056,7 @@
             </a:lvl9pPr>
           </a:lstStyle>
           <a:p>
-            <a:pPr indent="0" lvl="0" marL="0" rtl="0" algn="r">
+            <a:pPr marL="0" lvl="0" indent="0" algn="r" rtl="0">
               <a:spcBef>
                 <a:spcPts val="0"/>
               </a:spcBef>
@@ -2986,11 +3082,11 @@
 </file>
 
 <file path=ppt/slideLayouts/slideLayout4.xml><?xml version="1.0" encoding="utf-8"?>
-<p:sldLayout xmlns:a="http://schemas.openxmlformats.org/drawingml/2006/main" xmlns:r="http://schemas.openxmlformats.org/officeDocument/2006/relationships" xmlns:mc="http://schemas.openxmlformats.org/markup-compatibility/2006" xmlns:mv="urn:schemas-microsoft-com:mac:vml" xmlns:p="http://schemas.openxmlformats.org/presentationml/2006/main" xmlns:c="http://schemas.openxmlformats.org/drawingml/2006/chart" xmlns:dgm="http://schemas.openxmlformats.org/drawingml/2006/diagram" xmlns:o="urn:schemas-microsoft-com:office:office" xmlns:v="urn:schemas-microsoft-com:vml" xmlns:pvml="urn:schemas-microsoft-com:office:powerpoint" xmlns:com="http://schemas.openxmlformats.org/drawingml/2006/compatibility" xmlns:p14="http://schemas.microsoft.com/office/powerpoint/2010/main" xmlns:p15="http://schemas.microsoft.com/office/powerpoint/2012/main" matchingName="Title and two columns" type="twoColTx">
+<p:sldLayout xmlns:a="http://schemas.openxmlformats.org/drawingml/2006/main" xmlns:r="http://schemas.openxmlformats.org/officeDocument/2006/relationships" xmlns:p="http://schemas.openxmlformats.org/presentationml/2006/main" matchingName="Title and two columns" type="twoColTx">
   <p:cSld name="TITLE_AND_TWO_COLUMNS">
     <p:spTree>
       <p:nvGrpSpPr>
-        <p:cNvPr id="20" name="Shape 20"/>
+        <p:cNvPr id="1" name="Shape 20"/>
         <p:cNvGrpSpPr/>
         <p:nvPr/>
       </p:nvGrpSpPr>
@@ -3005,7 +3101,9 @@
       <p:sp>
         <p:nvSpPr>
           <p:cNvPr id="21" name="Google Shape;21;p5"/>
-          <p:cNvSpPr txBox="1"/>
+          <p:cNvSpPr txBox="1">
+            <a:spLocks noGrp="1"/>
+          </p:cNvSpPr>
           <p:nvPr>
             <p:ph type="title"/>
           </p:nvPr>
@@ -3020,7 +3118,7 @@
           </a:prstGeom>
         </p:spPr>
         <p:txBody>
-          <a:bodyPr anchorCtr="0" anchor="t" bIns="91425" lIns="91425" spcFirstLastPara="1" rIns="91425" wrap="square" tIns="91425"/>
+          <a:bodyPr spcFirstLastPara="1" wrap="square" lIns="91425" tIns="91425" rIns="91425" bIns="91425" anchor="t" anchorCtr="0"/>
           <a:lstStyle>
             <a:lvl1pPr lvl="0">
               <a:spcBef>
@@ -3122,15 +3220,19 @@
               <a:defRPr/>
             </a:lvl9pPr>
           </a:lstStyle>
-          <a:p/>
+          <a:p>
+            <a:endParaRPr/>
+          </a:p>
         </p:txBody>
       </p:sp>
       <p:sp>
         <p:nvSpPr>
           <p:cNvPr id="22" name="Google Shape;22;p5"/>
-          <p:cNvSpPr txBox="1"/>
+          <p:cNvSpPr txBox="1">
+            <a:spLocks noGrp="1"/>
+          </p:cNvSpPr>
           <p:nvPr>
-            <p:ph idx="1" type="body"/>
+            <p:ph type="body" idx="1"/>
           </p:nvPr>
         </p:nvSpPr>
         <p:spPr>
@@ -3143,9 +3245,9 @@
           </a:prstGeom>
         </p:spPr>
         <p:txBody>
-          <a:bodyPr anchorCtr="0" anchor="t" bIns="91425" lIns="91425" spcFirstLastPara="1" rIns="91425" wrap="square" tIns="91425"/>
+          <a:bodyPr spcFirstLastPara="1" wrap="square" lIns="91425" tIns="91425" rIns="91425" bIns="91425" anchor="t" anchorCtr="0"/>
           <a:lstStyle>
-            <a:lvl1pPr indent="-317500" lvl="0" marL="457200">
+            <a:lvl1pPr marL="457200" lvl="0" indent="-317500">
               <a:spcBef>
                 <a:spcPts val="0"/>
               </a:spcBef>
@@ -3156,7 +3258,7 @@
               <a:buChar char="●"/>
               <a:defRPr sz="1400"/>
             </a:lvl1pPr>
-            <a:lvl2pPr indent="-304800" lvl="1" marL="914400">
+            <a:lvl2pPr marL="914400" lvl="1" indent="-304800">
               <a:spcBef>
                 <a:spcPts val="1600"/>
               </a:spcBef>
@@ -3167,7 +3269,7 @@
               <a:buChar char="○"/>
               <a:defRPr sz="1200"/>
             </a:lvl2pPr>
-            <a:lvl3pPr indent="-304800" lvl="2" marL="1371600">
+            <a:lvl3pPr marL="1371600" lvl="2" indent="-304800">
               <a:spcBef>
                 <a:spcPts val="1600"/>
               </a:spcBef>
@@ -3178,7 +3280,7 @@
               <a:buChar char="■"/>
               <a:defRPr sz="1200"/>
             </a:lvl3pPr>
-            <a:lvl4pPr indent="-304800" lvl="3" marL="1828800">
+            <a:lvl4pPr marL="1828800" lvl="3" indent="-304800">
               <a:spcBef>
                 <a:spcPts val="1600"/>
               </a:spcBef>
@@ -3189,7 +3291,7 @@
               <a:buChar char="●"/>
               <a:defRPr sz="1200"/>
             </a:lvl4pPr>
-            <a:lvl5pPr indent="-304800" lvl="4" marL="2286000">
+            <a:lvl5pPr marL="2286000" lvl="4" indent="-304800">
               <a:spcBef>
                 <a:spcPts val="1600"/>
               </a:spcBef>
@@ -3200,7 +3302,7 @@
               <a:buChar char="○"/>
               <a:defRPr sz="1200"/>
             </a:lvl5pPr>
-            <a:lvl6pPr indent="-304800" lvl="5" marL="2743200">
+            <a:lvl6pPr marL="2743200" lvl="5" indent="-304800">
               <a:spcBef>
                 <a:spcPts val="1600"/>
               </a:spcBef>
@@ -3211,7 +3313,7 @@
               <a:buChar char="■"/>
               <a:defRPr sz="1200"/>
             </a:lvl6pPr>
-            <a:lvl7pPr indent="-304800" lvl="6" marL="3200400">
+            <a:lvl7pPr marL="3200400" lvl="6" indent="-304800">
               <a:spcBef>
                 <a:spcPts val="1600"/>
               </a:spcBef>
@@ -3222,7 +3324,7 @@
               <a:buChar char="●"/>
               <a:defRPr sz="1200"/>
             </a:lvl7pPr>
-            <a:lvl8pPr indent="-304800" lvl="7" marL="3657600">
+            <a:lvl8pPr marL="3657600" lvl="7" indent="-304800">
               <a:spcBef>
                 <a:spcPts val="1600"/>
               </a:spcBef>
@@ -3233,7 +3335,7 @@
               <a:buChar char="○"/>
               <a:defRPr sz="1200"/>
             </a:lvl8pPr>
-            <a:lvl9pPr indent="-304800" lvl="8" marL="4114800">
+            <a:lvl9pPr marL="4114800" lvl="8" indent="-304800">
               <a:spcBef>
                 <a:spcPts val="1600"/>
               </a:spcBef>
@@ -3245,15 +3347,19 @@
               <a:defRPr sz="1200"/>
             </a:lvl9pPr>
           </a:lstStyle>
-          <a:p/>
+          <a:p>
+            <a:endParaRPr/>
+          </a:p>
         </p:txBody>
       </p:sp>
       <p:sp>
         <p:nvSpPr>
           <p:cNvPr id="23" name="Google Shape;23;p5"/>
-          <p:cNvSpPr txBox="1"/>
+          <p:cNvSpPr txBox="1">
+            <a:spLocks noGrp="1"/>
+          </p:cNvSpPr>
           <p:nvPr>
-            <p:ph idx="2" type="body"/>
+            <p:ph type="body" idx="2"/>
           </p:nvPr>
         </p:nvSpPr>
         <p:spPr>
@@ -3266,9 +3372,9 @@
           </a:prstGeom>
         </p:spPr>
         <p:txBody>
-          <a:bodyPr anchorCtr="0" anchor="t" bIns="91425" lIns="91425" spcFirstLastPara="1" rIns="91425" wrap="square" tIns="91425"/>
+          <a:bodyPr spcFirstLastPara="1" wrap="square" lIns="91425" tIns="91425" rIns="91425" bIns="91425" anchor="t" anchorCtr="0"/>
           <a:lstStyle>
-            <a:lvl1pPr indent="-317500" lvl="0" marL="457200">
+            <a:lvl1pPr marL="457200" lvl="0" indent="-317500">
               <a:spcBef>
                 <a:spcPts val="0"/>
               </a:spcBef>
@@ -3279,7 +3385,7 @@
               <a:buChar char="●"/>
               <a:defRPr sz="1400"/>
             </a:lvl1pPr>
-            <a:lvl2pPr indent="-304800" lvl="1" marL="914400">
+            <a:lvl2pPr marL="914400" lvl="1" indent="-304800">
               <a:spcBef>
                 <a:spcPts val="1600"/>
               </a:spcBef>
@@ -3290,7 +3396,7 @@
               <a:buChar char="○"/>
               <a:defRPr sz="1200"/>
             </a:lvl2pPr>
-            <a:lvl3pPr indent="-304800" lvl="2" marL="1371600">
+            <a:lvl3pPr marL="1371600" lvl="2" indent="-304800">
               <a:spcBef>
                 <a:spcPts val="1600"/>
               </a:spcBef>
@@ -3301,7 +3407,7 @@
               <a:buChar char="■"/>
               <a:defRPr sz="1200"/>
             </a:lvl3pPr>
-            <a:lvl4pPr indent="-304800" lvl="3" marL="1828800">
+            <a:lvl4pPr marL="1828800" lvl="3" indent="-304800">
               <a:spcBef>
                 <a:spcPts val="1600"/>
               </a:spcBef>
@@ -3312,7 +3418,7 @@
               <a:buChar char="●"/>
               <a:defRPr sz="1200"/>
             </a:lvl4pPr>
-            <a:lvl5pPr indent="-304800" lvl="4" marL="2286000">
+            <a:lvl5pPr marL="2286000" lvl="4" indent="-304800">
               <a:spcBef>
                 <a:spcPts val="1600"/>
               </a:spcBef>
@@ -3323,7 +3429,7 @@
               <a:buChar char="○"/>
               <a:defRPr sz="1200"/>
             </a:lvl5pPr>
-            <a:lvl6pPr indent="-304800" lvl="5" marL="2743200">
+            <a:lvl6pPr marL="2743200" lvl="5" indent="-304800">
               <a:spcBef>
                 <a:spcPts val="1600"/>
               </a:spcBef>
@@ -3334,7 +3440,7 @@
               <a:buChar char="■"/>
               <a:defRPr sz="1200"/>
             </a:lvl6pPr>
-            <a:lvl7pPr indent="-304800" lvl="6" marL="3200400">
+            <a:lvl7pPr marL="3200400" lvl="6" indent="-304800">
               <a:spcBef>
                 <a:spcPts val="1600"/>
               </a:spcBef>
@@ -3345,7 +3451,7 @@
               <a:buChar char="●"/>
               <a:defRPr sz="1200"/>
             </a:lvl7pPr>
-            <a:lvl8pPr indent="-304800" lvl="7" marL="3657600">
+            <a:lvl8pPr marL="3657600" lvl="7" indent="-304800">
               <a:spcBef>
                 <a:spcPts val="1600"/>
               </a:spcBef>
@@ -3356,7 +3462,7 @@
               <a:buChar char="○"/>
               <a:defRPr sz="1200"/>
             </a:lvl8pPr>
-            <a:lvl9pPr indent="-304800" lvl="8" marL="4114800">
+            <a:lvl9pPr marL="4114800" lvl="8" indent="-304800">
               <a:spcBef>
                 <a:spcPts val="1600"/>
               </a:spcBef>
@@ -3368,15 +3474,19 @@
               <a:defRPr sz="1200"/>
             </a:lvl9pPr>
           </a:lstStyle>
-          <a:p/>
+          <a:p>
+            <a:endParaRPr/>
+          </a:p>
         </p:txBody>
       </p:sp>
       <p:sp>
         <p:nvSpPr>
           <p:cNvPr id="24" name="Google Shape;24;p5"/>
-          <p:cNvSpPr txBox="1"/>
+          <p:cNvSpPr txBox="1">
+            <a:spLocks noGrp="1"/>
+          </p:cNvSpPr>
           <p:nvPr>
-            <p:ph idx="12" type="sldNum"/>
+            <p:ph type="sldNum" idx="12"/>
           </p:nvPr>
         </p:nvSpPr>
         <p:spPr>
@@ -3389,7 +3499,7 @@
           </a:prstGeom>
         </p:spPr>
         <p:txBody>
-          <a:bodyPr anchorCtr="0" anchor="ctr" bIns="91425" lIns="91425" spcFirstLastPara="1" rIns="91425" wrap="square" tIns="91425">
+          <a:bodyPr spcFirstLastPara="1" wrap="square" lIns="91425" tIns="91425" rIns="91425" bIns="91425" anchor="ctr" anchorCtr="0">
             <a:noAutofit/>
           </a:bodyPr>
           <a:lstStyle>
@@ -3431,7 +3541,7 @@
             </a:lvl9pPr>
           </a:lstStyle>
           <a:p>
-            <a:pPr indent="0" lvl="0" marL="0" rtl="0" algn="r">
+            <a:pPr marL="0" lvl="0" indent="0" algn="r" rtl="0">
               <a:spcBef>
                 <a:spcPts val="0"/>
               </a:spcBef>
@@ -3457,11 +3567,11 @@
 </file>
 
 <file path=ppt/slideLayouts/slideLayout5.xml><?xml version="1.0" encoding="utf-8"?>
-<p:sldLayout xmlns:a="http://schemas.openxmlformats.org/drawingml/2006/main" xmlns:r="http://schemas.openxmlformats.org/officeDocument/2006/relationships" xmlns:mc="http://schemas.openxmlformats.org/markup-compatibility/2006" xmlns:mv="urn:schemas-microsoft-com:mac:vml" xmlns:p="http://schemas.openxmlformats.org/presentationml/2006/main" xmlns:c="http://schemas.openxmlformats.org/drawingml/2006/chart" xmlns:dgm="http://schemas.openxmlformats.org/drawingml/2006/diagram" xmlns:o="urn:schemas-microsoft-com:office:office" xmlns:v="urn:schemas-microsoft-com:vml" xmlns:pvml="urn:schemas-microsoft-com:office:powerpoint" xmlns:com="http://schemas.openxmlformats.org/drawingml/2006/compatibility" xmlns:p14="http://schemas.microsoft.com/office/powerpoint/2010/main" xmlns:p15="http://schemas.microsoft.com/office/powerpoint/2012/main" matchingName="Title only" type="titleOnly">
+<p:sldLayout xmlns:a="http://schemas.openxmlformats.org/drawingml/2006/main" xmlns:r="http://schemas.openxmlformats.org/officeDocument/2006/relationships" xmlns:p="http://schemas.openxmlformats.org/presentationml/2006/main" matchingName="Title only" type="titleOnly">
   <p:cSld name="TITLE_ONLY">
     <p:spTree>
       <p:nvGrpSpPr>
-        <p:cNvPr id="25" name="Shape 25"/>
+        <p:cNvPr id="1" name="Shape 25"/>
         <p:cNvGrpSpPr/>
         <p:nvPr/>
       </p:nvGrpSpPr>
@@ -3476,7 +3586,9 @@
       <p:sp>
         <p:nvSpPr>
           <p:cNvPr id="26" name="Google Shape;26;p6"/>
-          <p:cNvSpPr txBox="1"/>
+          <p:cNvSpPr txBox="1">
+            <a:spLocks noGrp="1"/>
+          </p:cNvSpPr>
           <p:nvPr>
             <p:ph type="title"/>
           </p:nvPr>
@@ -3491,7 +3603,7 @@
           </a:prstGeom>
         </p:spPr>
         <p:txBody>
-          <a:bodyPr anchorCtr="0" anchor="t" bIns="91425" lIns="91425" spcFirstLastPara="1" rIns="91425" wrap="square" tIns="91425"/>
+          <a:bodyPr spcFirstLastPara="1" wrap="square" lIns="91425" tIns="91425" rIns="91425" bIns="91425" anchor="t" anchorCtr="0"/>
           <a:lstStyle>
             <a:lvl1pPr lvl="0">
               <a:spcBef>
@@ -3593,15 +3705,19 @@
               <a:defRPr/>
             </a:lvl9pPr>
           </a:lstStyle>
-          <a:p/>
+          <a:p>
+            <a:endParaRPr/>
+          </a:p>
         </p:txBody>
       </p:sp>
       <p:sp>
         <p:nvSpPr>
           <p:cNvPr id="27" name="Google Shape;27;p6"/>
-          <p:cNvSpPr txBox="1"/>
+          <p:cNvSpPr txBox="1">
+            <a:spLocks noGrp="1"/>
+          </p:cNvSpPr>
           <p:nvPr>
-            <p:ph idx="12" type="sldNum"/>
+            <p:ph type="sldNum" idx="12"/>
           </p:nvPr>
         </p:nvSpPr>
         <p:spPr>
@@ -3614,7 +3730,7 @@
           </a:prstGeom>
         </p:spPr>
         <p:txBody>
-          <a:bodyPr anchorCtr="0" anchor="ctr" bIns="91425" lIns="91425" spcFirstLastPara="1" rIns="91425" wrap="square" tIns="91425">
+          <a:bodyPr spcFirstLastPara="1" wrap="square" lIns="91425" tIns="91425" rIns="91425" bIns="91425" anchor="ctr" anchorCtr="0">
             <a:noAutofit/>
           </a:bodyPr>
           <a:lstStyle>
@@ -3656,7 +3772,7 @@
             </a:lvl9pPr>
           </a:lstStyle>
           <a:p>
-            <a:pPr indent="0" lvl="0" marL="0" rtl="0" algn="r">
+            <a:pPr marL="0" lvl="0" indent="0" algn="r" rtl="0">
               <a:spcBef>
                 <a:spcPts val="0"/>
               </a:spcBef>
@@ -3682,11 +3798,11 @@
 </file>
 
 <file path=ppt/slideLayouts/slideLayout6.xml><?xml version="1.0" encoding="utf-8"?>
-<p:sldLayout xmlns:a="http://schemas.openxmlformats.org/drawingml/2006/main" xmlns:r="http://schemas.openxmlformats.org/officeDocument/2006/relationships" xmlns:mc="http://schemas.openxmlformats.org/markup-compatibility/2006" xmlns:mv="urn:schemas-microsoft-com:mac:vml" xmlns:p="http://schemas.openxmlformats.org/presentationml/2006/main" xmlns:c="http://schemas.openxmlformats.org/drawingml/2006/chart" xmlns:dgm="http://schemas.openxmlformats.org/drawingml/2006/diagram" xmlns:o="urn:schemas-microsoft-com:office:office" xmlns:v="urn:schemas-microsoft-com:vml" xmlns:pvml="urn:schemas-microsoft-com:office:powerpoint" xmlns:com="http://schemas.openxmlformats.org/drawingml/2006/compatibility" xmlns:p14="http://schemas.microsoft.com/office/powerpoint/2010/main" xmlns:p15="http://schemas.microsoft.com/office/powerpoint/2012/main" matchingName="One column text">
+<p:sldLayout xmlns:a="http://schemas.openxmlformats.org/drawingml/2006/main" xmlns:r="http://schemas.openxmlformats.org/officeDocument/2006/relationships" xmlns:p="http://schemas.openxmlformats.org/presentationml/2006/main" matchingName="One column text">
   <p:cSld name="ONE_COLUMN_TEXT">
     <p:spTree>
       <p:nvGrpSpPr>
-        <p:cNvPr id="28" name="Shape 28"/>
+        <p:cNvPr id="1" name="Shape 28"/>
         <p:cNvGrpSpPr/>
         <p:nvPr/>
       </p:nvGrpSpPr>
@@ -3701,7 +3817,9 @@
       <p:sp>
         <p:nvSpPr>
           <p:cNvPr id="29" name="Google Shape;29;p7"/>
-          <p:cNvSpPr txBox="1"/>
+          <p:cNvSpPr txBox="1">
+            <a:spLocks noGrp="1"/>
+          </p:cNvSpPr>
           <p:nvPr>
             <p:ph type="title"/>
           </p:nvPr>
@@ -3716,7 +3834,7 @@
           </a:prstGeom>
         </p:spPr>
         <p:txBody>
-          <a:bodyPr anchorCtr="0" anchor="b" bIns="91425" lIns="91425" spcFirstLastPara="1" rIns="91425" wrap="square" tIns="91425"/>
+          <a:bodyPr spcFirstLastPara="1" wrap="square" lIns="91425" tIns="91425" rIns="91425" bIns="91425" anchor="b" anchorCtr="0"/>
           <a:lstStyle>
             <a:lvl1pPr lvl="0">
               <a:spcBef>
@@ -3818,15 +3936,19 @@
               <a:defRPr sz="2400"/>
             </a:lvl9pPr>
           </a:lstStyle>
-          <a:p/>
+          <a:p>
+            <a:endParaRPr/>
+          </a:p>
         </p:txBody>
       </p:sp>
       <p:sp>
         <p:nvSpPr>
           <p:cNvPr id="30" name="Google Shape;30;p7"/>
-          <p:cNvSpPr txBox="1"/>
+          <p:cNvSpPr txBox="1">
+            <a:spLocks noGrp="1"/>
+          </p:cNvSpPr>
           <p:nvPr>
-            <p:ph idx="1" type="body"/>
+            <p:ph type="body" idx="1"/>
           </p:nvPr>
         </p:nvSpPr>
         <p:spPr>
@@ -3839,9 +3961,9 @@
           </a:prstGeom>
         </p:spPr>
         <p:txBody>
-          <a:bodyPr anchorCtr="0" anchor="t" bIns="91425" lIns="91425" spcFirstLastPara="1" rIns="91425" wrap="square" tIns="91425"/>
+          <a:bodyPr spcFirstLastPara="1" wrap="square" lIns="91425" tIns="91425" rIns="91425" bIns="91425" anchor="t" anchorCtr="0"/>
           <a:lstStyle>
-            <a:lvl1pPr indent="-304800" lvl="0" marL="457200">
+            <a:lvl1pPr marL="457200" lvl="0" indent="-304800">
               <a:spcBef>
                 <a:spcPts val="0"/>
               </a:spcBef>
@@ -3852,7 +3974,7 @@
               <a:buChar char="●"/>
               <a:defRPr sz="1200"/>
             </a:lvl1pPr>
-            <a:lvl2pPr indent="-304800" lvl="1" marL="914400">
+            <a:lvl2pPr marL="914400" lvl="1" indent="-304800">
               <a:spcBef>
                 <a:spcPts val="1600"/>
               </a:spcBef>
@@ -3863,7 +3985,7 @@
               <a:buChar char="○"/>
               <a:defRPr sz="1200"/>
             </a:lvl2pPr>
-            <a:lvl3pPr indent="-304800" lvl="2" marL="1371600">
+            <a:lvl3pPr marL="1371600" lvl="2" indent="-304800">
               <a:spcBef>
                 <a:spcPts val="1600"/>
               </a:spcBef>
@@ -3874,7 +3996,7 @@
               <a:buChar char="■"/>
               <a:defRPr sz="1200"/>
             </a:lvl3pPr>
-            <a:lvl4pPr indent="-304800" lvl="3" marL="1828800">
+            <a:lvl4pPr marL="1828800" lvl="3" indent="-304800">
               <a:spcBef>
                 <a:spcPts val="1600"/>
               </a:spcBef>
@@ -3885,7 +4007,7 @@
               <a:buChar char="●"/>
               <a:defRPr sz="1200"/>
             </a:lvl4pPr>
-            <a:lvl5pPr indent="-304800" lvl="4" marL="2286000">
+            <a:lvl5pPr marL="2286000" lvl="4" indent="-304800">
               <a:spcBef>
                 <a:spcPts val="1600"/>
               </a:spcBef>
@@ -3896,7 +4018,7 @@
               <a:buChar char="○"/>
               <a:defRPr sz="1200"/>
             </a:lvl5pPr>
-            <a:lvl6pPr indent="-304800" lvl="5" marL="2743200">
+            <a:lvl6pPr marL="2743200" lvl="5" indent="-304800">
               <a:spcBef>
                 <a:spcPts val="1600"/>
               </a:spcBef>
@@ -3907,7 +4029,7 @@
               <a:buChar char="■"/>
               <a:defRPr sz="1200"/>
             </a:lvl6pPr>
-            <a:lvl7pPr indent="-304800" lvl="6" marL="3200400">
+            <a:lvl7pPr marL="3200400" lvl="6" indent="-304800">
               <a:spcBef>
                 <a:spcPts val="1600"/>
               </a:spcBef>
@@ -3918,7 +4040,7 @@
               <a:buChar char="●"/>
               <a:defRPr sz="1200"/>
             </a:lvl7pPr>
-            <a:lvl8pPr indent="-304800" lvl="7" marL="3657600">
+            <a:lvl8pPr marL="3657600" lvl="7" indent="-304800">
               <a:spcBef>
                 <a:spcPts val="1600"/>
               </a:spcBef>
@@ -3929,7 +4051,7 @@
               <a:buChar char="○"/>
               <a:defRPr sz="1200"/>
             </a:lvl8pPr>
-            <a:lvl9pPr indent="-304800" lvl="8" marL="4114800">
+            <a:lvl9pPr marL="4114800" lvl="8" indent="-304800">
               <a:spcBef>
                 <a:spcPts val="1600"/>
               </a:spcBef>
@@ -3941,15 +4063,19 @@
               <a:defRPr sz="1200"/>
             </a:lvl9pPr>
           </a:lstStyle>
-          <a:p/>
+          <a:p>
+            <a:endParaRPr/>
+          </a:p>
         </p:txBody>
       </p:sp>
       <p:sp>
         <p:nvSpPr>
           <p:cNvPr id="31" name="Google Shape;31;p7"/>
-          <p:cNvSpPr txBox="1"/>
+          <p:cNvSpPr txBox="1">
+            <a:spLocks noGrp="1"/>
+          </p:cNvSpPr>
           <p:nvPr>
-            <p:ph idx="12" type="sldNum"/>
+            <p:ph type="sldNum" idx="12"/>
           </p:nvPr>
         </p:nvSpPr>
         <p:spPr>
@@ -3962,7 +4088,7 @@
           </a:prstGeom>
         </p:spPr>
         <p:txBody>
-          <a:bodyPr anchorCtr="0" anchor="ctr" bIns="91425" lIns="91425" spcFirstLastPara="1" rIns="91425" wrap="square" tIns="91425">
+          <a:bodyPr spcFirstLastPara="1" wrap="square" lIns="91425" tIns="91425" rIns="91425" bIns="91425" anchor="ctr" anchorCtr="0">
             <a:noAutofit/>
           </a:bodyPr>
           <a:lstStyle>
@@ -4004,7 +4130,7 @@
             </a:lvl9pPr>
           </a:lstStyle>
           <a:p>
-            <a:pPr indent="0" lvl="0" marL="0" rtl="0" algn="r">
+            <a:pPr marL="0" lvl="0" indent="0" algn="r" rtl="0">
               <a:spcBef>
                 <a:spcPts val="0"/>
               </a:spcBef>
@@ -4030,11 +4156,11 @@
 </file>
 
 <file path=ppt/slideLayouts/slideLayout7.xml><?xml version="1.0" encoding="utf-8"?>
-<p:sldLayout xmlns:a="http://schemas.openxmlformats.org/drawingml/2006/main" xmlns:r="http://schemas.openxmlformats.org/officeDocument/2006/relationships" xmlns:mc="http://schemas.openxmlformats.org/markup-compatibility/2006" xmlns:mv="urn:schemas-microsoft-com:mac:vml" xmlns:p="http://schemas.openxmlformats.org/presentationml/2006/main" xmlns:c="http://schemas.openxmlformats.org/drawingml/2006/chart" xmlns:dgm="http://schemas.openxmlformats.org/drawingml/2006/diagram" xmlns:o="urn:schemas-microsoft-com:office:office" xmlns:v="urn:schemas-microsoft-com:vml" xmlns:pvml="urn:schemas-microsoft-com:office:powerpoint" xmlns:com="http://schemas.openxmlformats.org/drawingml/2006/compatibility" xmlns:p14="http://schemas.microsoft.com/office/powerpoint/2010/main" xmlns:p15="http://schemas.microsoft.com/office/powerpoint/2012/main" matchingName="Main point">
+<p:sldLayout xmlns:a="http://schemas.openxmlformats.org/drawingml/2006/main" xmlns:r="http://schemas.openxmlformats.org/officeDocument/2006/relationships" xmlns:p="http://schemas.openxmlformats.org/presentationml/2006/main" matchingName="Main point">
   <p:cSld name="MAIN_POINT">
     <p:spTree>
       <p:nvGrpSpPr>
-        <p:cNvPr id="32" name="Shape 32"/>
+        <p:cNvPr id="1" name="Shape 32"/>
         <p:cNvGrpSpPr/>
         <p:nvPr/>
       </p:nvGrpSpPr>
@@ -4049,7 +4175,9 @@
       <p:sp>
         <p:nvSpPr>
           <p:cNvPr id="33" name="Google Shape;33;p8"/>
-          <p:cNvSpPr txBox="1"/>
+          <p:cNvSpPr txBox="1">
+            <a:spLocks noGrp="1"/>
+          </p:cNvSpPr>
           <p:nvPr>
             <p:ph type="title"/>
           </p:nvPr>
@@ -4064,7 +4192,7 @@
           </a:prstGeom>
         </p:spPr>
         <p:txBody>
-          <a:bodyPr anchorCtr="0" anchor="ctr" bIns="91425" lIns="91425" spcFirstLastPara="1" rIns="91425" wrap="square" tIns="91425"/>
+          <a:bodyPr spcFirstLastPara="1" wrap="square" lIns="91425" tIns="91425" rIns="91425" bIns="91425" anchor="ctr" anchorCtr="0"/>
           <a:lstStyle>
             <a:lvl1pPr lvl="0">
               <a:spcBef>
@@ -4166,15 +4294,19 @@
               <a:defRPr sz="4800"/>
             </a:lvl9pPr>
           </a:lstStyle>
-          <a:p/>
+          <a:p>
+            <a:endParaRPr/>
+          </a:p>
         </p:txBody>
       </p:sp>
       <p:sp>
         <p:nvSpPr>
           <p:cNvPr id="34" name="Google Shape;34;p8"/>
-          <p:cNvSpPr txBox="1"/>
+          <p:cNvSpPr txBox="1">
+            <a:spLocks noGrp="1"/>
+          </p:cNvSpPr>
           <p:nvPr>
-            <p:ph idx="12" type="sldNum"/>
+            <p:ph type="sldNum" idx="12"/>
           </p:nvPr>
         </p:nvSpPr>
         <p:spPr>
@@ -4187,7 +4319,7 @@
           </a:prstGeom>
         </p:spPr>
         <p:txBody>
-          <a:bodyPr anchorCtr="0" anchor="ctr" bIns="91425" lIns="91425" spcFirstLastPara="1" rIns="91425" wrap="square" tIns="91425">
+          <a:bodyPr spcFirstLastPara="1" wrap="square" lIns="91425" tIns="91425" rIns="91425" bIns="91425" anchor="ctr" anchorCtr="0">
             <a:noAutofit/>
           </a:bodyPr>
           <a:lstStyle>
@@ -4229,7 +4361,7 @@
             </a:lvl9pPr>
           </a:lstStyle>
           <a:p>
-            <a:pPr indent="0" lvl="0" marL="0" rtl="0" algn="r">
+            <a:pPr marL="0" lvl="0" indent="0" algn="r" rtl="0">
               <a:spcBef>
                 <a:spcPts val="0"/>
               </a:spcBef>
@@ -4255,11 +4387,11 @@
 </file>
 
 <file path=ppt/slideLayouts/slideLayout8.xml><?xml version="1.0" encoding="utf-8"?>
-<p:sldLayout xmlns:a="http://schemas.openxmlformats.org/drawingml/2006/main" xmlns:r="http://schemas.openxmlformats.org/officeDocument/2006/relationships" xmlns:mc="http://schemas.openxmlformats.org/markup-compatibility/2006" xmlns:mv="urn:schemas-microsoft-com:mac:vml" xmlns:p="http://schemas.openxmlformats.org/presentationml/2006/main" xmlns:c="http://schemas.openxmlformats.org/drawingml/2006/chart" xmlns:dgm="http://schemas.openxmlformats.org/drawingml/2006/diagram" xmlns:o="urn:schemas-microsoft-com:office:office" xmlns:v="urn:schemas-microsoft-com:vml" xmlns:pvml="urn:schemas-microsoft-com:office:powerpoint" xmlns:com="http://schemas.openxmlformats.org/drawingml/2006/compatibility" xmlns:p14="http://schemas.microsoft.com/office/powerpoint/2010/main" xmlns:p15="http://schemas.microsoft.com/office/powerpoint/2012/main" matchingName="Section title and description">
+<p:sldLayout xmlns:a="http://schemas.openxmlformats.org/drawingml/2006/main" xmlns:r="http://schemas.openxmlformats.org/officeDocument/2006/relationships" xmlns:p="http://schemas.openxmlformats.org/presentationml/2006/main" matchingName="Section title and description">
   <p:cSld name="SECTION_TITLE_AND_DESCRIPTION">
     <p:spTree>
       <p:nvGrpSpPr>
-        <p:cNvPr id="35" name="Shape 35"/>
+        <p:cNvPr id="1" name="Shape 35"/>
         <p:cNvGrpSpPr/>
         <p:nvPr/>
       </p:nvGrpSpPr>
@@ -4293,12 +4425,12 @@
           </a:ln>
         </p:spPr>
         <p:txBody>
-          <a:bodyPr anchorCtr="0" anchor="ctr" bIns="91425" lIns="91425" spcFirstLastPara="1" rIns="91425" wrap="square" tIns="91425">
+          <a:bodyPr spcFirstLastPara="1" wrap="square" lIns="91425" tIns="91425" rIns="91425" bIns="91425" anchor="ctr" anchorCtr="0">
             <a:noAutofit/>
           </a:bodyPr>
           <a:lstStyle/>
           <a:p>
-            <a:pPr indent="0" lvl="0" marL="0" rtl="0" algn="l">
+            <a:pPr marL="0" lvl="0" indent="0" algn="l" rtl="0">
               <a:spcBef>
                 <a:spcPts val="0"/>
               </a:spcBef>
@@ -4307,9 +4439,6 @@
               </a:spcAft>
               <a:buNone/>
             </a:pPr>
-            <a:r>
-              <a:t/>
-            </a:r>
             <a:endParaRPr/>
           </a:p>
         </p:txBody>
@@ -4317,7 +4446,9 @@
       <p:sp>
         <p:nvSpPr>
           <p:cNvPr id="37" name="Google Shape;37;p9"/>
-          <p:cNvSpPr txBox="1"/>
+          <p:cNvSpPr txBox="1">
+            <a:spLocks noGrp="1"/>
+          </p:cNvSpPr>
           <p:nvPr>
             <p:ph type="title"/>
           </p:nvPr>
@@ -4332,7 +4463,7 @@
           </a:prstGeom>
         </p:spPr>
         <p:txBody>
-          <a:bodyPr anchorCtr="0" anchor="b" bIns="91425" lIns="91425" spcFirstLastPara="1" rIns="91425" wrap="square" tIns="91425"/>
+          <a:bodyPr spcFirstLastPara="1" wrap="square" lIns="91425" tIns="91425" rIns="91425" bIns="91425" anchor="b" anchorCtr="0"/>
           <a:lstStyle>
             <a:lvl1pPr lvl="0" algn="ctr">
               <a:spcBef>
@@ -4434,15 +4565,19 @@
               <a:defRPr sz="4200"/>
             </a:lvl9pPr>
           </a:lstStyle>
-          <a:p/>
+          <a:p>
+            <a:endParaRPr/>
+          </a:p>
         </p:txBody>
       </p:sp>
       <p:sp>
         <p:nvSpPr>
           <p:cNvPr id="38" name="Google Shape;38;p9"/>
-          <p:cNvSpPr txBox="1"/>
+          <p:cNvSpPr txBox="1">
+            <a:spLocks noGrp="1"/>
+          </p:cNvSpPr>
           <p:nvPr>
-            <p:ph idx="1" type="subTitle"/>
+            <p:ph type="subTitle" idx="1"/>
           </p:nvPr>
         </p:nvSpPr>
         <p:spPr>
@@ -4455,7 +4590,7 @@
           </a:prstGeom>
         </p:spPr>
         <p:txBody>
-          <a:bodyPr anchorCtr="0" anchor="t" bIns="91425" lIns="91425" spcFirstLastPara="1" rIns="91425" wrap="square" tIns="91425"/>
+          <a:bodyPr spcFirstLastPara="1" wrap="square" lIns="91425" tIns="91425" rIns="91425" bIns="91425" anchor="t" anchorCtr="0"/>
           <a:lstStyle>
             <a:lvl1pPr lvl="0" algn="ctr">
               <a:lnSpc>
@@ -4584,15 +4719,19 @@
               <a:defRPr sz="2100"/>
             </a:lvl9pPr>
           </a:lstStyle>
-          <a:p/>
+          <a:p>
+            <a:endParaRPr/>
+          </a:p>
         </p:txBody>
       </p:sp>
       <p:sp>
         <p:nvSpPr>
           <p:cNvPr id="39" name="Google Shape;39;p9"/>
-          <p:cNvSpPr txBox="1"/>
+          <p:cNvSpPr txBox="1">
+            <a:spLocks noGrp="1"/>
+          </p:cNvSpPr>
           <p:nvPr>
-            <p:ph idx="2" type="body"/>
+            <p:ph type="body" idx="2"/>
           </p:nvPr>
         </p:nvSpPr>
         <p:spPr>
@@ -4605,9 +4744,9 @@
           </a:prstGeom>
         </p:spPr>
         <p:txBody>
-          <a:bodyPr anchorCtr="0" anchor="ctr" bIns="91425" lIns="91425" spcFirstLastPara="1" rIns="91425" wrap="square" tIns="91425"/>
+          <a:bodyPr spcFirstLastPara="1" wrap="square" lIns="91425" tIns="91425" rIns="91425" bIns="91425" anchor="ctr" anchorCtr="0"/>
           <a:lstStyle>
-            <a:lvl1pPr indent="-342900" lvl="0" marL="457200">
+            <a:lvl1pPr marL="457200" lvl="0" indent="-342900">
               <a:spcBef>
                 <a:spcPts val="0"/>
               </a:spcBef>
@@ -4625,7 +4764,7 @@
                 </a:solidFill>
               </a:defRPr>
             </a:lvl1pPr>
-            <a:lvl2pPr indent="-317500" lvl="1" marL="914400">
+            <a:lvl2pPr marL="914400" lvl="1" indent="-317500">
               <a:spcBef>
                 <a:spcPts val="1600"/>
               </a:spcBef>
@@ -4643,7 +4782,7 @@
                 </a:solidFill>
               </a:defRPr>
             </a:lvl2pPr>
-            <a:lvl3pPr indent="-317500" lvl="2" marL="1371600">
+            <a:lvl3pPr marL="1371600" lvl="2" indent="-317500">
               <a:spcBef>
                 <a:spcPts val="1600"/>
               </a:spcBef>
@@ -4661,7 +4800,7 @@
                 </a:solidFill>
               </a:defRPr>
             </a:lvl3pPr>
-            <a:lvl4pPr indent="-317500" lvl="3" marL="1828800">
+            <a:lvl4pPr marL="1828800" lvl="3" indent="-317500">
               <a:spcBef>
                 <a:spcPts val="1600"/>
               </a:spcBef>
@@ -4679,7 +4818,7 @@
                 </a:solidFill>
               </a:defRPr>
             </a:lvl4pPr>
-            <a:lvl5pPr indent="-317500" lvl="4" marL="2286000">
+            <a:lvl5pPr marL="2286000" lvl="4" indent="-317500">
               <a:spcBef>
                 <a:spcPts val="1600"/>
               </a:spcBef>
@@ -4697,7 +4836,7 @@
                 </a:solidFill>
               </a:defRPr>
             </a:lvl5pPr>
-            <a:lvl6pPr indent="-317500" lvl="5" marL="2743200">
+            <a:lvl6pPr marL="2743200" lvl="5" indent="-317500">
               <a:spcBef>
                 <a:spcPts val="1600"/>
               </a:spcBef>
@@ -4715,7 +4854,7 @@
                 </a:solidFill>
               </a:defRPr>
             </a:lvl6pPr>
-            <a:lvl7pPr indent="-317500" lvl="6" marL="3200400">
+            <a:lvl7pPr marL="3200400" lvl="6" indent="-317500">
               <a:spcBef>
                 <a:spcPts val="1600"/>
               </a:spcBef>
@@ -4733,7 +4872,7 @@
                 </a:solidFill>
               </a:defRPr>
             </a:lvl7pPr>
-            <a:lvl8pPr indent="-317500" lvl="7" marL="3657600">
+            <a:lvl8pPr marL="3657600" lvl="7" indent="-317500">
               <a:spcBef>
                 <a:spcPts val="1600"/>
               </a:spcBef>
@@ -4751,7 +4890,7 @@
                 </a:solidFill>
               </a:defRPr>
             </a:lvl8pPr>
-            <a:lvl9pPr indent="-317500" lvl="8" marL="4114800">
+            <a:lvl9pPr marL="4114800" lvl="8" indent="-317500">
               <a:spcBef>
                 <a:spcPts val="1600"/>
               </a:spcBef>
@@ -4770,15 +4909,19 @@
               </a:defRPr>
             </a:lvl9pPr>
           </a:lstStyle>
-          <a:p/>
+          <a:p>
+            <a:endParaRPr/>
+          </a:p>
         </p:txBody>
       </p:sp>
       <p:sp>
         <p:nvSpPr>
           <p:cNvPr id="40" name="Google Shape;40;p9"/>
-          <p:cNvSpPr txBox="1"/>
+          <p:cNvSpPr txBox="1">
+            <a:spLocks noGrp="1"/>
+          </p:cNvSpPr>
           <p:nvPr>
-            <p:ph idx="12" type="sldNum"/>
+            <p:ph type="sldNum" idx="12"/>
           </p:nvPr>
         </p:nvSpPr>
         <p:spPr>
@@ -4791,7 +4934,7 @@
           </a:prstGeom>
         </p:spPr>
         <p:txBody>
-          <a:bodyPr anchorCtr="0" anchor="ctr" bIns="91425" lIns="91425" spcFirstLastPara="1" rIns="91425" wrap="square" tIns="91425">
+          <a:bodyPr spcFirstLastPara="1" wrap="square" lIns="91425" tIns="91425" rIns="91425" bIns="91425" anchor="ctr" anchorCtr="0">
             <a:noAutofit/>
           </a:bodyPr>
           <a:lstStyle>
@@ -4833,7 +4976,7 @@
             </a:lvl9pPr>
           </a:lstStyle>
           <a:p>
-            <a:pPr indent="0" lvl="0" marL="0" rtl="0" algn="r">
+            <a:pPr marL="0" lvl="0" indent="0" algn="r" rtl="0">
               <a:spcBef>
                 <a:spcPts val="0"/>
               </a:spcBef>
@@ -4859,11 +5002,11 @@
 </file>
 
 <file path=ppt/slideLayouts/slideLayout9.xml><?xml version="1.0" encoding="utf-8"?>
-<p:sldLayout xmlns:a="http://schemas.openxmlformats.org/drawingml/2006/main" xmlns:r="http://schemas.openxmlformats.org/officeDocument/2006/relationships" xmlns:mc="http://schemas.openxmlformats.org/markup-compatibility/2006" xmlns:mv="urn:schemas-microsoft-com:mac:vml" xmlns:p="http://schemas.openxmlformats.org/presentationml/2006/main" xmlns:c="http://schemas.openxmlformats.org/drawingml/2006/chart" xmlns:dgm="http://schemas.openxmlformats.org/drawingml/2006/diagram" xmlns:o="urn:schemas-microsoft-com:office:office" xmlns:v="urn:schemas-microsoft-com:vml" xmlns:pvml="urn:schemas-microsoft-com:office:powerpoint" xmlns:com="http://schemas.openxmlformats.org/drawingml/2006/compatibility" xmlns:p14="http://schemas.microsoft.com/office/powerpoint/2010/main" xmlns:p15="http://schemas.microsoft.com/office/powerpoint/2012/main" matchingName="Caption">
+<p:sldLayout xmlns:a="http://schemas.openxmlformats.org/drawingml/2006/main" xmlns:r="http://schemas.openxmlformats.org/officeDocument/2006/relationships" xmlns:p="http://schemas.openxmlformats.org/presentationml/2006/main" matchingName="Caption">
   <p:cSld name="CAPTION_ONLY">
     <p:spTree>
       <p:nvGrpSpPr>
-        <p:cNvPr id="41" name="Shape 41"/>
+        <p:cNvPr id="1" name="Shape 41"/>
         <p:cNvGrpSpPr/>
         <p:nvPr/>
       </p:nvGrpSpPr>
@@ -4878,9 +5021,11 @@
       <p:sp>
         <p:nvSpPr>
           <p:cNvPr id="42" name="Google Shape;42;p10"/>
-          <p:cNvSpPr txBox="1"/>
+          <p:cNvSpPr txBox="1">
+            <a:spLocks noGrp="1"/>
+          </p:cNvSpPr>
           <p:nvPr>
-            <p:ph idx="1" type="body"/>
+            <p:ph type="body" idx="1"/>
           </p:nvPr>
         </p:nvSpPr>
         <p:spPr>
@@ -4893,9 +5038,9 @@
           </a:prstGeom>
         </p:spPr>
         <p:txBody>
-          <a:bodyPr anchorCtr="0" anchor="ctr" bIns="91425" lIns="91425" spcFirstLastPara="1" rIns="91425" wrap="square" tIns="91425"/>
+          <a:bodyPr spcFirstLastPara="1" wrap="square" lIns="91425" tIns="91425" rIns="91425" bIns="91425" anchor="ctr" anchorCtr="0"/>
           <a:lstStyle>
-            <a:lvl1pPr indent="-228600" lvl="0" marL="457200">
+            <a:lvl1pPr marL="457200" lvl="0" indent="-228600">
               <a:lnSpc>
                 <a:spcPct val="100000"/>
               </a:lnSpc>
@@ -4910,15 +5055,19 @@
               <a:defRPr/>
             </a:lvl1pPr>
           </a:lstStyle>
-          <a:p/>
+          <a:p>
+            <a:endParaRPr/>
+          </a:p>
         </p:txBody>
       </p:sp>
       <p:sp>
         <p:nvSpPr>
           <p:cNvPr id="43" name="Google Shape;43;p10"/>
-          <p:cNvSpPr txBox="1"/>
+          <p:cNvSpPr txBox="1">
+            <a:spLocks noGrp="1"/>
+          </p:cNvSpPr>
           <p:nvPr>
-            <p:ph idx="12" type="sldNum"/>
+            <p:ph type="sldNum" idx="12"/>
           </p:nvPr>
         </p:nvSpPr>
         <p:spPr>
@@ -4931,7 +5080,7 @@
           </a:prstGeom>
         </p:spPr>
         <p:txBody>
-          <a:bodyPr anchorCtr="0" anchor="ctr" bIns="91425" lIns="91425" spcFirstLastPara="1" rIns="91425" wrap="square" tIns="91425">
+          <a:bodyPr spcFirstLastPara="1" wrap="square" lIns="91425" tIns="91425" rIns="91425" bIns="91425" anchor="ctr" anchorCtr="0">
             <a:noAutofit/>
           </a:bodyPr>
           <a:lstStyle>
@@ -4973,7 +5122,7 @@
             </a:lvl9pPr>
           </a:lstStyle>
           <a:p>
-            <a:pPr indent="0" lvl="0" marL="0" rtl="0" algn="r">
+            <a:pPr marL="0" lvl="0" indent="0" algn="r" rtl="0">
               <a:spcBef>
                 <a:spcPts val="0"/>
               </a:spcBef>
@@ -4999,18 +5148,19 @@
 </file>
 
 <file path=ppt/slideMasters/slideMaster1.xml><?xml version="1.0" encoding="utf-8"?>
-<p:sldMaster xmlns:a="http://schemas.openxmlformats.org/drawingml/2006/main" xmlns:r="http://schemas.openxmlformats.org/officeDocument/2006/relationships" xmlns:mc="http://schemas.openxmlformats.org/markup-compatibility/2006" xmlns:mv="urn:schemas-microsoft-com:mac:vml" xmlns:p="http://schemas.openxmlformats.org/presentationml/2006/main" xmlns:c="http://schemas.openxmlformats.org/drawingml/2006/chart" xmlns:dgm="http://schemas.openxmlformats.org/drawingml/2006/diagram" xmlns:o="urn:schemas-microsoft-com:office:office" xmlns:v="urn:schemas-microsoft-com:vml" xmlns:pvml="urn:schemas-microsoft-com:office:powerpoint" xmlns:com="http://schemas.openxmlformats.org/drawingml/2006/compatibility" xmlns:p14="http://schemas.microsoft.com/office/powerpoint/2010/main" xmlns:p15="http://schemas.microsoft.com/office/powerpoint/2012/main">
+<p:sldMaster xmlns:a="http://schemas.openxmlformats.org/drawingml/2006/main" xmlns:r="http://schemas.openxmlformats.org/officeDocument/2006/relationships" xmlns:p="http://schemas.openxmlformats.org/presentationml/2006/main">
   <p:cSld name="simple-dark-2">
     <p:bg>
       <p:bgPr>
         <a:solidFill>
           <a:schemeClr val="lt1"/>
         </a:solidFill>
+        <a:effectLst/>
       </p:bgPr>
     </p:bg>
     <p:spTree>
       <p:nvGrpSpPr>
-        <p:cNvPr id="5" name="Shape 5"/>
+        <p:cNvPr id="1" name="Shape 5"/>
         <p:cNvGrpSpPr/>
         <p:nvPr/>
       </p:nvGrpSpPr>
@@ -5025,7 +5175,9 @@
       <p:sp>
         <p:nvSpPr>
           <p:cNvPr id="6" name="Google Shape;6;p1"/>
-          <p:cNvSpPr txBox="1"/>
+          <p:cNvSpPr txBox="1">
+            <a:spLocks noGrp="1"/>
+          </p:cNvSpPr>
           <p:nvPr>
             <p:ph type="title"/>
           </p:nvPr>
@@ -5044,7 +5196,7 @@
           </a:ln>
         </p:spPr>
         <p:txBody>
-          <a:bodyPr anchorCtr="0" anchor="t" bIns="91425" lIns="91425" spcFirstLastPara="1" rIns="91425" wrap="square" tIns="91425"/>
+          <a:bodyPr spcFirstLastPara="1" wrap="square" lIns="91425" tIns="91425" rIns="91425" bIns="91425" anchor="t" anchorCtr="0"/>
           <a:lstStyle>
             <a:lvl1pPr lvl="0">
               <a:spcBef>
@@ -5209,15 +5361,19 @@
               </a:defRPr>
             </a:lvl9pPr>
           </a:lstStyle>
-          <a:p/>
+          <a:p>
+            <a:endParaRPr/>
+          </a:p>
         </p:txBody>
       </p:sp>
       <p:sp>
         <p:nvSpPr>
           <p:cNvPr id="7" name="Google Shape;7;p1"/>
-          <p:cNvSpPr txBox="1"/>
+          <p:cNvSpPr txBox="1">
+            <a:spLocks noGrp="1"/>
+          </p:cNvSpPr>
           <p:nvPr>
-            <p:ph idx="1" type="body"/>
+            <p:ph type="body" idx="1"/>
           </p:nvPr>
         </p:nvSpPr>
         <p:spPr>
@@ -5234,9 +5390,9 @@
           </a:ln>
         </p:spPr>
         <p:txBody>
-          <a:bodyPr anchorCtr="0" anchor="t" bIns="91425" lIns="91425" spcFirstLastPara="1" rIns="91425" wrap="square" tIns="91425"/>
+          <a:bodyPr spcFirstLastPara="1" wrap="square" lIns="91425" tIns="91425" rIns="91425" bIns="91425" anchor="t" anchorCtr="0"/>
           <a:lstStyle>
-            <a:lvl1pPr indent="-342900" lvl="0" marL="457200">
+            <a:lvl1pPr marL="457200" lvl="0" indent="-342900">
               <a:lnSpc>
                 <a:spcPct val="115000"/>
               </a:lnSpc>
@@ -5257,7 +5413,7 @@
                 </a:solidFill>
               </a:defRPr>
             </a:lvl1pPr>
-            <a:lvl2pPr indent="-317500" lvl="1" marL="914400">
+            <a:lvl2pPr marL="914400" lvl="1" indent="-317500">
               <a:lnSpc>
                 <a:spcPct val="115000"/>
               </a:lnSpc>
@@ -5278,7 +5434,7 @@
                 </a:solidFill>
               </a:defRPr>
             </a:lvl2pPr>
-            <a:lvl3pPr indent="-317500" lvl="2" marL="1371600">
+            <a:lvl3pPr marL="1371600" lvl="2" indent="-317500">
               <a:lnSpc>
                 <a:spcPct val="115000"/>
               </a:lnSpc>
@@ -5299,7 +5455,7 @@
                 </a:solidFill>
               </a:defRPr>
             </a:lvl3pPr>
-            <a:lvl4pPr indent="-317500" lvl="3" marL="1828800">
+            <a:lvl4pPr marL="1828800" lvl="3" indent="-317500">
               <a:lnSpc>
                 <a:spcPct val="115000"/>
               </a:lnSpc>
@@ -5320,7 +5476,7 @@
                 </a:solidFill>
               </a:defRPr>
             </a:lvl4pPr>
-            <a:lvl5pPr indent="-317500" lvl="4" marL="2286000">
+            <a:lvl5pPr marL="2286000" lvl="4" indent="-317500">
               <a:lnSpc>
                 <a:spcPct val="115000"/>
               </a:lnSpc>
@@ -5341,7 +5497,7 @@
                 </a:solidFill>
               </a:defRPr>
             </a:lvl5pPr>
-            <a:lvl6pPr indent="-317500" lvl="5" marL="2743200">
+            <a:lvl6pPr marL="2743200" lvl="5" indent="-317500">
               <a:lnSpc>
                 <a:spcPct val="115000"/>
               </a:lnSpc>
@@ -5362,7 +5518,7 @@
                 </a:solidFill>
               </a:defRPr>
             </a:lvl6pPr>
-            <a:lvl7pPr indent="-317500" lvl="6" marL="3200400">
+            <a:lvl7pPr marL="3200400" lvl="6" indent="-317500">
               <a:lnSpc>
                 <a:spcPct val="115000"/>
               </a:lnSpc>
@@ -5383,7 +5539,7 @@
                 </a:solidFill>
               </a:defRPr>
             </a:lvl7pPr>
-            <a:lvl8pPr indent="-317500" lvl="7" marL="3657600">
+            <a:lvl8pPr marL="3657600" lvl="7" indent="-317500">
               <a:lnSpc>
                 <a:spcPct val="115000"/>
               </a:lnSpc>
@@ -5404,7 +5560,7 @@
                 </a:solidFill>
               </a:defRPr>
             </a:lvl8pPr>
-            <a:lvl9pPr indent="-317500" lvl="8" marL="4114800">
+            <a:lvl9pPr marL="4114800" lvl="8" indent="-317500">
               <a:lnSpc>
                 <a:spcPct val="115000"/>
               </a:lnSpc>
@@ -5426,15 +5582,19 @@
               </a:defRPr>
             </a:lvl9pPr>
           </a:lstStyle>
-          <a:p/>
+          <a:p>
+            <a:endParaRPr/>
+          </a:p>
         </p:txBody>
       </p:sp>
       <p:sp>
         <p:nvSpPr>
           <p:cNvPr id="8" name="Google Shape;8;p1"/>
-          <p:cNvSpPr txBox="1"/>
+          <p:cNvSpPr txBox="1">
+            <a:spLocks noGrp="1"/>
+          </p:cNvSpPr>
           <p:nvPr>
-            <p:ph idx="12" type="sldNum"/>
+            <p:ph type="sldNum" idx="12"/>
           </p:nvPr>
         </p:nvSpPr>
         <p:spPr>
@@ -5451,7 +5611,7 @@
           </a:ln>
         </p:spPr>
         <p:txBody>
-          <a:bodyPr anchorCtr="0" anchor="ctr" bIns="91425" lIns="91425" spcFirstLastPara="1" rIns="91425" wrap="square" tIns="91425">
+          <a:bodyPr spcFirstLastPara="1" wrap="square" lIns="91425" tIns="91425" rIns="91425" bIns="91425" anchor="ctr" anchorCtr="0">
             <a:noAutofit/>
           </a:bodyPr>
           <a:lstStyle>
@@ -5529,7 +5689,7 @@
             </a:lvl9pPr>
           </a:lstStyle>
           <a:p>
-            <a:pPr indent="0" lvl="0" marL="0" rtl="0" algn="r">
+            <a:pPr marL="0" lvl="0" indent="0" algn="r" rtl="0">
               <a:spcBef>
                 <a:spcPts val="0"/>
               </a:spcBef>
@@ -5548,7 +5708,7 @@
       </p:sp>
     </p:spTree>
   </p:cSld>
-  <p:clrMap accent1="accent1" accent2="accent2" accent3="accent3" accent4="accent4" accent5="accent5" accent6="accent6" bg1="lt1" bg2="dk2" tx1="dk1" tx2="lt2" folHlink="folHlink" hlink="hlink"/>
+  <p:clrMap bg1="lt1" tx1="dk1" bg2="dk2" tx2="lt2" accent1="accent1" accent2="accent2" accent3="accent3" accent4="accent4" accent5="accent5" accent6="accent6" hlink="hlink" folHlink="folHlink"/>
   <p:sldLayoutIdLst>
     <p:sldLayoutId id="2147483648" r:id="rId1"/>
     <p:sldLayoutId id="2147483649" r:id="rId2"/>
@@ -5562,10 +5722,10 @@
     <p:sldLayoutId id="2147483657" r:id="rId10"/>
     <p:sldLayoutId id="2147483658" r:id="rId11"/>
   </p:sldLayoutIdLst>
-  <p:hf dt="0" ftr="0" hdr="0" sldNum="0"/>
+  <p:hf sldNum="0" hdr="0" ftr="0" dt="0"/>
   <p:txStyles>
     <p:titleStyle>
-      <a:defPPr lvl="0" marR="0" rtl="0" algn="l">
+      <a:defPPr marR="0" lvl="0" algn="l" rtl="0">
         <a:lnSpc>
           <a:spcPct val="100000"/>
         </a:lnSpc>
@@ -5576,7 +5736,7 @@
           <a:spcPts val="0"/>
         </a:spcAft>
       </a:defPPr>
-      <a:lvl1pPr lvl="0" marR="0" rtl="0" algn="l">
+      <a:lvl1pPr marR="0" lvl="0" algn="l" rtl="0">
         <a:lnSpc>
           <a:spcPct val="100000"/>
         </a:lnSpc>
@@ -5590,7 +5750,7 @@
           <a:srgbClr val="000000"/>
         </a:buClr>
         <a:buFont typeface="Arial"/>
-        <a:defRPr b="0" i="0" sz="1400" u="none" cap="none" strike="noStrike">
+        <a:defRPr sz="1400" b="0" i="0" u="none" strike="noStrike" cap="none">
           <a:solidFill>
             <a:srgbClr val="000000"/>
           </a:solidFill>
@@ -5600,7 +5760,7 @@
           <a:sym typeface="Arial"/>
         </a:defRPr>
       </a:lvl1pPr>
-      <a:lvl2pPr lvl="1" marR="0" rtl="0" algn="l">
+      <a:lvl2pPr marR="0" lvl="1" algn="l" rtl="0">
         <a:lnSpc>
           <a:spcPct val="100000"/>
         </a:lnSpc>
@@ -5614,7 +5774,7 @@
           <a:srgbClr val="000000"/>
         </a:buClr>
         <a:buFont typeface="Arial"/>
-        <a:defRPr b="0" i="0" sz="1400" u="none" cap="none" strike="noStrike">
+        <a:defRPr sz="1400" b="0" i="0" u="none" strike="noStrike" cap="none">
           <a:solidFill>
             <a:srgbClr val="000000"/>
           </a:solidFill>
@@ -5624,7 +5784,7 @@
           <a:sym typeface="Arial"/>
         </a:defRPr>
       </a:lvl2pPr>
-      <a:lvl3pPr lvl="2" marR="0" rtl="0" algn="l">
+      <a:lvl3pPr marR="0" lvl="2" algn="l" rtl="0">
         <a:lnSpc>
           <a:spcPct val="100000"/>
         </a:lnSpc>
@@ -5638,7 +5798,7 @@
           <a:srgbClr val="000000"/>
         </a:buClr>
         <a:buFont typeface="Arial"/>
-        <a:defRPr b="0" i="0" sz="1400" u="none" cap="none" strike="noStrike">
+        <a:defRPr sz="1400" b="0" i="0" u="none" strike="noStrike" cap="none">
           <a:solidFill>
             <a:srgbClr val="000000"/>
           </a:solidFill>
@@ -5648,7 +5808,7 @@
           <a:sym typeface="Arial"/>
         </a:defRPr>
       </a:lvl3pPr>
-      <a:lvl4pPr lvl="3" marR="0" rtl="0" algn="l">
+      <a:lvl4pPr marR="0" lvl="3" algn="l" rtl="0">
         <a:lnSpc>
           <a:spcPct val="100000"/>
         </a:lnSpc>
@@ -5662,7 +5822,7 @@
           <a:srgbClr val="000000"/>
         </a:buClr>
         <a:buFont typeface="Arial"/>
-        <a:defRPr b="0" i="0" sz="1400" u="none" cap="none" strike="noStrike">
+        <a:defRPr sz="1400" b="0" i="0" u="none" strike="noStrike" cap="none">
           <a:solidFill>
             <a:srgbClr val="000000"/>
           </a:solidFill>
@@ -5672,7 +5832,7 @@
           <a:sym typeface="Arial"/>
         </a:defRPr>
       </a:lvl4pPr>
-      <a:lvl5pPr lvl="4" marR="0" rtl="0" algn="l">
+      <a:lvl5pPr marR="0" lvl="4" algn="l" rtl="0">
         <a:lnSpc>
           <a:spcPct val="100000"/>
         </a:lnSpc>
@@ -5686,7 +5846,7 @@
           <a:srgbClr val="000000"/>
         </a:buClr>
         <a:buFont typeface="Arial"/>
-        <a:defRPr b="0" i="0" sz="1400" u="none" cap="none" strike="noStrike">
+        <a:defRPr sz="1400" b="0" i="0" u="none" strike="noStrike" cap="none">
           <a:solidFill>
             <a:srgbClr val="000000"/>
           </a:solidFill>
@@ -5696,7 +5856,7 @@
           <a:sym typeface="Arial"/>
         </a:defRPr>
       </a:lvl5pPr>
-      <a:lvl6pPr lvl="5" marR="0" rtl="0" algn="l">
+      <a:lvl6pPr marR="0" lvl="5" algn="l" rtl="0">
         <a:lnSpc>
           <a:spcPct val="100000"/>
         </a:lnSpc>
@@ -5710,7 +5870,7 @@
           <a:srgbClr val="000000"/>
         </a:buClr>
         <a:buFont typeface="Arial"/>
-        <a:defRPr b="0" i="0" sz="1400" u="none" cap="none" strike="noStrike">
+        <a:defRPr sz="1400" b="0" i="0" u="none" strike="noStrike" cap="none">
           <a:solidFill>
             <a:srgbClr val="000000"/>
           </a:solidFill>
@@ -5720,7 +5880,7 @@
           <a:sym typeface="Arial"/>
         </a:defRPr>
       </a:lvl6pPr>
-      <a:lvl7pPr lvl="6" marR="0" rtl="0" algn="l">
+      <a:lvl7pPr marR="0" lvl="6" algn="l" rtl="0">
         <a:lnSpc>
           <a:spcPct val="100000"/>
         </a:lnSpc>
@@ -5734,7 +5894,7 @@
           <a:srgbClr val="000000"/>
         </a:buClr>
         <a:buFont typeface="Arial"/>
-        <a:defRPr b="0" i="0" sz="1400" u="none" cap="none" strike="noStrike">
+        <a:defRPr sz="1400" b="0" i="0" u="none" strike="noStrike" cap="none">
           <a:solidFill>
             <a:srgbClr val="000000"/>
           </a:solidFill>
@@ -5744,7 +5904,7 @@
           <a:sym typeface="Arial"/>
         </a:defRPr>
       </a:lvl7pPr>
-      <a:lvl8pPr lvl="7" marR="0" rtl="0" algn="l">
+      <a:lvl8pPr marR="0" lvl="7" algn="l" rtl="0">
         <a:lnSpc>
           <a:spcPct val="100000"/>
         </a:lnSpc>
@@ -5758,7 +5918,7 @@
           <a:srgbClr val="000000"/>
         </a:buClr>
         <a:buFont typeface="Arial"/>
-        <a:defRPr b="0" i="0" sz="1400" u="none" cap="none" strike="noStrike">
+        <a:defRPr sz="1400" b="0" i="0" u="none" strike="noStrike" cap="none">
           <a:solidFill>
             <a:srgbClr val="000000"/>
           </a:solidFill>
@@ -5768,7 +5928,7 @@
           <a:sym typeface="Arial"/>
         </a:defRPr>
       </a:lvl8pPr>
-      <a:lvl9pPr lvl="8" marR="0" rtl="0" algn="l">
+      <a:lvl9pPr marR="0" lvl="8" algn="l" rtl="0">
         <a:lnSpc>
           <a:spcPct val="100000"/>
         </a:lnSpc>
@@ -5782,7 +5942,7 @@
           <a:srgbClr val="000000"/>
         </a:buClr>
         <a:buFont typeface="Arial"/>
-        <a:defRPr b="0" i="0" sz="1400" u="none" cap="none" strike="noStrike">
+        <a:defRPr sz="1400" b="0" i="0" u="none" strike="noStrike" cap="none">
           <a:solidFill>
             <a:srgbClr val="000000"/>
           </a:solidFill>
@@ -5794,7 +5954,7 @@
       </a:lvl9pPr>
     </p:titleStyle>
     <p:bodyStyle>
-      <a:defPPr lvl="0" marR="0" rtl="0" algn="l">
+      <a:defPPr marR="0" lvl="0" algn="l" rtl="0">
         <a:lnSpc>
           <a:spcPct val="100000"/>
         </a:lnSpc>
@@ -5805,7 +5965,7 @@
           <a:spcPts val="0"/>
         </a:spcAft>
       </a:defPPr>
-      <a:lvl1pPr lvl="0" marR="0" rtl="0" algn="l">
+      <a:lvl1pPr marR="0" lvl="0" algn="l" rtl="0">
         <a:lnSpc>
           <a:spcPct val="100000"/>
         </a:lnSpc>
@@ -5819,7 +5979,7 @@
           <a:srgbClr val="000000"/>
         </a:buClr>
         <a:buFont typeface="Arial"/>
-        <a:defRPr b="0" i="0" sz="1400" u="none" cap="none" strike="noStrike">
+        <a:defRPr sz="1400" b="0" i="0" u="none" strike="noStrike" cap="none">
           <a:solidFill>
             <a:srgbClr val="000000"/>
           </a:solidFill>
@@ -5829,7 +5989,7 @@
           <a:sym typeface="Arial"/>
         </a:defRPr>
       </a:lvl1pPr>
-      <a:lvl2pPr lvl="1" marR="0" rtl="0" algn="l">
+      <a:lvl2pPr marR="0" lvl="1" algn="l" rtl="0">
         <a:lnSpc>
           <a:spcPct val="100000"/>
         </a:lnSpc>
@@ -5843,7 +6003,7 @@
           <a:srgbClr val="000000"/>
         </a:buClr>
         <a:buFont typeface="Arial"/>
-        <a:defRPr b="0" i="0" sz="1400" u="none" cap="none" strike="noStrike">
+        <a:defRPr sz="1400" b="0" i="0" u="none" strike="noStrike" cap="none">
           <a:solidFill>
             <a:srgbClr val="000000"/>
           </a:solidFill>
@@ -5853,7 +6013,7 @@
           <a:sym typeface="Arial"/>
         </a:defRPr>
       </a:lvl2pPr>
-      <a:lvl3pPr lvl="2" marR="0" rtl="0" algn="l">
+      <a:lvl3pPr marR="0" lvl="2" algn="l" rtl="0">
         <a:lnSpc>
           <a:spcPct val="100000"/>
         </a:lnSpc>
@@ -5867,7 +6027,7 @@
           <a:srgbClr val="000000"/>
         </a:buClr>
         <a:buFont typeface="Arial"/>
-        <a:defRPr b="0" i="0" sz="1400" u="none" cap="none" strike="noStrike">
+        <a:defRPr sz="1400" b="0" i="0" u="none" strike="noStrike" cap="none">
           <a:solidFill>
             <a:srgbClr val="000000"/>
           </a:solidFill>
@@ -5877,7 +6037,7 @@
           <a:sym typeface="Arial"/>
         </a:defRPr>
       </a:lvl3pPr>
-      <a:lvl4pPr lvl="3" marR="0" rtl="0" algn="l">
+      <a:lvl4pPr marR="0" lvl="3" algn="l" rtl="0">
         <a:lnSpc>
           <a:spcPct val="100000"/>
         </a:lnSpc>
@@ -5891,7 +6051,7 @@
           <a:srgbClr val="000000"/>
         </a:buClr>
         <a:buFont typeface="Arial"/>
-        <a:defRPr b="0" i="0" sz="1400" u="none" cap="none" strike="noStrike">
+        <a:defRPr sz="1400" b="0" i="0" u="none" strike="noStrike" cap="none">
           <a:solidFill>
             <a:srgbClr val="000000"/>
           </a:solidFill>
@@ -5901,7 +6061,7 @@
           <a:sym typeface="Arial"/>
         </a:defRPr>
       </a:lvl4pPr>
-      <a:lvl5pPr lvl="4" marR="0" rtl="0" algn="l">
+      <a:lvl5pPr marR="0" lvl="4" algn="l" rtl="0">
         <a:lnSpc>
           <a:spcPct val="100000"/>
         </a:lnSpc>
@@ -5915,7 +6075,7 @@
           <a:srgbClr val="000000"/>
         </a:buClr>
         <a:buFont typeface="Arial"/>
-        <a:defRPr b="0" i="0" sz="1400" u="none" cap="none" strike="noStrike">
+        <a:defRPr sz="1400" b="0" i="0" u="none" strike="noStrike" cap="none">
           <a:solidFill>
             <a:srgbClr val="000000"/>
           </a:solidFill>
@@ -5925,7 +6085,7 @@
           <a:sym typeface="Arial"/>
         </a:defRPr>
       </a:lvl5pPr>
-      <a:lvl6pPr lvl="5" marR="0" rtl="0" algn="l">
+      <a:lvl6pPr marR="0" lvl="5" algn="l" rtl="0">
         <a:lnSpc>
           <a:spcPct val="100000"/>
         </a:lnSpc>
@@ -5939,7 +6099,7 @@
           <a:srgbClr val="000000"/>
         </a:buClr>
         <a:buFont typeface="Arial"/>
-        <a:defRPr b="0" i="0" sz="1400" u="none" cap="none" strike="noStrike">
+        <a:defRPr sz="1400" b="0" i="0" u="none" strike="noStrike" cap="none">
           <a:solidFill>
             <a:srgbClr val="000000"/>
           </a:solidFill>
@@ -5949,7 +6109,7 @@
           <a:sym typeface="Arial"/>
         </a:defRPr>
       </a:lvl6pPr>
-      <a:lvl7pPr lvl="6" marR="0" rtl="0" algn="l">
+      <a:lvl7pPr marR="0" lvl="6" algn="l" rtl="0">
         <a:lnSpc>
           <a:spcPct val="100000"/>
         </a:lnSpc>
@@ -5963,7 +6123,7 @@
           <a:srgbClr val="000000"/>
         </a:buClr>
         <a:buFont typeface="Arial"/>
-        <a:defRPr b="0" i="0" sz="1400" u="none" cap="none" strike="noStrike">
+        <a:defRPr sz="1400" b="0" i="0" u="none" strike="noStrike" cap="none">
           <a:solidFill>
             <a:srgbClr val="000000"/>
           </a:solidFill>
@@ -5973,7 +6133,7 @@
           <a:sym typeface="Arial"/>
         </a:defRPr>
       </a:lvl7pPr>
-      <a:lvl8pPr lvl="7" marR="0" rtl="0" algn="l">
+      <a:lvl8pPr marR="0" lvl="7" algn="l" rtl="0">
         <a:lnSpc>
           <a:spcPct val="100000"/>
         </a:lnSpc>
@@ -5987,7 +6147,7 @@
           <a:srgbClr val="000000"/>
         </a:buClr>
         <a:buFont typeface="Arial"/>
-        <a:defRPr b="0" i="0" sz="1400" u="none" cap="none" strike="noStrike">
+        <a:defRPr sz="1400" b="0" i="0" u="none" strike="noStrike" cap="none">
           <a:solidFill>
             <a:srgbClr val="000000"/>
           </a:solidFill>
@@ -5997,7 +6157,7 @@
           <a:sym typeface="Arial"/>
         </a:defRPr>
       </a:lvl8pPr>
-      <a:lvl9pPr lvl="8" marR="0" rtl="0" algn="l">
+      <a:lvl9pPr marR="0" lvl="8" algn="l" rtl="0">
         <a:lnSpc>
           <a:spcPct val="100000"/>
         </a:lnSpc>
@@ -6011,7 +6171,7 @@
           <a:srgbClr val="000000"/>
         </a:buClr>
         <a:buFont typeface="Arial"/>
-        <a:defRPr b="0" i="0" sz="1400" u="none" cap="none" strike="noStrike">
+        <a:defRPr sz="1400" b="0" i="0" u="none" strike="noStrike" cap="none">
           <a:solidFill>
             <a:srgbClr val="000000"/>
           </a:solidFill>
@@ -6023,7 +6183,7 @@
       </a:lvl9pPr>
     </p:bodyStyle>
     <p:otherStyle>
-      <a:defPPr lvl="0" marR="0" rtl="0" algn="l">
+      <a:defPPr marR="0" lvl="0" algn="l" rtl="0">
         <a:lnSpc>
           <a:spcPct val="100000"/>
         </a:lnSpc>
@@ -6034,7 +6194,7 @@
           <a:spcPts val="0"/>
         </a:spcAft>
       </a:defPPr>
-      <a:lvl1pPr lvl="0" marR="0" rtl="0" algn="l">
+      <a:lvl1pPr marR="0" lvl="0" algn="l" rtl="0">
         <a:lnSpc>
           <a:spcPct val="100000"/>
         </a:lnSpc>
@@ -6048,7 +6208,7 @@
           <a:srgbClr val="000000"/>
         </a:buClr>
         <a:buFont typeface="Arial"/>
-        <a:defRPr b="0" i="0" sz="1400" u="none" cap="none" strike="noStrike">
+        <a:defRPr sz="1400" b="0" i="0" u="none" strike="noStrike" cap="none">
           <a:solidFill>
             <a:srgbClr val="000000"/>
           </a:solidFill>
@@ -6058,7 +6218,7 @@
           <a:sym typeface="Arial"/>
         </a:defRPr>
       </a:lvl1pPr>
-      <a:lvl2pPr lvl="1" marR="0" rtl="0" algn="l">
+      <a:lvl2pPr marR="0" lvl="1" algn="l" rtl="0">
         <a:lnSpc>
           <a:spcPct val="100000"/>
         </a:lnSpc>
@@ -6072,7 +6232,7 @@
           <a:srgbClr val="000000"/>
         </a:buClr>
         <a:buFont typeface="Arial"/>
-        <a:defRPr b="0" i="0" sz="1400" u="none" cap="none" strike="noStrike">
+        <a:defRPr sz="1400" b="0" i="0" u="none" strike="noStrike" cap="none">
           <a:solidFill>
             <a:srgbClr val="000000"/>
           </a:solidFill>
@@ -6082,7 +6242,7 @@
           <a:sym typeface="Arial"/>
         </a:defRPr>
       </a:lvl2pPr>
-      <a:lvl3pPr lvl="2" marR="0" rtl="0" algn="l">
+      <a:lvl3pPr marR="0" lvl="2" algn="l" rtl="0">
         <a:lnSpc>
           <a:spcPct val="100000"/>
         </a:lnSpc>
@@ -6096,7 +6256,7 @@
           <a:srgbClr val="000000"/>
         </a:buClr>
         <a:buFont typeface="Arial"/>
-        <a:defRPr b="0" i="0" sz="1400" u="none" cap="none" strike="noStrike">
+        <a:defRPr sz="1400" b="0" i="0" u="none" strike="noStrike" cap="none">
           <a:solidFill>
             <a:srgbClr val="000000"/>
           </a:solidFill>
@@ -6106,7 +6266,7 @@
           <a:sym typeface="Arial"/>
         </a:defRPr>
       </a:lvl3pPr>
-      <a:lvl4pPr lvl="3" marR="0" rtl="0" algn="l">
+      <a:lvl4pPr marR="0" lvl="3" algn="l" rtl="0">
         <a:lnSpc>
           <a:spcPct val="100000"/>
         </a:lnSpc>
@@ -6120,7 +6280,7 @@
           <a:srgbClr val="000000"/>
         </a:buClr>
         <a:buFont typeface="Arial"/>
-        <a:defRPr b="0" i="0" sz="1400" u="none" cap="none" strike="noStrike">
+        <a:defRPr sz="1400" b="0" i="0" u="none" strike="noStrike" cap="none">
           <a:solidFill>
             <a:srgbClr val="000000"/>
           </a:solidFill>
@@ -6130,7 +6290,7 @@
           <a:sym typeface="Arial"/>
         </a:defRPr>
       </a:lvl4pPr>
-      <a:lvl5pPr lvl="4" marR="0" rtl="0" algn="l">
+      <a:lvl5pPr marR="0" lvl="4" algn="l" rtl="0">
         <a:lnSpc>
           <a:spcPct val="100000"/>
         </a:lnSpc>
@@ -6144,7 +6304,7 @@
           <a:srgbClr val="000000"/>
         </a:buClr>
         <a:buFont typeface="Arial"/>
-        <a:defRPr b="0" i="0" sz="1400" u="none" cap="none" strike="noStrike">
+        <a:defRPr sz="1400" b="0" i="0" u="none" strike="noStrike" cap="none">
           <a:solidFill>
             <a:srgbClr val="000000"/>
           </a:solidFill>
@@ -6154,7 +6314,7 @@
           <a:sym typeface="Arial"/>
         </a:defRPr>
       </a:lvl5pPr>
-      <a:lvl6pPr lvl="5" marR="0" rtl="0" algn="l">
+      <a:lvl6pPr marR="0" lvl="5" algn="l" rtl="0">
         <a:lnSpc>
           <a:spcPct val="100000"/>
         </a:lnSpc>
@@ -6168,7 +6328,7 @@
           <a:srgbClr val="000000"/>
         </a:buClr>
         <a:buFont typeface="Arial"/>
-        <a:defRPr b="0" i="0" sz="1400" u="none" cap="none" strike="noStrike">
+        <a:defRPr sz="1400" b="0" i="0" u="none" strike="noStrike" cap="none">
           <a:solidFill>
             <a:srgbClr val="000000"/>
           </a:solidFill>
@@ -6178,7 +6338,7 @@
           <a:sym typeface="Arial"/>
         </a:defRPr>
       </a:lvl6pPr>
-      <a:lvl7pPr lvl="6" marR="0" rtl="0" algn="l">
+      <a:lvl7pPr marR="0" lvl="6" algn="l" rtl="0">
         <a:lnSpc>
           <a:spcPct val="100000"/>
         </a:lnSpc>
@@ -6192,7 +6352,7 @@
           <a:srgbClr val="000000"/>
         </a:buClr>
         <a:buFont typeface="Arial"/>
-        <a:defRPr b="0" i="0" sz="1400" u="none" cap="none" strike="noStrike">
+        <a:defRPr sz="1400" b="0" i="0" u="none" strike="noStrike" cap="none">
           <a:solidFill>
             <a:srgbClr val="000000"/>
           </a:solidFill>
@@ -6202,7 +6362,7 @@
           <a:sym typeface="Arial"/>
         </a:defRPr>
       </a:lvl7pPr>
-      <a:lvl8pPr lvl="7" marR="0" rtl="0" algn="l">
+      <a:lvl8pPr marR="0" lvl="7" algn="l" rtl="0">
         <a:lnSpc>
           <a:spcPct val="100000"/>
         </a:lnSpc>
@@ -6216,7 +6376,7 @@
           <a:srgbClr val="000000"/>
         </a:buClr>
         <a:buFont typeface="Arial"/>
-        <a:defRPr b="0" i="0" sz="1400" u="none" cap="none" strike="noStrike">
+        <a:defRPr sz="1400" b="0" i="0" u="none" strike="noStrike" cap="none">
           <a:solidFill>
             <a:srgbClr val="000000"/>
           </a:solidFill>
@@ -6226,7 +6386,7 @@
           <a:sym typeface="Arial"/>
         </a:defRPr>
       </a:lvl8pPr>
-      <a:lvl9pPr lvl="8" marR="0" rtl="0" algn="l">
+      <a:lvl9pPr marR="0" lvl="8" algn="l" rtl="0">
         <a:lnSpc>
           <a:spcPct val="100000"/>
         </a:lnSpc>
@@ -6240,7 +6400,7 @@
           <a:srgbClr val="000000"/>
         </a:buClr>
         <a:buFont typeface="Arial"/>
-        <a:defRPr b="0" i="0" sz="1400" u="none" cap="none" strike="noStrike">
+        <a:defRPr sz="1400" b="0" i="0" u="none" strike="noStrike" cap="none">
           <a:solidFill>
             <a:srgbClr val="000000"/>
           </a:solidFill>
@@ -6256,11 +6416,11 @@
 </file>
 
 <file path=ppt/slides/slide1.xml><?xml version="1.0" encoding="utf-8"?>
-<p:sld xmlns:a="http://schemas.openxmlformats.org/drawingml/2006/main" xmlns:r="http://schemas.openxmlformats.org/officeDocument/2006/relationships" xmlns:mc="http://schemas.openxmlformats.org/markup-compatibility/2006" xmlns:mv="urn:schemas-microsoft-com:mac:vml" xmlns:p="http://schemas.openxmlformats.org/presentationml/2006/main" xmlns:c="http://schemas.openxmlformats.org/drawingml/2006/chart" xmlns:dgm="http://schemas.openxmlformats.org/drawingml/2006/diagram" xmlns:o="urn:schemas-microsoft-com:office:office" xmlns:v="urn:schemas-microsoft-com:vml" xmlns:pvml="urn:schemas-microsoft-com:office:powerpoint" xmlns:com="http://schemas.openxmlformats.org/drawingml/2006/compatibility" xmlns:p14="http://schemas.microsoft.com/office/powerpoint/2010/main" xmlns:p15="http://schemas.microsoft.com/office/powerpoint/2012/main">
+<p:sld xmlns:a="http://schemas.openxmlformats.org/drawingml/2006/main" xmlns:r="http://schemas.openxmlformats.org/officeDocument/2006/relationships" xmlns:p="http://schemas.openxmlformats.org/presentationml/2006/main">
   <p:cSld>
     <p:spTree>
       <p:nvGrpSpPr>
-        <p:cNvPr id="53" name="Shape 53"/>
+        <p:cNvPr id="1" name="Shape 53"/>
         <p:cNvGrpSpPr/>
         <p:nvPr/>
       </p:nvGrpSpPr>
@@ -6275,7 +6435,9 @@
       <p:sp>
         <p:nvSpPr>
           <p:cNvPr id="54" name="Google Shape;54;p13"/>
-          <p:cNvSpPr txBox="1"/>
+          <p:cNvSpPr txBox="1">
+            <a:spLocks noGrp="1"/>
+          </p:cNvSpPr>
           <p:nvPr>
             <p:ph type="ctrTitle"/>
           </p:nvPr>
@@ -6290,12 +6452,12 @@
           </a:prstGeom>
         </p:spPr>
         <p:txBody>
-          <a:bodyPr anchorCtr="0" anchor="b" bIns="91425" lIns="91425" spcFirstLastPara="1" rIns="91425" wrap="square" tIns="91425">
+          <a:bodyPr spcFirstLastPara="1" wrap="square" lIns="91425" tIns="91425" rIns="91425" bIns="91425" anchor="b" anchorCtr="0">
             <a:noAutofit/>
           </a:bodyPr>
           <a:lstStyle/>
           <a:p>
-            <a:pPr indent="0" lvl="0" marL="0" rtl="0" algn="ctr">
+            <a:pPr marL="0" lvl="0" indent="0" algn="ctr" rtl="0">
               <a:spcBef>
                 <a:spcPts val="0"/>
               </a:spcBef>
@@ -6315,9 +6477,11 @@
       <p:sp>
         <p:nvSpPr>
           <p:cNvPr id="55" name="Google Shape;55;p13"/>
-          <p:cNvSpPr txBox="1"/>
+          <p:cNvSpPr txBox="1">
+            <a:spLocks noGrp="1"/>
+          </p:cNvSpPr>
           <p:nvPr>
-            <p:ph idx="1" type="subTitle"/>
+            <p:ph type="subTitle" idx="1"/>
           </p:nvPr>
         </p:nvSpPr>
         <p:spPr>
@@ -6330,12 +6494,12 @@
           </a:prstGeom>
         </p:spPr>
         <p:txBody>
-          <a:bodyPr anchorCtr="0" anchor="t" bIns="91425" lIns="91425" spcFirstLastPara="1" rIns="91425" wrap="square" tIns="91425">
+          <a:bodyPr spcFirstLastPara="1" wrap="square" lIns="91425" tIns="91425" rIns="91425" bIns="91425" anchor="t" anchorCtr="0">
             <a:noAutofit/>
           </a:bodyPr>
           <a:lstStyle/>
           <a:p>
-            <a:pPr indent="0" lvl="0" marL="0" rtl="0" algn="ctr">
+            <a:pPr marL="0" lvl="0" indent="0" algn="ctr" rtl="0">
               <a:spcBef>
                 <a:spcPts val="0"/>
               </a:spcBef>
@@ -6351,7 +6515,7 @@
             <a:endParaRPr/>
           </a:p>
           <a:p>
-            <a:pPr indent="0" lvl="0" marL="0" rtl="0" algn="ctr">
+            <a:pPr marL="0" lvl="0" indent="0" algn="ctr" rtl="0">
               <a:spcBef>
                 <a:spcPts val="0"/>
               </a:spcBef>
@@ -6367,7 +6531,7 @@
             <a:endParaRPr/>
           </a:p>
           <a:p>
-            <a:pPr indent="0" lvl="0" marL="0" rtl="0" algn="ctr">
+            <a:pPr marL="0" lvl="0" indent="0" algn="ctr" rtl="0">
               <a:spcBef>
                 <a:spcPts val="0"/>
               </a:spcBef>
@@ -6376,9 +6540,6 @@
               </a:spcAft>
               <a:buNone/>
             </a:pPr>
-            <a:r>
-              <a:t/>
-            </a:r>
             <a:endParaRPr/>
           </a:p>
         </p:txBody>
@@ -6392,11 +6553,11 @@
 </file>
 
 <file path=ppt/slides/slide2.xml><?xml version="1.0" encoding="utf-8"?>
-<p:sld xmlns:a="http://schemas.openxmlformats.org/drawingml/2006/main" xmlns:r="http://schemas.openxmlformats.org/officeDocument/2006/relationships" xmlns:mc="http://schemas.openxmlformats.org/markup-compatibility/2006" xmlns:mv="urn:schemas-microsoft-com:mac:vml" xmlns:p="http://schemas.openxmlformats.org/presentationml/2006/main" xmlns:c="http://schemas.openxmlformats.org/drawingml/2006/chart" xmlns:dgm="http://schemas.openxmlformats.org/drawingml/2006/diagram" xmlns:o="urn:schemas-microsoft-com:office:office" xmlns:v="urn:schemas-microsoft-com:vml" xmlns:pvml="urn:schemas-microsoft-com:office:powerpoint" xmlns:com="http://schemas.openxmlformats.org/drawingml/2006/compatibility" xmlns:p14="http://schemas.microsoft.com/office/powerpoint/2010/main" xmlns:p15="http://schemas.microsoft.com/office/powerpoint/2012/main">
+<p:sld xmlns:a="http://schemas.openxmlformats.org/drawingml/2006/main" xmlns:r="http://schemas.openxmlformats.org/officeDocument/2006/relationships" xmlns:p="http://schemas.openxmlformats.org/presentationml/2006/main">
   <p:cSld>
     <p:spTree>
       <p:nvGrpSpPr>
-        <p:cNvPr id="59" name="Shape 59"/>
+        <p:cNvPr id="1" name="Shape 59"/>
         <p:cNvGrpSpPr/>
         <p:nvPr/>
       </p:nvGrpSpPr>
@@ -6411,7 +6572,9 @@
       <p:sp>
         <p:nvSpPr>
           <p:cNvPr id="60" name="Google Shape;60;p14"/>
-          <p:cNvSpPr txBox="1"/>
+          <p:cNvSpPr txBox="1">
+            <a:spLocks noGrp="1"/>
+          </p:cNvSpPr>
           <p:nvPr>
             <p:ph type="title"/>
           </p:nvPr>
@@ -6426,12 +6589,12 @@
           </a:prstGeom>
         </p:spPr>
         <p:txBody>
-          <a:bodyPr anchorCtr="0" anchor="t" bIns="91425" lIns="91425" spcFirstLastPara="1" rIns="91425" wrap="square" tIns="91425">
+          <a:bodyPr spcFirstLastPara="1" wrap="square" lIns="91425" tIns="91425" rIns="91425" bIns="91425" anchor="t" anchorCtr="0">
             <a:noAutofit/>
           </a:bodyPr>
           <a:lstStyle/>
           <a:p>
-            <a:pPr indent="0" lvl="0" marL="0" rtl="0" algn="l">
+            <a:pPr marL="0" lvl="0" indent="0" algn="l" rtl="0">
               <a:spcBef>
                 <a:spcPts val="0"/>
               </a:spcBef>
@@ -6451,9 +6614,11 @@
       <p:sp>
         <p:nvSpPr>
           <p:cNvPr id="61" name="Google Shape;61;p14"/>
-          <p:cNvSpPr txBox="1"/>
+          <p:cNvSpPr txBox="1">
+            <a:spLocks noGrp="1"/>
+          </p:cNvSpPr>
           <p:nvPr>
-            <p:ph idx="1" type="body"/>
+            <p:ph type="body" idx="1"/>
           </p:nvPr>
         </p:nvSpPr>
         <p:spPr>
@@ -6466,12 +6631,12 @@
           </a:prstGeom>
         </p:spPr>
         <p:txBody>
-          <a:bodyPr anchorCtr="0" anchor="t" bIns="91425" lIns="91425" spcFirstLastPara="1" rIns="91425" wrap="square" tIns="91425">
+          <a:bodyPr spcFirstLastPara="1" wrap="square" lIns="91425" tIns="91425" rIns="91425" bIns="91425" anchor="t" anchorCtr="0">
             <a:noAutofit/>
           </a:bodyPr>
           <a:lstStyle/>
           <a:p>
-            <a:pPr indent="0" lvl="0" marL="0" rtl="0" algn="l">
+            <a:pPr marL="0" lvl="0" indent="0" algn="l" rtl="0">
               <a:spcBef>
                 <a:spcPts val="0"/>
               </a:spcBef>
@@ -6480,13 +6645,10 @@
               </a:spcAft>
               <a:buNone/>
             </a:pPr>
-            <a:r>
-              <a:t/>
-            </a:r>
             <a:endParaRPr/>
           </a:p>
           <a:p>
-            <a:pPr indent="-342900" lvl="0" marL="457200" rtl="0" algn="l">
+            <a:pPr marL="457200" lvl="0" indent="-342900" algn="l" rtl="0">
               <a:spcBef>
                 <a:spcPts val="1600"/>
               </a:spcBef>
@@ -6503,7 +6665,7 @@
             <a:endParaRPr/>
           </a:p>
           <a:p>
-            <a:pPr indent="-342900" lvl="0" marL="457200" rtl="0" algn="l">
+            <a:pPr marL="457200" lvl="0" indent="-342900" algn="l" rtl="0">
               <a:spcBef>
                 <a:spcPts val="0"/>
               </a:spcBef>
@@ -6530,11 +6692,11 @@
 </file>
 
 <file path=ppt/slides/slide3.xml><?xml version="1.0" encoding="utf-8"?>
-<p:sld xmlns:a="http://schemas.openxmlformats.org/drawingml/2006/main" xmlns:r="http://schemas.openxmlformats.org/officeDocument/2006/relationships" xmlns:mc="http://schemas.openxmlformats.org/markup-compatibility/2006" xmlns:mv="urn:schemas-microsoft-com:mac:vml" xmlns:p="http://schemas.openxmlformats.org/presentationml/2006/main" xmlns:c="http://schemas.openxmlformats.org/drawingml/2006/chart" xmlns:dgm="http://schemas.openxmlformats.org/drawingml/2006/diagram" xmlns:o="urn:schemas-microsoft-com:office:office" xmlns:v="urn:schemas-microsoft-com:vml" xmlns:pvml="urn:schemas-microsoft-com:office:powerpoint" xmlns:com="http://schemas.openxmlformats.org/drawingml/2006/compatibility" xmlns:p14="http://schemas.microsoft.com/office/powerpoint/2010/main" xmlns:p15="http://schemas.microsoft.com/office/powerpoint/2012/main">
+<p:sld xmlns:a="http://schemas.openxmlformats.org/drawingml/2006/main" xmlns:r="http://schemas.openxmlformats.org/officeDocument/2006/relationships" xmlns:p="http://schemas.openxmlformats.org/presentationml/2006/main">
   <p:cSld>
     <p:spTree>
       <p:nvGrpSpPr>
-        <p:cNvPr id="65" name="Shape 65"/>
+        <p:cNvPr id="1" name="Shape 65"/>
         <p:cNvGrpSpPr/>
         <p:nvPr/>
       </p:nvGrpSpPr>
@@ -6549,7 +6711,9 @@
       <p:sp>
         <p:nvSpPr>
           <p:cNvPr id="66" name="Google Shape;66;p15"/>
-          <p:cNvSpPr txBox="1"/>
+          <p:cNvSpPr txBox="1">
+            <a:spLocks noGrp="1"/>
+          </p:cNvSpPr>
           <p:nvPr>
             <p:ph type="title"/>
           </p:nvPr>
@@ -6564,12 +6728,12 @@
           </a:prstGeom>
         </p:spPr>
         <p:txBody>
-          <a:bodyPr anchorCtr="0" anchor="t" bIns="91425" lIns="91425" spcFirstLastPara="1" rIns="91425" wrap="square" tIns="91425">
+          <a:bodyPr spcFirstLastPara="1" wrap="square" lIns="91425" tIns="91425" rIns="91425" bIns="91425" anchor="t" anchorCtr="0">
             <a:noAutofit/>
           </a:bodyPr>
           <a:lstStyle/>
           <a:p>
-            <a:pPr indent="0" lvl="0" marL="0" rtl="0" algn="l">
+            <a:pPr marL="0" lvl="0" indent="0" algn="l" rtl="0">
               <a:spcBef>
                 <a:spcPts val="0"/>
               </a:spcBef>
@@ -6589,9 +6753,11 @@
       <p:sp>
         <p:nvSpPr>
           <p:cNvPr id="67" name="Google Shape;67;p15"/>
-          <p:cNvSpPr txBox="1"/>
+          <p:cNvSpPr txBox="1">
+            <a:spLocks noGrp="1"/>
+          </p:cNvSpPr>
           <p:nvPr>
-            <p:ph idx="1" type="body"/>
+            <p:ph type="body" idx="1"/>
           </p:nvPr>
         </p:nvSpPr>
         <p:spPr>
@@ -6604,12 +6770,12 @@
           </a:prstGeom>
         </p:spPr>
         <p:txBody>
-          <a:bodyPr anchorCtr="0" anchor="t" bIns="91425" lIns="91425" spcFirstLastPara="1" rIns="91425" wrap="square" tIns="91425">
+          <a:bodyPr spcFirstLastPara="1" wrap="square" lIns="91425" tIns="91425" rIns="91425" bIns="91425" anchor="t" anchorCtr="0">
             <a:noAutofit/>
           </a:bodyPr>
           <a:lstStyle/>
           <a:p>
-            <a:pPr indent="-342900" lvl="0" marL="457200" rtl="0" algn="l">
+            <a:pPr marL="457200" lvl="0" indent="-342900" algn="l" rtl="0">
               <a:lnSpc>
                 <a:spcPct val="150000"/>
               </a:lnSpc>
@@ -6642,7 +6808,7 @@
             <a:endParaRPr/>
           </a:p>
           <a:p>
-            <a:pPr indent="-342900" lvl="0" marL="457200" rtl="0" algn="l">
+            <a:pPr marL="457200" lvl="0" indent="-342900" algn="l" rtl="0">
               <a:lnSpc>
                 <a:spcPct val="150000"/>
               </a:lnSpc>
@@ -6662,7 +6828,7 @@
             <a:endParaRPr/>
           </a:p>
           <a:p>
-            <a:pPr indent="-342900" lvl="0" marL="457200" rtl="0" algn="l">
+            <a:pPr marL="457200" lvl="0" indent="-342900" algn="l" rtl="0">
               <a:lnSpc>
                 <a:spcPct val="150000"/>
               </a:lnSpc>
@@ -6682,7 +6848,7 @@
             <a:endParaRPr/>
           </a:p>
           <a:p>
-            <a:pPr indent="-342900" lvl="0" marL="457200" rtl="0" algn="l">
+            <a:pPr marL="457200" lvl="0" indent="-342900" algn="l" rtl="0">
               <a:lnSpc>
                 <a:spcPct val="150000"/>
               </a:lnSpc>
@@ -6702,7 +6868,7 @@
             <a:endParaRPr/>
           </a:p>
           <a:p>
-            <a:pPr indent="0" lvl="0" marL="457200" rtl="0" algn="l">
+            <a:pPr marL="457200" lvl="0" indent="0" algn="l" rtl="0">
               <a:spcBef>
                 <a:spcPts val="1600"/>
               </a:spcBef>
@@ -6711,9 +6877,6 @@
               </a:spcAft>
               <a:buNone/>
             </a:pPr>
-            <a:r>
-              <a:t/>
-            </a:r>
             <a:endParaRPr/>
           </a:p>
         </p:txBody>
@@ -6727,11 +6890,11 @@
 </file>
 
 <file path=ppt/slides/slide4.xml><?xml version="1.0" encoding="utf-8"?>
-<p:sld xmlns:a="http://schemas.openxmlformats.org/drawingml/2006/main" xmlns:r="http://schemas.openxmlformats.org/officeDocument/2006/relationships" xmlns:mc="http://schemas.openxmlformats.org/markup-compatibility/2006" xmlns:mv="urn:schemas-microsoft-com:mac:vml" xmlns:p="http://schemas.openxmlformats.org/presentationml/2006/main" xmlns:c="http://schemas.openxmlformats.org/drawingml/2006/chart" xmlns:dgm="http://schemas.openxmlformats.org/drawingml/2006/diagram" xmlns:o="urn:schemas-microsoft-com:office:office" xmlns:v="urn:schemas-microsoft-com:vml" xmlns:pvml="urn:schemas-microsoft-com:office:powerpoint" xmlns:com="http://schemas.openxmlformats.org/drawingml/2006/compatibility" xmlns:p14="http://schemas.microsoft.com/office/powerpoint/2010/main" xmlns:p15="http://schemas.microsoft.com/office/powerpoint/2012/main">
+<p:sld xmlns:a="http://schemas.openxmlformats.org/drawingml/2006/main" xmlns:r="http://schemas.openxmlformats.org/officeDocument/2006/relationships" xmlns:p="http://schemas.openxmlformats.org/presentationml/2006/main">
   <p:cSld>
     <p:spTree>
       <p:nvGrpSpPr>
-        <p:cNvPr id="71" name="Shape 71"/>
+        <p:cNvPr id="1" name="Shape 71"/>
         <p:cNvGrpSpPr/>
         <p:nvPr/>
       </p:nvGrpSpPr>
@@ -6746,7 +6909,9 @@
       <p:sp>
         <p:nvSpPr>
           <p:cNvPr id="72" name="Google Shape;72;p16"/>
-          <p:cNvSpPr txBox="1"/>
+          <p:cNvSpPr txBox="1">
+            <a:spLocks noGrp="1"/>
+          </p:cNvSpPr>
           <p:nvPr>
             <p:ph type="title"/>
           </p:nvPr>
@@ -6761,12 +6926,12 @@
           </a:prstGeom>
         </p:spPr>
         <p:txBody>
-          <a:bodyPr anchorCtr="0" anchor="t" bIns="91425" lIns="91425" spcFirstLastPara="1" rIns="91425" wrap="square" tIns="91425">
+          <a:bodyPr spcFirstLastPara="1" wrap="square" lIns="91425" tIns="91425" rIns="91425" bIns="91425" anchor="t" anchorCtr="0">
             <a:noAutofit/>
           </a:bodyPr>
           <a:lstStyle/>
           <a:p>
-            <a:pPr indent="0" lvl="0" marL="0" rtl="0" algn="l">
+            <a:pPr marL="0" lvl="0" indent="0" algn="l" rtl="0">
               <a:spcBef>
                 <a:spcPts val="0"/>
               </a:spcBef>
@@ -6786,9 +6951,11 @@
       <p:sp>
         <p:nvSpPr>
           <p:cNvPr id="73" name="Google Shape;73;p16"/>
-          <p:cNvSpPr txBox="1"/>
+          <p:cNvSpPr txBox="1">
+            <a:spLocks noGrp="1"/>
+          </p:cNvSpPr>
           <p:nvPr>
-            <p:ph idx="1" type="body"/>
+            <p:ph type="body" idx="1"/>
           </p:nvPr>
         </p:nvSpPr>
         <p:spPr>
@@ -6801,12 +6968,12 @@
           </a:prstGeom>
         </p:spPr>
         <p:txBody>
-          <a:bodyPr anchorCtr="0" anchor="t" bIns="91425" lIns="91425" spcFirstLastPara="1" rIns="91425" wrap="square" tIns="91425">
+          <a:bodyPr spcFirstLastPara="1" wrap="square" lIns="91425" tIns="91425" rIns="91425" bIns="91425" anchor="t" anchorCtr="0">
             <a:noAutofit/>
           </a:bodyPr>
           <a:lstStyle/>
           <a:p>
-            <a:pPr indent="0" lvl="0" marL="0" rtl="0" algn="l">
+            <a:pPr marL="0" lvl="0" indent="0" algn="l" rtl="0">
               <a:spcBef>
                 <a:spcPts val="0"/>
               </a:spcBef>
@@ -6843,12 +7010,12 @@
           </a:ln>
         </p:spPr>
         <p:txBody>
-          <a:bodyPr anchorCtr="0" anchor="t" bIns="91425" lIns="91425" spcFirstLastPara="1" rIns="91425" wrap="square" tIns="91425">
+          <a:bodyPr spcFirstLastPara="1" wrap="square" lIns="91425" tIns="91425" rIns="91425" bIns="91425" anchor="t" anchorCtr="0">
             <a:noAutofit/>
           </a:bodyPr>
           <a:lstStyle/>
           <a:p>
-            <a:pPr indent="0" lvl="0" marL="0" rtl="0" algn="l">
+            <a:pPr marL="0" lvl="0" indent="0" algn="l" rtl="0">
               <a:spcBef>
                 <a:spcPts val="0"/>
               </a:spcBef>
@@ -6872,7 +7039,7 @@
             </a:endParaRPr>
           </a:p>
           <a:p>
-            <a:pPr indent="0" lvl="0" marL="0" rtl="0" algn="l">
+            <a:pPr marL="0" lvl="0" indent="0" algn="l" rtl="0">
               <a:spcBef>
                 <a:spcPts val="0"/>
               </a:spcBef>
@@ -6896,7 +7063,7 @@
             </a:endParaRPr>
           </a:p>
           <a:p>
-            <a:pPr indent="0" lvl="0" marL="0" rtl="0" algn="l">
+            <a:pPr marL="0" lvl="0" indent="0" algn="l" rtl="0">
               <a:spcBef>
                 <a:spcPts val="0"/>
               </a:spcBef>
@@ -6905,9 +7072,6 @@
               </a:spcAft>
               <a:buNone/>
             </a:pPr>
-            <a:r>
-              <a:t/>
-            </a:r>
             <a:endParaRPr sz="1800">
               <a:solidFill>
                 <a:srgbClr val="F4F4F4"/>
@@ -6925,11 +7089,11 @@
 </file>
 
 <file path=ppt/slides/slide5.xml><?xml version="1.0" encoding="utf-8"?>
-<p:sld xmlns:a="http://schemas.openxmlformats.org/drawingml/2006/main" xmlns:r="http://schemas.openxmlformats.org/officeDocument/2006/relationships" xmlns:mc="http://schemas.openxmlformats.org/markup-compatibility/2006" xmlns:mv="urn:schemas-microsoft-com:mac:vml" xmlns:p="http://schemas.openxmlformats.org/presentationml/2006/main" xmlns:c="http://schemas.openxmlformats.org/drawingml/2006/chart" xmlns:dgm="http://schemas.openxmlformats.org/drawingml/2006/diagram" xmlns:o="urn:schemas-microsoft-com:office:office" xmlns:v="urn:schemas-microsoft-com:vml" xmlns:pvml="urn:schemas-microsoft-com:office:powerpoint" xmlns:com="http://schemas.openxmlformats.org/drawingml/2006/compatibility" xmlns:p14="http://schemas.microsoft.com/office/powerpoint/2010/main" xmlns:p15="http://schemas.microsoft.com/office/powerpoint/2012/main">
+<p:sld xmlns:a="http://schemas.openxmlformats.org/drawingml/2006/main" xmlns:r="http://schemas.openxmlformats.org/officeDocument/2006/relationships" xmlns:p="http://schemas.openxmlformats.org/presentationml/2006/main">
   <p:cSld>
     <p:spTree>
       <p:nvGrpSpPr>
-        <p:cNvPr id="78" name="Shape 78"/>
+        <p:cNvPr id="1" name="Shape 78"/>
         <p:cNvGrpSpPr/>
         <p:nvPr/>
       </p:nvGrpSpPr>
@@ -6944,7 +7108,9 @@
       <p:sp>
         <p:nvSpPr>
           <p:cNvPr id="79" name="Google Shape;79;p17"/>
-          <p:cNvSpPr txBox="1"/>
+          <p:cNvSpPr txBox="1">
+            <a:spLocks noGrp="1"/>
+          </p:cNvSpPr>
           <p:nvPr>
             <p:ph type="title"/>
           </p:nvPr>
@@ -6959,12 +7125,12 @@
           </a:prstGeom>
         </p:spPr>
         <p:txBody>
-          <a:bodyPr anchorCtr="0" anchor="t" bIns="91425" lIns="91425" spcFirstLastPara="1" rIns="91425" wrap="square" tIns="91425">
+          <a:bodyPr spcFirstLastPara="1" wrap="square" lIns="91425" tIns="91425" rIns="91425" bIns="91425" anchor="t" anchorCtr="0">
             <a:noAutofit/>
           </a:bodyPr>
           <a:lstStyle/>
           <a:p>
-            <a:pPr indent="0" lvl="0" marL="0" rtl="0" algn="l">
+            <a:pPr marL="0" lvl="0" indent="0" algn="l" rtl="0">
               <a:spcBef>
                 <a:spcPts val="0"/>
               </a:spcBef>
@@ -6984,9 +7150,11 @@
       <p:sp>
         <p:nvSpPr>
           <p:cNvPr id="80" name="Google Shape;80;p17"/>
-          <p:cNvSpPr txBox="1"/>
+          <p:cNvSpPr txBox="1">
+            <a:spLocks noGrp="1"/>
+          </p:cNvSpPr>
           <p:nvPr>
-            <p:ph idx="1" type="body"/>
+            <p:ph type="body" idx="1"/>
           </p:nvPr>
         </p:nvSpPr>
         <p:spPr>
@@ -6999,12 +7167,12 @@
           </a:prstGeom>
         </p:spPr>
         <p:txBody>
-          <a:bodyPr anchorCtr="0" anchor="t" bIns="91425" lIns="91425" spcFirstLastPara="1" rIns="91425" wrap="square" tIns="91425">
+          <a:bodyPr spcFirstLastPara="1" wrap="square" lIns="91425" tIns="91425" rIns="91425" bIns="91425" anchor="t" anchorCtr="0">
             <a:noAutofit/>
           </a:bodyPr>
           <a:lstStyle/>
           <a:p>
-            <a:pPr indent="-342900" lvl="0" marL="457200" rtl="0" algn="l">
+            <a:pPr marL="457200" lvl="0" indent="-342900" algn="l" rtl="0">
               <a:spcBef>
                 <a:spcPts val="0"/>
               </a:spcBef>
@@ -7021,7 +7189,7 @@
             <a:endParaRPr/>
           </a:p>
           <a:p>
-            <a:pPr indent="-342900" lvl="0" marL="457200" rtl="0" algn="l">
+            <a:pPr marL="457200" lvl="0" indent="-342900" algn="l" rtl="0">
               <a:spcBef>
                 <a:spcPts val="0"/>
               </a:spcBef>
@@ -7038,7 +7206,7 @@
             <a:endParaRPr/>
           </a:p>
           <a:p>
-            <a:pPr indent="-342900" lvl="0" marL="457200" rtl="0" algn="l">
+            <a:pPr marL="457200" lvl="0" indent="-342900" algn="l" rtl="0">
               <a:spcBef>
                 <a:spcPts val="0"/>
               </a:spcBef>
@@ -7055,7 +7223,7 @@
             <a:endParaRPr/>
           </a:p>
           <a:p>
-            <a:pPr indent="-342900" lvl="0" marL="457200" rtl="0" algn="l">
+            <a:pPr marL="457200" lvl="0" indent="-342900" algn="l" rtl="0">
               <a:spcBef>
                 <a:spcPts val="0"/>
               </a:spcBef>
@@ -7076,7 +7244,9 @@
       <p:sp>
         <p:nvSpPr>
           <p:cNvPr id="81" name="Google Shape;81;p17"/>
-          <p:cNvSpPr txBox="1"/>
+          <p:cNvSpPr txBox="1">
+            <a:spLocks noGrp="1"/>
+          </p:cNvSpPr>
           <p:nvPr>
             <p:ph type="title"/>
           </p:nvPr>
@@ -7091,12 +7261,12 @@
           </a:prstGeom>
         </p:spPr>
         <p:txBody>
-          <a:bodyPr anchorCtr="0" anchor="t" bIns="91425" lIns="91425" spcFirstLastPara="1" rIns="91425" wrap="square" tIns="91425">
+          <a:bodyPr spcFirstLastPara="1" wrap="square" lIns="91425" tIns="91425" rIns="91425" bIns="91425" anchor="t" anchorCtr="0">
             <a:noAutofit/>
           </a:bodyPr>
           <a:lstStyle/>
           <a:p>
-            <a:pPr indent="0" lvl="0" marL="0" rtl="0" algn="l">
+            <a:pPr marL="0" lvl="0" indent="0" algn="l" rtl="0">
               <a:spcBef>
                 <a:spcPts val="0"/>
               </a:spcBef>
@@ -7116,9 +7286,11 @@
       <p:sp>
         <p:nvSpPr>
           <p:cNvPr id="82" name="Google Shape;82;p17"/>
-          <p:cNvSpPr txBox="1"/>
+          <p:cNvSpPr txBox="1">
+            <a:spLocks noGrp="1"/>
+          </p:cNvSpPr>
           <p:nvPr>
-            <p:ph idx="1" type="body"/>
+            <p:ph type="body" idx="1"/>
           </p:nvPr>
         </p:nvSpPr>
         <p:spPr>
@@ -7131,29 +7303,42 @@
           </a:prstGeom>
         </p:spPr>
         <p:txBody>
-          <a:bodyPr anchorCtr="0" anchor="t" bIns="91425" lIns="91425" spcFirstLastPara="1" rIns="91425" wrap="square" tIns="91425">
+          <a:bodyPr spcFirstLastPara="1" wrap="square" lIns="91425" tIns="91425" rIns="91425" bIns="91425" anchor="t" anchorCtr="0">
             <a:noAutofit/>
           </a:bodyPr>
           <a:lstStyle/>
           <a:p>
-            <a:pPr indent="0" lvl="0" marL="0" rtl="0" algn="l">
-              <a:spcBef>
-                <a:spcPts val="0"/>
-              </a:spcBef>
+            <a:pPr marL="0" lvl="0" indent="0">
               <a:spcAft>
                 <a:spcPts val="1600"/>
               </a:spcAft>
               <a:buNone/>
             </a:pPr>
             <a:r>
-              <a:rPr lang="en">
+              <a:rPr lang="en" dirty="0">
                 <a:solidFill>
                   <a:srgbClr val="FF0000"/>
                 </a:solidFill>
               </a:rPr>
-              <a:t>https://github.com/myc339/CSYE7200_FINAL_PROJECT</a:t>
+              <a:t>https://</a:t>
             </a:r>
-            <a:endParaRPr>
+            <a:r>
+              <a:rPr lang="en" dirty="0" err="1">
+                <a:solidFill>
+                  <a:srgbClr val="FF0000"/>
+                </a:solidFill>
+              </a:rPr>
+              <a:t>github.com</a:t>
+            </a:r>
+            <a:r>
+              <a:rPr lang="en" dirty="0">
+                <a:solidFill>
+                  <a:srgbClr val="FF0000"/>
+                </a:solidFill>
+              </a:rPr>
+              <a:t>/DSNFZ/CSYE7200_FINAL_PROJECT</a:t>
+            </a:r>
+            <a:endParaRPr dirty="0">
               <a:solidFill>
                 <a:srgbClr val="FF0000"/>
               </a:solidFill>
@@ -7170,11 +7355,11 @@
 </file>
 
 <file path=ppt/slides/slide6.xml><?xml version="1.0" encoding="utf-8"?>
-<p:sld xmlns:a="http://schemas.openxmlformats.org/drawingml/2006/main" xmlns:r="http://schemas.openxmlformats.org/officeDocument/2006/relationships" xmlns:mc="http://schemas.openxmlformats.org/markup-compatibility/2006" xmlns:mv="urn:schemas-microsoft-com:mac:vml" xmlns:p="http://schemas.openxmlformats.org/presentationml/2006/main" xmlns:c="http://schemas.openxmlformats.org/drawingml/2006/chart" xmlns:dgm="http://schemas.openxmlformats.org/drawingml/2006/diagram" xmlns:o="urn:schemas-microsoft-com:office:office" xmlns:v="urn:schemas-microsoft-com:vml" xmlns:pvml="urn:schemas-microsoft-com:office:powerpoint" xmlns:com="http://schemas.openxmlformats.org/drawingml/2006/compatibility" xmlns:p14="http://schemas.microsoft.com/office/powerpoint/2010/main" xmlns:p15="http://schemas.microsoft.com/office/powerpoint/2012/main">
+<p:sld xmlns:a="http://schemas.openxmlformats.org/drawingml/2006/main" xmlns:r="http://schemas.openxmlformats.org/officeDocument/2006/relationships" xmlns:p="http://schemas.openxmlformats.org/presentationml/2006/main">
   <p:cSld>
     <p:spTree>
       <p:nvGrpSpPr>
-        <p:cNvPr id="86" name="Shape 86"/>
+        <p:cNvPr id="1" name="Shape 86"/>
         <p:cNvGrpSpPr/>
         <p:nvPr/>
       </p:nvGrpSpPr>
@@ -7189,7 +7374,9 @@
       <p:sp>
         <p:nvSpPr>
           <p:cNvPr id="87" name="Google Shape;87;p18"/>
-          <p:cNvSpPr txBox="1"/>
+          <p:cNvSpPr txBox="1">
+            <a:spLocks noGrp="1"/>
+          </p:cNvSpPr>
           <p:nvPr>
             <p:ph type="title"/>
           </p:nvPr>
@@ -7204,12 +7391,12 @@
           </a:prstGeom>
         </p:spPr>
         <p:txBody>
-          <a:bodyPr anchorCtr="0" anchor="t" bIns="91425" lIns="91425" spcFirstLastPara="1" rIns="91425" wrap="square" tIns="91425">
+          <a:bodyPr spcFirstLastPara="1" wrap="square" lIns="91425" tIns="91425" rIns="91425" bIns="91425" anchor="t" anchorCtr="0">
             <a:noAutofit/>
           </a:bodyPr>
           <a:lstStyle/>
           <a:p>
-            <a:pPr indent="0" lvl="0" marL="0" rtl="0" algn="l">
+            <a:pPr marL="0" lvl="0" indent="0" algn="l" rtl="0">
               <a:spcBef>
                 <a:spcPts val="0"/>
               </a:spcBef>
@@ -7229,9 +7416,11 @@
       <p:sp>
         <p:nvSpPr>
           <p:cNvPr id="88" name="Google Shape;88;p18"/>
-          <p:cNvSpPr txBox="1"/>
+          <p:cNvSpPr txBox="1">
+            <a:spLocks noGrp="1"/>
+          </p:cNvSpPr>
           <p:nvPr>
-            <p:ph idx="1" type="body"/>
+            <p:ph type="body" idx="1"/>
           </p:nvPr>
         </p:nvSpPr>
         <p:spPr>
@@ -7244,12 +7433,12 @@
           </a:prstGeom>
         </p:spPr>
         <p:txBody>
-          <a:bodyPr anchorCtr="0" anchor="t" bIns="91425" lIns="91425" spcFirstLastPara="1" rIns="91425" wrap="square" tIns="91425">
+          <a:bodyPr spcFirstLastPara="1" wrap="square" lIns="91425" tIns="91425" rIns="91425" bIns="91425" anchor="t" anchorCtr="0">
             <a:noAutofit/>
           </a:bodyPr>
           <a:lstStyle/>
           <a:p>
-            <a:pPr indent="0" lvl="0" marL="457200" rtl="0" algn="l">
+            <a:pPr marL="457200" lvl="0" indent="0" algn="l" rtl="0">
               <a:spcBef>
                 <a:spcPts val="0"/>
               </a:spcBef>
@@ -7258,9 +7447,6 @@
               </a:spcAft>
               <a:buNone/>
             </a:pPr>
-            <a:r>
-              <a:t/>
-            </a:r>
             <a:endParaRPr/>
           </a:p>
         </p:txBody>
@@ -7302,11 +7488,11 @@
 </file>
 
 <file path=ppt/slides/slide7.xml><?xml version="1.0" encoding="utf-8"?>
-<p:sld xmlns:a="http://schemas.openxmlformats.org/drawingml/2006/main" xmlns:r="http://schemas.openxmlformats.org/officeDocument/2006/relationships" xmlns:mc="http://schemas.openxmlformats.org/markup-compatibility/2006" xmlns:mv="urn:schemas-microsoft-com:mac:vml" xmlns:p="http://schemas.openxmlformats.org/presentationml/2006/main" xmlns:c="http://schemas.openxmlformats.org/drawingml/2006/chart" xmlns:dgm="http://schemas.openxmlformats.org/drawingml/2006/diagram" xmlns:o="urn:schemas-microsoft-com:office:office" xmlns:v="urn:schemas-microsoft-com:vml" xmlns:pvml="urn:schemas-microsoft-com:office:powerpoint" xmlns:com="http://schemas.openxmlformats.org/drawingml/2006/compatibility" xmlns:p14="http://schemas.microsoft.com/office/powerpoint/2010/main" xmlns:p15="http://schemas.microsoft.com/office/powerpoint/2012/main">
+<p:sld xmlns:a="http://schemas.openxmlformats.org/drawingml/2006/main" xmlns:r="http://schemas.openxmlformats.org/officeDocument/2006/relationships" xmlns:p="http://schemas.openxmlformats.org/presentationml/2006/main">
   <p:cSld>
     <p:spTree>
       <p:nvGrpSpPr>
-        <p:cNvPr id="93" name="Shape 93"/>
+        <p:cNvPr id="1" name="Shape 93"/>
         <p:cNvGrpSpPr/>
         <p:nvPr/>
       </p:nvGrpSpPr>
@@ -7321,7 +7507,9 @@
       <p:sp>
         <p:nvSpPr>
           <p:cNvPr id="94" name="Google Shape;94;p19"/>
-          <p:cNvSpPr txBox="1"/>
+          <p:cNvSpPr txBox="1">
+            <a:spLocks noGrp="1"/>
+          </p:cNvSpPr>
           <p:nvPr>
             <p:ph type="title"/>
           </p:nvPr>
@@ -7336,12 +7524,12 @@
           </a:prstGeom>
         </p:spPr>
         <p:txBody>
-          <a:bodyPr anchorCtr="0" anchor="t" bIns="91425" lIns="91425" spcFirstLastPara="1" rIns="91425" wrap="square" tIns="91425">
+          <a:bodyPr spcFirstLastPara="1" wrap="square" lIns="91425" tIns="91425" rIns="91425" bIns="91425" anchor="t" anchorCtr="0">
             <a:noAutofit/>
           </a:bodyPr>
           <a:lstStyle/>
           <a:p>
-            <a:pPr indent="0" lvl="0" marL="0" rtl="0" algn="l">
+            <a:pPr marL="0" lvl="0" indent="0" algn="l" rtl="0">
               <a:spcBef>
                 <a:spcPts val="0"/>
               </a:spcBef>
@@ -7361,9 +7549,11 @@
       <p:sp>
         <p:nvSpPr>
           <p:cNvPr id="95" name="Google Shape;95;p19"/>
-          <p:cNvSpPr txBox="1"/>
+          <p:cNvSpPr txBox="1">
+            <a:spLocks noGrp="1"/>
+          </p:cNvSpPr>
           <p:nvPr>
-            <p:ph idx="1" type="body"/>
+            <p:ph type="body" idx="1"/>
           </p:nvPr>
         </p:nvSpPr>
         <p:spPr>
@@ -7376,12 +7566,12 @@
           </a:prstGeom>
         </p:spPr>
         <p:txBody>
-          <a:bodyPr anchorCtr="0" anchor="t" bIns="91425" lIns="91425" spcFirstLastPara="1" rIns="91425" wrap="square" tIns="91425">
+          <a:bodyPr spcFirstLastPara="1" wrap="square" lIns="91425" tIns="91425" rIns="91425" bIns="91425" anchor="t" anchorCtr="0">
             <a:noAutofit/>
           </a:bodyPr>
           <a:lstStyle/>
           <a:p>
-            <a:pPr indent="0" lvl="0" marL="0" rtl="0" algn="l">
+            <a:pPr marL="0" lvl="0" indent="0" algn="l" rtl="0">
               <a:spcBef>
                 <a:spcPts val="0"/>
               </a:spcBef>
@@ -7397,7 +7587,7 @@
             <a:endParaRPr/>
           </a:p>
           <a:p>
-            <a:pPr indent="-342900" lvl="0" marL="457200" rtl="0" algn="l">
+            <a:pPr marL="457200" lvl="0" indent="-342900" algn="l" rtl="0">
               <a:spcBef>
                 <a:spcPts val="1600"/>
               </a:spcBef>
@@ -7414,7 +7604,7 @@
             <a:endParaRPr/>
           </a:p>
           <a:p>
-            <a:pPr indent="-342900" lvl="0" marL="457200" rtl="0" algn="l">
+            <a:pPr marL="457200" lvl="0" indent="-342900" algn="l" rtl="0">
               <a:spcBef>
                 <a:spcPts val="0"/>
               </a:spcBef>
@@ -7431,7 +7621,7 @@
             <a:endParaRPr/>
           </a:p>
           <a:p>
-            <a:pPr indent="-342900" lvl="0" marL="457200" rtl="0" algn="l">
+            <a:pPr marL="457200" lvl="0" indent="-342900" algn="l" rtl="0">
               <a:spcBef>
                 <a:spcPts val="0"/>
               </a:spcBef>
@@ -7448,7 +7638,7 @@
             <a:endParaRPr/>
           </a:p>
           <a:p>
-            <a:pPr indent="0" lvl="0" marL="0" rtl="0" algn="l">
+            <a:pPr marL="0" lvl="0" indent="0" algn="l" rtl="0">
               <a:spcBef>
                 <a:spcPts val="1600"/>
               </a:spcBef>
@@ -7457,9 +7647,6 @@
               </a:spcAft>
               <a:buNone/>
             </a:pPr>
-            <a:r>
-              <a:t/>
-            </a:r>
             <a:endParaRPr/>
           </a:p>
         </p:txBody>
@@ -7473,11 +7660,11 @@
 </file>
 
 <file path=ppt/slides/slide8.xml><?xml version="1.0" encoding="utf-8"?>
-<p:sld xmlns:a="http://schemas.openxmlformats.org/drawingml/2006/main" xmlns:r="http://schemas.openxmlformats.org/officeDocument/2006/relationships" xmlns:mc="http://schemas.openxmlformats.org/markup-compatibility/2006" xmlns:mv="urn:schemas-microsoft-com:mac:vml" xmlns:p="http://schemas.openxmlformats.org/presentationml/2006/main" xmlns:c="http://schemas.openxmlformats.org/drawingml/2006/chart" xmlns:dgm="http://schemas.openxmlformats.org/drawingml/2006/diagram" xmlns:o="urn:schemas-microsoft-com:office:office" xmlns:v="urn:schemas-microsoft-com:vml" xmlns:pvml="urn:schemas-microsoft-com:office:powerpoint" xmlns:com="http://schemas.openxmlformats.org/drawingml/2006/compatibility" xmlns:p14="http://schemas.microsoft.com/office/powerpoint/2010/main" xmlns:p15="http://schemas.microsoft.com/office/powerpoint/2012/main">
+<p:sld xmlns:a="http://schemas.openxmlformats.org/drawingml/2006/main" xmlns:r="http://schemas.openxmlformats.org/officeDocument/2006/relationships" xmlns:p="http://schemas.openxmlformats.org/presentationml/2006/main">
   <p:cSld>
     <p:spTree>
       <p:nvGrpSpPr>
-        <p:cNvPr id="99" name="Shape 99"/>
+        <p:cNvPr id="1" name="Shape 99"/>
         <p:cNvGrpSpPr/>
         <p:nvPr/>
       </p:nvGrpSpPr>
@@ -7492,7 +7679,9 @@
       <p:sp>
         <p:nvSpPr>
           <p:cNvPr id="100" name="Google Shape;100;p20"/>
-          <p:cNvSpPr txBox="1"/>
+          <p:cNvSpPr txBox="1">
+            <a:spLocks noGrp="1"/>
+          </p:cNvSpPr>
           <p:nvPr>
             <p:ph type="title"/>
           </p:nvPr>
@@ -7507,12 +7696,12 @@
           </a:prstGeom>
         </p:spPr>
         <p:txBody>
-          <a:bodyPr anchorCtr="0" anchor="t" bIns="91425" lIns="91425" spcFirstLastPara="1" rIns="91425" wrap="square" tIns="91425">
+          <a:bodyPr spcFirstLastPara="1" wrap="square" lIns="91425" tIns="91425" rIns="91425" bIns="91425" anchor="t" anchorCtr="0">
             <a:noAutofit/>
           </a:bodyPr>
           <a:lstStyle/>
           <a:p>
-            <a:pPr indent="0" lvl="0" marL="0" rtl="0" algn="l">
+            <a:pPr marL="0" lvl="0" indent="0" algn="l" rtl="0">
               <a:spcBef>
                 <a:spcPts val="0"/>
               </a:spcBef>
@@ -7532,9 +7721,11 @@
       <p:sp>
         <p:nvSpPr>
           <p:cNvPr id="101" name="Google Shape;101;p20"/>
-          <p:cNvSpPr txBox="1"/>
+          <p:cNvSpPr txBox="1">
+            <a:spLocks noGrp="1"/>
+          </p:cNvSpPr>
           <p:nvPr>
-            <p:ph idx="1" type="body"/>
+            <p:ph type="body" idx="1"/>
           </p:nvPr>
         </p:nvSpPr>
         <p:spPr>
@@ -7547,12 +7738,12 @@
           </a:prstGeom>
         </p:spPr>
         <p:txBody>
-          <a:bodyPr anchorCtr="0" anchor="t" bIns="91425" lIns="91425" spcFirstLastPara="1" rIns="91425" wrap="square" tIns="91425">
+          <a:bodyPr spcFirstLastPara="1" wrap="square" lIns="91425" tIns="91425" rIns="91425" bIns="91425" anchor="t" anchorCtr="0">
             <a:noAutofit/>
           </a:bodyPr>
           <a:lstStyle/>
           <a:p>
-            <a:pPr indent="-381000" lvl="0" marL="457200" rtl="0" algn="l">
+            <a:pPr marL="457200" lvl="0" indent="-381000" algn="l" rtl="0">
               <a:spcBef>
                 <a:spcPts val="0"/>
               </a:spcBef>
@@ -7569,7 +7760,7 @@
             <a:endParaRPr sz="2400"/>
           </a:p>
           <a:p>
-            <a:pPr indent="-381000" lvl="0" marL="457200" rtl="0" algn="l">
+            <a:pPr marL="457200" lvl="0" indent="-381000" algn="l" rtl="0">
               <a:spcBef>
                 <a:spcPts val="0"/>
               </a:spcBef>
@@ -7581,16 +7772,12 @@
             </a:pPr>
             <a:r>
               <a:rPr lang="en" sz="2400"/>
-              <a:t>For us, we want to learn more about the specific </a:t>
-            </a:r>
-            <a:r>
-              <a:rPr lang="en" sz="2400"/>
-              <a:t>algorithm and the using of scala.</a:t>
+              <a:t>For us, we want to learn more about the specific algorithm and the using of scala.</a:t>
             </a:r>
             <a:endParaRPr sz="2400"/>
           </a:p>
           <a:p>
-            <a:pPr indent="0" lvl="0" marL="457200" rtl="0" algn="l">
+            <a:pPr marL="457200" lvl="0" indent="0" algn="l" rtl="0">
               <a:spcBef>
                 <a:spcPts val="1600"/>
               </a:spcBef>
@@ -7599,9 +7786,6 @@
               </a:spcAft>
               <a:buNone/>
             </a:pPr>
-            <a:r>
-              <a:t/>
-            </a:r>
             <a:endParaRPr/>
           </a:p>
         </p:txBody>
@@ -7615,11 +7799,11 @@
 </file>
 
 <file path=ppt/slides/slide9.xml><?xml version="1.0" encoding="utf-8"?>
-<p:sld xmlns:a="http://schemas.openxmlformats.org/drawingml/2006/main" xmlns:r="http://schemas.openxmlformats.org/officeDocument/2006/relationships" xmlns:mc="http://schemas.openxmlformats.org/markup-compatibility/2006" xmlns:mv="urn:schemas-microsoft-com:mac:vml" xmlns:p="http://schemas.openxmlformats.org/presentationml/2006/main" xmlns:c="http://schemas.openxmlformats.org/drawingml/2006/chart" xmlns:dgm="http://schemas.openxmlformats.org/drawingml/2006/diagram" xmlns:o="urn:schemas-microsoft-com:office:office" xmlns:v="urn:schemas-microsoft-com:vml" xmlns:pvml="urn:schemas-microsoft-com:office:powerpoint" xmlns:com="http://schemas.openxmlformats.org/drawingml/2006/compatibility" xmlns:p14="http://schemas.microsoft.com/office/powerpoint/2010/main" xmlns:p15="http://schemas.microsoft.com/office/powerpoint/2012/main">
+<p:sld xmlns:a="http://schemas.openxmlformats.org/drawingml/2006/main" xmlns:r="http://schemas.openxmlformats.org/officeDocument/2006/relationships" xmlns:p="http://schemas.openxmlformats.org/presentationml/2006/main">
   <p:cSld>
     <p:spTree>
       <p:nvGrpSpPr>
-        <p:cNvPr id="105" name="Shape 105"/>
+        <p:cNvPr id="1" name="Shape 105"/>
         <p:cNvGrpSpPr/>
         <p:nvPr/>
       </p:nvGrpSpPr>
@@ -7634,9 +7818,11 @@
       <p:sp>
         <p:nvSpPr>
           <p:cNvPr id="106" name="Google Shape;106;p21"/>
-          <p:cNvSpPr txBox="1"/>
+          <p:cNvSpPr txBox="1">
+            <a:spLocks noGrp="1"/>
+          </p:cNvSpPr>
           <p:nvPr>
-            <p:ph idx="1" type="body"/>
+            <p:ph type="body" idx="1"/>
           </p:nvPr>
         </p:nvSpPr>
         <p:spPr>
@@ -7649,12 +7835,12 @@
           </a:prstGeom>
         </p:spPr>
         <p:txBody>
-          <a:bodyPr anchorCtr="0" anchor="t" bIns="91425" lIns="91425" spcFirstLastPara="1" rIns="91425" wrap="square" tIns="91425">
+          <a:bodyPr spcFirstLastPara="1" wrap="square" lIns="91425" tIns="91425" rIns="91425" bIns="91425" anchor="t" anchorCtr="0">
             <a:noAutofit/>
           </a:bodyPr>
           <a:lstStyle/>
           <a:p>
-            <a:pPr indent="0" lvl="0" marL="0" rtl="0" algn="ctr">
+            <a:pPr marL="0" lvl="0" indent="0" algn="ctr" rtl="0">
               <a:spcBef>
                 <a:spcPts val="0"/>
               </a:spcBef>
@@ -7680,7 +7866,7 @@
 </file>
 
 <file path=ppt/theme/theme1.xml><?xml version="1.0" encoding="utf-8"?>
-<a:theme xmlns:a="http://schemas.openxmlformats.org/drawingml/2006/main" xmlns:r="http://schemas.openxmlformats.org/officeDocument/2006/relationships" name="Simple Dark">
+<a:theme xmlns:a="http://schemas.openxmlformats.org/drawingml/2006/main" name="Simple Dark">
   <a:themeElements>
     <a:clrScheme name="Simple Dark">
       <a:dk1>
@@ -7955,11 +8141,13 @@
       </a:bgFillStyleLst>
     </a:fmtScheme>
   </a:themeElements>
+  <a:objectDefaults/>
+  <a:extraClrSchemeLst/>
 </a:theme>
 </file>
 
 <file path=ppt/theme/theme2.xml><?xml version="1.0" encoding="utf-8"?>
-<a:theme xmlns:a="http://schemas.openxmlformats.org/drawingml/2006/main" xmlns:r="http://schemas.openxmlformats.org/officeDocument/2006/relationships">
+<a:theme xmlns:a="http://schemas.openxmlformats.org/drawingml/2006/main">
   <a:themeElements>
     <a:clrScheme name="Default">
       <a:dk1>
@@ -8234,5 +8422,7 @@
       </a:bgFillStyleLst>
     </a:fmtScheme>
   </a:themeElements>
+  <a:objectDefaults/>
+  <a:extraClrSchemeLst/>
 </a:theme>
 </file>
</xml_diff>